<commit_message>
Update main class diagram in the develop guide (because we separate address into four classes)
</commit_message>
<xml_diff>
--- a/doc/Diagrams.pptx
+++ b/doc/Diagrams.pptx
@@ -126,6 +126,10 @@
 </p:presentation>
 </file>
 
+<file path=ppt/revisionInfo.xml><?xml version="1.0" encoding="utf-8"?>
+<p1510:revInfo xmlns:a="http://schemas.openxmlformats.org/drawingml/2006/main" xmlns:r="http://schemas.openxmlformats.org/officeDocument/2006/relationships" xmlns:p1510="http://schemas.microsoft.com/office/powerpoint/2015/10/main"/>
+</file>
+
 <file path=ppt/slideLayouts/slideLayout1.xml><?xml version="1.0" encoding="utf-8"?>
 <p:sldLayout xmlns:a="http://schemas.openxmlformats.org/drawingml/2006/main" xmlns:r="http://schemas.openxmlformats.org/officeDocument/2006/relationships" xmlns:p="http://schemas.openxmlformats.org/presentationml/2006/main" type="title" preserve="1">
   <p:cSld name="Title Slide">
@@ -164,10 +168,9 @@
           <a:lstStyle/>
           <a:p>
             <a:r>
-              <a:rPr lang="en-US" smtClean="0"/>
+              <a:rPr lang="en-US"/>
               <a:t>Click to edit Master title style</a:t>
             </a:r>
-            <a:endParaRPr lang="en-US"/>
           </a:p>
         </p:txBody>
       </p:sp>
@@ -283,10 +286,9 @@
           </a:lstStyle>
           <a:p>
             <a:r>
-              <a:rPr lang="en-US" smtClean="0"/>
+              <a:rPr lang="en-US"/>
               <a:t>Click to edit Master subtitle style</a:t>
             </a:r>
-            <a:endParaRPr lang="en-US"/>
           </a:p>
         </p:txBody>
       </p:sp>
@@ -307,7 +309,7 @@
           <a:p>
             <a:fld id="{78C97017-6FC3-485B-9764-EAC9E56C1D49}" type="datetimeFigureOut">
               <a:rPr lang="en-US" smtClean="0"/>
-              <a:t>8/31/2017</a:t>
+              <a:t>9/3/2017</a:t>
             </a:fld>
             <a:endParaRPr lang="en-US"/>
           </a:p>
@@ -401,10 +403,9 @@
           <a:lstStyle/>
           <a:p>
             <a:r>
-              <a:rPr lang="en-US" smtClean="0"/>
+              <a:rPr lang="en-US"/>
               <a:t>Click to edit Master title style</a:t>
             </a:r>
-            <a:endParaRPr lang="en-US"/>
           </a:p>
         </p:txBody>
       </p:sp>
@@ -425,38 +426,37 @@
           <a:p>
             <a:pPr lvl="0"/>
             <a:r>
-              <a:rPr lang="en-US" smtClean="0"/>
+              <a:rPr lang="en-US"/>
               <a:t>Click to edit Master text styles</a:t>
             </a:r>
           </a:p>
           <a:p>
             <a:pPr lvl="1"/>
             <a:r>
-              <a:rPr lang="en-US" smtClean="0"/>
+              <a:rPr lang="en-US"/>
               <a:t>Second level</a:t>
             </a:r>
           </a:p>
           <a:p>
             <a:pPr lvl="2"/>
             <a:r>
-              <a:rPr lang="en-US" smtClean="0"/>
+              <a:rPr lang="en-US"/>
               <a:t>Third level</a:t>
             </a:r>
           </a:p>
           <a:p>
             <a:pPr lvl="3"/>
             <a:r>
-              <a:rPr lang="en-US" smtClean="0"/>
+              <a:rPr lang="en-US"/>
               <a:t>Fourth level</a:t>
             </a:r>
           </a:p>
           <a:p>
             <a:pPr lvl="4"/>
             <a:r>
-              <a:rPr lang="en-US" smtClean="0"/>
+              <a:rPr lang="en-US"/>
               <a:t>Fifth level</a:t>
             </a:r>
-            <a:endParaRPr lang="en-US"/>
           </a:p>
         </p:txBody>
       </p:sp>
@@ -477,7 +477,7 @@
           <a:p>
             <a:fld id="{78C97017-6FC3-485B-9764-EAC9E56C1D49}" type="datetimeFigureOut">
               <a:rPr lang="en-US" smtClean="0"/>
-              <a:t>8/31/2017</a:t>
+              <a:t>9/3/2017</a:t>
             </a:fld>
             <a:endParaRPr lang="en-US"/>
           </a:p>
@@ -576,10 +576,9 @@
           <a:lstStyle/>
           <a:p>
             <a:r>
-              <a:rPr lang="en-US" smtClean="0"/>
+              <a:rPr lang="en-US"/>
               <a:t>Click to edit Master title style</a:t>
             </a:r>
-            <a:endParaRPr lang="en-US"/>
           </a:p>
         </p:txBody>
       </p:sp>
@@ -605,38 +604,37 @@
           <a:p>
             <a:pPr lvl="0"/>
             <a:r>
-              <a:rPr lang="en-US" smtClean="0"/>
+              <a:rPr lang="en-US"/>
               <a:t>Click to edit Master text styles</a:t>
             </a:r>
           </a:p>
           <a:p>
             <a:pPr lvl="1"/>
             <a:r>
-              <a:rPr lang="en-US" smtClean="0"/>
+              <a:rPr lang="en-US"/>
               <a:t>Second level</a:t>
             </a:r>
           </a:p>
           <a:p>
             <a:pPr lvl="2"/>
             <a:r>
-              <a:rPr lang="en-US" smtClean="0"/>
+              <a:rPr lang="en-US"/>
               <a:t>Third level</a:t>
             </a:r>
           </a:p>
           <a:p>
             <a:pPr lvl="3"/>
             <a:r>
-              <a:rPr lang="en-US" smtClean="0"/>
+              <a:rPr lang="en-US"/>
               <a:t>Fourth level</a:t>
             </a:r>
           </a:p>
           <a:p>
             <a:pPr lvl="4"/>
             <a:r>
-              <a:rPr lang="en-US" smtClean="0"/>
+              <a:rPr lang="en-US"/>
               <a:t>Fifth level</a:t>
             </a:r>
-            <a:endParaRPr lang="en-US"/>
           </a:p>
         </p:txBody>
       </p:sp>
@@ -657,7 +655,7 @@
           <a:p>
             <a:fld id="{78C97017-6FC3-485B-9764-EAC9E56C1D49}" type="datetimeFigureOut">
               <a:rPr lang="en-US" smtClean="0"/>
-              <a:t>8/31/2017</a:t>
+              <a:t>9/3/2017</a:t>
             </a:fld>
             <a:endParaRPr lang="en-US"/>
           </a:p>
@@ -751,10 +749,9 @@
           <a:lstStyle/>
           <a:p>
             <a:r>
-              <a:rPr lang="en-US" smtClean="0"/>
+              <a:rPr lang="en-US"/>
               <a:t>Click to edit Master title style</a:t>
             </a:r>
-            <a:endParaRPr lang="en-US"/>
           </a:p>
         </p:txBody>
       </p:sp>
@@ -775,38 +772,37 @@
           <a:p>
             <a:pPr lvl="0"/>
             <a:r>
-              <a:rPr lang="en-US" smtClean="0"/>
+              <a:rPr lang="en-US"/>
               <a:t>Click to edit Master text styles</a:t>
             </a:r>
           </a:p>
           <a:p>
             <a:pPr lvl="1"/>
             <a:r>
-              <a:rPr lang="en-US" smtClean="0"/>
+              <a:rPr lang="en-US"/>
               <a:t>Second level</a:t>
             </a:r>
           </a:p>
           <a:p>
             <a:pPr lvl="2"/>
             <a:r>
-              <a:rPr lang="en-US" smtClean="0"/>
+              <a:rPr lang="en-US"/>
               <a:t>Third level</a:t>
             </a:r>
           </a:p>
           <a:p>
             <a:pPr lvl="3"/>
             <a:r>
-              <a:rPr lang="en-US" smtClean="0"/>
+              <a:rPr lang="en-US"/>
               <a:t>Fourth level</a:t>
             </a:r>
           </a:p>
           <a:p>
             <a:pPr lvl="4"/>
             <a:r>
-              <a:rPr lang="en-US" smtClean="0"/>
+              <a:rPr lang="en-US"/>
               <a:t>Fifth level</a:t>
             </a:r>
-            <a:endParaRPr lang="en-US"/>
           </a:p>
         </p:txBody>
       </p:sp>
@@ -827,7 +823,7 @@
           <a:p>
             <a:fld id="{78C97017-6FC3-485B-9764-EAC9E56C1D49}" type="datetimeFigureOut">
               <a:rPr lang="en-US" smtClean="0"/>
-              <a:t>8/31/2017</a:t>
+              <a:t>9/3/2017</a:t>
             </a:fld>
             <a:endParaRPr lang="en-US"/>
           </a:p>
@@ -930,10 +926,9 @@
           </a:lstStyle>
           <a:p>
             <a:r>
-              <a:rPr lang="en-US" smtClean="0"/>
+              <a:rPr lang="en-US"/>
               <a:t>Click to edit Master title style</a:t>
             </a:r>
-            <a:endParaRPr lang="en-US"/>
           </a:p>
         </p:txBody>
       </p:sp>
@@ -1050,7 +1045,7 @@
           <a:p>
             <a:pPr lvl="0"/>
             <a:r>
-              <a:rPr lang="en-US" smtClean="0"/>
+              <a:rPr lang="en-US"/>
               <a:t>Click to edit Master text styles</a:t>
             </a:r>
           </a:p>
@@ -1073,7 +1068,7 @@
           <a:p>
             <a:fld id="{78C97017-6FC3-485B-9764-EAC9E56C1D49}" type="datetimeFigureOut">
               <a:rPr lang="en-US" smtClean="0"/>
-              <a:t>8/31/2017</a:t>
+              <a:t>9/3/2017</a:t>
             </a:fld>
             <a:endParaRPr lang="en-US"/>
           </a:p>
@@ -1167,10 +1162,9 @@
           <a:lstStyle/>
           <a:p>
             <a:r>
-              <a:rPr lang="en-US" smtClean="0"/>
+              <a:rPr lang="en-US"/>
               <a:t>Click to edit Master title style</a:t>
             </a:r>
-            <a:endParaRPr lang="en-US"/>
           </a:p>
         </p:txBody>
       </p:sp>
@@ -1224,38 +1218,37 @@
           <a:p>
             <a:pPr lvl="0"/>
             <a:r>
-              <a:rPr lang="en-US" smtClean="0"/>
+              <a:rPr lang="en-US"/>
               <a:t>Click to edit Master text styles</a:t>
             </a:r>
           </a:p>
           <a:p>
             <a:pPr lvl="1"/>
             <a:r>
-              <a:rPr lang="en-US" smtClean="0"/>
+              <a:rPr lang="en-US"/>
               <a:t>Second level</a:t>
             </a:r>
           </a:p>
           <a:p>
             <a:pPr lvl="2"/>
             <a:r>
-              <a:rPr lang="en-US" smtClean="0"/>
+              <a:rPr lang="en-US"/>
               <a:t>Third level</a:t>
             </a:r>
           </a:p>
           <a:p>
             <a:pPr lvl="3"/>
             <a:r>
-              <a:rPr lang="en-US" smtClean="0"/>
+              <a:rPr lang="en-US"/>
               <a:t>Fourth level</a:t>
             </a:r>
           </a:p>
           <a:p>
             <a:pPr lvl="4"/>
             <a:r>
-              <a:rPr lang="en-US" smtClean="0"/>
+              <a:rPr lang="en-US"/>
               <a:t>Fifth level</a:t>
             </a:r>
-            <a:endParaRPr lang="en-US"/>
           </a:p>
         </p:txBody>
       </p:sp>
@@ -1309,38 +1302,37 @@
           <a:p>
             <a:pPr lvl="0"/>
             <a:r>
-              <a:rPr lang="en-US" smtClean="0"/>
+              <a:rPr lang="en-US"/>
               <a:t>Click to edit Master text styles</a:t>
             </a:r>
           </a:p>
           <a:p>
             <a:pPr lvl="1"/>
             <a:r>
-              <a:rPr lang="en-US" smtClean="0"/>
+              <a:rPr lang="en-US"/>
               <a:t>Second level</a:t>
             </a:r>
           </a:p>
           <a:p>
             <a:pPr lvl="2"/>
             <a:r>
-              <a:rPr lang="en-US" smtClean="0"/>
+              <a:rPr lang="en-US"/>
               <a:t>Third level</a:t>
             </a:r>
           </a:p>
           <a:p>
             <a:pPr lvl="3"/>
             <a:r>
-              <a:rPr lang="en-US" smtClean="0"/>
+              <a:rPr lang="en-US"/>
               <a:t>Fourth level</a:t>
             </a:r>
           </a:p>
           <a:p>
             <a:pPr lvl="4"/>
             <a:r>
-              <a:rPr lang="en-US" smtClean="0"/>
+              <a:rPr lang="en-US"/>
               <a:t>Fifth level</a:t>
             </a:r>
-            <a:endParaRPr lang="en-US"/>
           </a:p>
         </p:txBody>
       </p:sp>
@@ -1361,7 +1353,7 @@
           <a:p>
             <a:fld id="{78C97017-6FC3-485B-9764-EAC9E56C1D49}" type="datetimeFigureOut">
               <a:rPr lang="en-US" smtClean="0"/>
-              <a:t>8/31/2017</a:t>
+              <a:t>9/3/2017</a:t>
             </a:fld>
             <a:endParaRPr lang="en-US"/>
           </a:p>
@@ -1459,10 +1451,9 @@
           </a:lstStyle>
           <a:p>
             <a:r>
-              <a:rPr lang="en-US" smtClean="0"/>
+              <a:rPr lang="en-US"/>
               <a:t>Click to edit Master title style</a:t>
             </a:r>
-            <a:endParaRPr lang="en-US"/>
           </a:p>
         </p:txBody>
       </p:sp>
@@ -1525,7 +1516,7 @@
           <a:p>
             <a:pPr lvl="0"/>
             <a:r>
-              <a:rPr lang="en-US" smtClean="0"/>
+              <a:rPr lang="en-US"/>
               <a:t>Click to edit Master text styles</a:t>
             </a:r>
           </a:p>
@@ -1581,38 +1572,37 @@
           <a:p>
             <a:pPr lvl="0"/>
             <a:r>
-              <a:rPr lang="en-US" smtClean="0"/>
+              <a:rPr lang="en-US"/>
               <a:t>Click to edit Master text styles</a:t>
             </a:r>
           </a:p>
           <a:p>
             <a:pPr lvl="1"/>
             <a:r>
-              <a:rPr lang="en-US" smtClean="0"/>
+              <a:rPr lang="en-US"/>
               <a:t>Second level</a:t>
             </a:r>
           </a:p>
           <a:p>
             <a:pPr lvl="2"/>
             <a:r>
-              <a:rPr lang="en-US" smtClean="0"/>
+              <a:rPr lang="en-US"/>
               <a:t>Third level</a:t>
             </a:r>
           </a:p>
           <a:p>
             <a:pPr lvl="3"/>
             <a:r>
-              <a:rPr lang="en-US" smtClean="0"/>
+              <a:rPr lang="en-US"/>
               <a:t>Fourth level</a:t>
             </a:r>
           </a:p>
           <a:p>
             <a:pPr lvl="4"/>
             <a:r>
-              <a:rPr lang="en-US" smtClean="0"/>
+              <a:rPr lang="en-US"/>
               <a:t>Fifth level</a:t>
             </a:r>
-            <a:endParaRPr lang="en-US"/>
           </a:p>
         </p:txBody>
       </p:sp>
@@ -1675,7 +1665,7 @@
           <a:p>
             <a:pPr lvl="0"/>
             <a:r>
-              <a:rPr lang="en-US" smtClean="0"/>
+              <a:rPr lang="en-US"/>
               <a:t>Click to edit Master text styles</a:t>
             </a:r>
           </a:p>
@@ -1731,38 +1721,37 @@
           <a:p>
             <a:pPr lvl="0"/>
             <a:r>
-              <a:rPr lang="en-US" smtClean="0"/>
+              <a:rPr lang="en-US"/>
               <a:t>Click to edit Master text styles</a:t>
             </a:r>
           </a:p>
           <a:p>
             <a:pPr lvl="1"/>
             <a:r>
-              <a:rPr lang="en-US" smtClean="0"/>
+              <a:rPr lang="en-US"/>
               <a:t>Second level</a:t>
             </a:r>
           </a:p>
           <a:p>
             <a:pPr lvl="2"/>
             <a:r>
-              <a:rPr lang="en-US" smtClean="0"/>
+              <a:rPr lang="en-US"/>
               <a:t>Third level</a:t>
             </a:r>
           </a:p>
           <a:p>
             <a:pPr lvl="3"/>
             <a:r>
-              <a:rPr lang="en-US" smtClean="0"/>
+              <a:rPr lang="en-US"/>
               <a:t>Fourth level</a:t>
             </a:r>
           </a:p>
           <a:p>
             <a:pPr lvl="4"/>
             <a:r>
-              <a:rPr lang="en-US" smtClean="0"/>
+              <a:rPr lang="en-US"/>
               <a:t>Fifth level</a:t>
             </a:r>
-            <a:endParaRPr lang="en-US"/>
           </a:p>
         </p:txBody>
       </p:sp>
@@ -1783,7 +1772,7 @@
           <a:p>
             <a:fld id="{78C97017-6FC3-485B-9764-EAC9E56C1D49}" type="datetimeFigureOut">
               <a:rPr lang="en-US" smtClean="0"/>
-              <a:t>8/31/2017</a:t>
+              <a:t>9/3/2017</a:t>
             </a:fld>
             <a:endParaRPr lang="en-US"/>
           </a:p>
@@ -1877,10 +1866,9 @@
           <a:lstStyle/>
           <a:p>
             <a:r>
-              <a:rPr lang="en-US" smtClean="0"/>
+              <a:rPr lang="en-US"/>
               <a:t>Click to edit Master title style</a:t>
             </a:r>
-            <a:endParaRPr lang="en-US"/>
           </a:p>
         </p:txBody>
       </p:sp>
@@ -1901,7 +1889,7 @@
           <a:p>
             <a:fld id="{78C97017-6FC3-485B-9764-EAC9E56C1D49}" type="datetimeFigureOut">
               <a:rPr lang="en-US" smtClean="0"/>
-              <a:t>8/31/2017</a:t>
+              <a:t>9/3/2017</a:t>
             </a:fld>
             <a:endParaRPr lang="en-US"/>
           </a:p>
@@ -1996,7 +1984,7 @@
           <a:p>
             <a:fld id="{78C97017-6FC3-485B-9764-EAC9E56C1D49}" type="datetimeFigureOut">
               <a:rPr lang="en-US" smtClean="0"/>
-              <a:t>8/31/2017</a:t>
+              <a:t>9/3/2017</a:t>
             </a:fld>
             <a:endParaRPr lang="en-US"/>
           </a:p>
@@ -2099,10 +2087,9 @@
           </a:lstStyle>
           <a:p>
             <a:r>
-              <a:rPr lang="en-US" smtClean="0"/>
+              <a:rPr lang="en-US"/>
               <a:t>Click to edit Master title style</a:t>
             </a:r>
-            <a:endParaRPr lang="en-US"/>
           </a:p>
         </p:txBody>
       </p:sp>
@@ -2156,38 +2143,37 @@
           <a:p>
             <a:pPr lvl="0"/>
             <a:r>
-              <a:rPr lang="en-US" smtClean="0"/>
+              <a:rPr lang="en-US"/>
               <a:t>Click to edit Master text styles</a:t>
             </a:r>
           </a:p>
           <a:p>
             <a:pPr lvl="1"/>
             <a:r>
-              <a:rPr lang="en-US" smtClean="0"/>
+              <a:rPr lang="en-US"/>
               <a:t>Second level</a:t>
             </a:r>
           </a:p>
           <a:p>
             <a:pPr lvl="2"/>
             <a:r>
-              <a:rPr lang="en-US" smtClean="0"/>
+              <a:rPr lang="en-US"/>
               <a:t>Third level</a:t>
             </a:r>
           </a:p>
           <a:p>
             <a:pPr lvl="3"/>
             <a:r>
-              <a:rPr lang="en-US" smtClean="0"/>
+              <a:rPr lang="en-US"/>
               <a:t>Fourth level</a:t>
             </a:r>
           </a:p>
           <a:p>
             <a:pPr lvl="4"/>
             <a:r>
-              <a:rPr lang="en-US" smtClean="0"/>
+              <a:rPr lang="en-US"/>
               <a:t>Fifth level</a:t>
             </a:r>
-            <a:endParaRPr lang="en-US"/>
           </a:p>
         </p:txBody>
       </p:sp>
@@ -2250,7 +2236,7 @@
           <a:p>
             <a:pPr lvl="0"/>
             <a:r>
-              <a:rPr lang="en-US" smtClean="0"/>
+              <a:rPr lang="en-US"/>
               <a:t>Click to edit Master text styles</a:t>
             </a:r>
           </a:p>
@@ -2273,7 +2259,7 @@
           <a:p>
             <a:fld id="{78C97017-6FC3-485B-9764-EAC9E56C1D49}" type="datetimeFigureOut">
               <a:rPr lang="en-US" smtClean="0"/>
-              <a:t>8/31/2017</a:t>
+              <a:t>9/3/2017</a:t>
             </a:fld>
             <a:endParaRPr lang="en-US"/>
           </a:p>
@@ -2376,10 +2362,9 @@
           </a:lstStyle>
           <a:p>
             <a:r>
-              <a:rPr lang="en-US" smtClean="0"/>
+              <a:rPr lang="en-US"/>
               <a:t>Click to edit Master title style</a:t>
             </a:r>
-            <a:endParaRPr lang="en-US"/>
           </a:p>
         </p:txBody>
       </p:sp>
@@ -2503,7 +2488,7 @@
           <a:p>
             <a:pPr lvl="0"/>
             <a:r>
-              <a:rPr lang="en-US" smtClean="0"/>
+              <a:rPr lang="en-US"/>
               <a:t>Click to edit Master text styles</a:t>
             </a:r>
           </a:p>
@@ -2526,7 +2511,7 @@
           <a:p>
             <a:fld id="{78C97017-6FC3-485B-9764-EAC9E56C1D49}" type="datetimeFigureOut">
               <a:rPr lang="en-US" smtClean="0"/>
-              <a:t>8/31/2017</a:t>
+              <a:t>9/3/2017</a:t>
             </a:fld>
             <a:endParaRPr lang="en-US"/>
           </a:p>
@@ -2635,10 +2620,9 @@
           <a:lstStyle/>
           <a:p>
             <a:r>
-              <a:rPr lang="en-US" smtClean="0"/>
+              <a:rPr lang="en-US"/>
               <a:t>Click to edit Master title style</a:t>
             </a:r>
-            <a:endParaRPr lang="en-US"/>
           </a:p>
         </p:txBody>
       </p:sp>
@@ -2669,38 +2653,37 @@
           <a:p>
             <a:pPr lvl="0"/>
             <a:r>
-              <a:rPr lang="en-US" smtClean="0"/>
+              <a:rPr lang="en-US"/>
               <a:t>Click to edit Master text styles</a:t>
             </a:r>
           </a:p>
           <a:p>
             <a:pPr lvl="1"/>
             <a:r>
-              <a:rPr lang="en-US" smtClean="0"/>
+              <a:rPr lang="en-US"/>
               <a:t>Second level</a:t>
             </a:r>
           </a:p>
           <a:p>
             <a:pPr lvl="2"/>
             <a:r>
-              <a:rPr lang="en-US" smtClean="0"/>
+              <a:rPr lang="en-US"/>
               <a:t>Third level</a:t>
             </a:r>
           </a:p>
           <a:p>
             <a:pPr lvl="3"/>
             <a:r>
-              <a:rPr lang="en-US" smtClean="0"/>
+              <a:rPr lang="en-US"/>
               <a:t>Fourth level</a:t>
             </a:r>
           </a:p>
           <a:p>
             <a:pPr lvl="4"/>
             <a:r>
-              <a:rPr lang="en-US" smtClean="0"/>
+              <a:rPr lang="en-US"/>
               <a:t>Fifth level</a:t>
             </a:r>
-            <a:endParaRPr lang="en-US"/>
           </a:p>
         </p:txBody>
       </p:sp>
@@ -2739,7 +2722,7 @@
           <a:p>
             <a:fld id="{78C97017-6FC3-485B-9764-EAC9E56C1D49}" type="datetimeFigureOut">
               <a:rPr lang="en-US" smtClean="0"/>
-              <a:t>8/31/2017</a:t>
+              <a:t>9/3/2017</a:t>
             </a:fld>
             <a:endParaRPr lang="en-US"/>
           </a:p>
@@ -3130,14 +3113,13 @@
           <a:lstStyle/>
           <a:p>
             <a:r>
-              <a:rPr lang="en-US" dirty="0" err="1" smtClean="0"/>
+              <a:rPr lang="en-US" dirty="0" err="1"/>
               <a:t>AddressBook</a:t>
             </a:r>
             <a:r>
-              <a:rPr lang="en-US" dirty="0" smtClean="0"/>
+              <a:rPr lang="en-US" dirty="0"/>
               <a:t> – Level 2</a:t>
             </a:r>
-            <a:endParaRPr lang="en-US" dirty="0"/>
           </a:p>
         </p:txBody>
       </p:sp>
@@ -3157,10 +3139,9 @@
           <a:lstStyle/>
           <a:p>
             <a:r>
-              <a:rPr lang="en-US" dirty="0" smtClean="0"/>
+              <a:rPr lang="en-US" dirty="0"/>
               <a:t>Diagrams</a:t>
             </a:r>
-            <a:endParaRPr lang="en-US" dirty="0"/>
           </a:p>
         </p:txBody>
       </p:sp>
@@ -3202,7 +3183,7 @@
         </p:nvSpPr>
         <p:spPr>
           <a:xfrm>
-            <a:off x="761999" y="5141640"/>
+            <a:off x="244597" y="5258098"/>
             <a:ext cx="929296" cy="346760"/>
           </a:xfrm>
           <a:prstGeom prst="rect">
@@ -3231,7 +3212,7 @@
           <a:p>
             <a:pPr algn="ctr"/>
             <a:r>
-              <a:rPr lang="en-US" sz="1050" dirty="0" err="1" smtClean="0"/>
+              <a:rPr lang="en-US" sz="1050" dirty="0" err="1"/>
               <a:t>TextUi</a:t>
             </a:r>
             <a:endParaRPr lang="en-SG" sz="1050" dirty="0"/>
@@ -3246,7 +3227,7 @@
         </p:nvSpPr>
         <p:spPr>
           <a:xfrm>
-            <a:off x="762000" y="3747060"/>
+            <a:off x="244598" y="3863518"/>
             <a:ext cx="929296" cy="346760"/>
           </a:xfrm>
           <a:prstGeom prst="rect">
@@ -3282,7 +3263,7 @@
           <a:p>
             <a:pPr algn="ctr"/>
             <a:r>
-              <a:rPr lang="en-US" sz="1050" dirty="0" smtClean="0">
+              <a:rPr lang="en-US" sz="1050" dirty="0">
                 <a:solidFill>
                   <a:schemeClr val="bg1"/>
                 </a:solidFill>
@@ -3305,7 +3286,7 @@
         </p:nvSpPr>
         <p:spPr>
           <a:xfrm>
-            <a:off x="2064848" y="3747060"/>
+            <a:off x="1547446" y="3863518"/>
             <a:ext cx="929296" cy="346760"/>
           </a:xfrm>
           <a:prstGeom prst="rect">
@@ -3349,7 +3330,7 @@
         </p:nvSpPr>
         <p:spPr>
           <a:xfrm>
-            <a:off x="1447800" y="3006040"/>
+            <a:off x="930398" y="3122498"/>
             <a:ext cx="634723" cy="346760"/>
           </a:xfrm>
           <a:prstGeom prst="rect">
@@ -3378,7 +3359,7 @@
           <a:p>
             <a:pPr algn="ctr"/>
             <a:r>
-              <a:rPr lang="en-US" sz="1050" dirty="0" smtClean="0"/>
+              <a:rPr lang="en-US" sz="1050" dirty="0"/>
               <a:t>Parser</a:t>
             </a:r>
             <a:endParaRPr lang="en-SG" sz="1050" dirty="0"/>
@@ -3393,7 +3374,7 @@
         </p:nvSpPr>
         <p:spPr>
           <a:xfrm>
-            <a:off x="3681046" y="3032560"/>
+            <a:off x="3163644" y="3149018"/>
             <a:ext cx="929296" cy="346760"/>
           </a:xfrm>
           <a:prstGeom prst="rect">
@@ -3422,14 +3403,14 @@
           <a:p>
             <a:pPr algn="ctr"/>
             <a:r>
-              <a:rPr lang="en-US" sz="1050" dirty="0" smtClean="0"/>
+              <a:rPr lang="en-US" sz="1050" dirty="0"/>
               <a:t>Unique</a:t>
             </a:r>
             <a:br>
-              <a:rPr lang="en-US" sz="1050" dirty="0" smtClean="0"/>
+              <a:rPr lang="en-US" sz="1050" dirty="0"/>
             </a:br>
             <a:r>
-              <a:rPr lang="en-US" sz="1050" dirty="0" err="1" smtClean="0"/>
+              <a:rPr lang="en-US" sz="1050" dirty="0" err="1"/>
               <a:t>TagList</a:t>
             </a:r>
             <a:endParaRPr lang="en-SG" sz="1050" dirty="0"/>
@@ -3444,7 +3425,7 @@
         </p:nvSpPr>
         <p:spPr>
           <a:xfrm>
-            <a:off x="3654669" y="4352685"/>
+            <a:off x="3137267" y="4469143"/>
             <a:ext cx="929296" cy="346760"/>
           </a:xfrm>
           <a:prstGeom prst="rect">
@@ -3473,14 +3454,14 @@
           <a:p>
             <a:pPr algn="ctr"/>
             <a:r>
-              <a:rPr lang="en-US" sz="1050" dirty="0" smtClean="0"/>
+              <a:rPr lang="en-US" sz="1050" dirty="0"/>
               <a:t>Unique</a:t>
             </a:r>
             <a:br>
-              <a:rPr lang="en-US" sz="1050" dirty="0" smtClean="0"/>
+              <a:rPr lang="en-US" sz="1050" dirty="0"/>
             </a:br>
             <a:r>
-              <a:rPr lang="en-US" sz="1050" dirty="0" err="1" smtClean="0"/>
+              <a:rPr lang="en-US" sz="1050" dirty="0" err="1"/>
               <a:t>PersonList</a:t>
             </a:r>
             <a:endParaRPr lang="en-SG" sz="1050" dirty="0"/>
@@ -3495,7 +3476,7 @@
         </p:nvSpPr>
         <p:spPr>
           <a:xfrm>
-            <a:off x="5219458" y="4352685"/>
+            <a:off x="4702056" y="4469143"/>
             <a:ext cx="929296" cy="346760"/>
           </a:xfrm>
           <a:prstGeom prst="rect">
@@ -3524,7 +3505,7 @@
           <a:p>
             <a:pPr algn="ctr"/>
             <a:r>
-              <a:rPr lang="en-US" sz="1050" dirty="0" smtClean="0"/>
+              <a:rPr lang="en-US" sz="1050" dirty="0"/>
               <a:t>Person</a:t>
             </a:r>
             <a:endParaRPr lang="en-SG" sz="1050" dirty="0"/>
@@ -3539,7 +3520,7 @@
         </p:nvSpPr>
         <p:spPr>
           <a:xfrm>
-            <a:off x="6781800" y="4036277"/>
+            <a:off x="6264398" y="4152735"/>
             <a:ext cx="929296" cy="346760"/>
           </a:xfrm>
           <a:prstGeom prst="rect">
@@ -3568,7 +3549,7 @@
           <a:p>
             <a:pPr algn="ctr"/>
             <a:r>
-              <a:rPr lang="en-US" sz="1050" dirty="0" smtClean="0"/>
+              <a:rPr lang="en-US" sz="1050" dirty="0"/>
               <a:t>Phone</a:t>
             </a:r>
             <a:endParaRPr lang="en-SG" sz="1050" dirty="0"/>
@@ -3583,7 +3564,7 @@
         </p:nvSpPr>
         <p:spPr>
           <a:xfrm>
-            <a:off x="6796454" y="4495800"/>
+            <a:off x="6279052" y="4612258"/>
             <a:ext cx="929296" cy="346760"/>
           </a:xfrm>
           <a:prstGeom prst="rect">
@@ -3612,52 +3593,8 @@
           <a:p>
             <a:pPr algn="ctr"/>
             <a:r>
-              <a:rPr lang="en-US" sz="1050" dirty="0" smtClean="0"/>
+              <a:rPr lang="en-US" sz="1050" dirty="0"/>
               <a:t>Email</a:t>
-            </a:r>
-            <a:endParaRPr lang="en-SG" sz="1050" dirty="0"/>
-          </a:p>
-        </p:txBody>
-      </p:sp>
-      <p:sp>
-        <p:nvSpPr>
-          <p:cNvPr id="22" name="Rectangle 21"/>
-          <p:cNvSpPr/>
-          <p:nvPr/>
-        </p:nvSpPr>
-        <p:spPr>
-          <a:xfrm>
-            <a:off x="6796454" y="4953000"/>
-            <a:ext cx="929296" cy="346760"/>
-          </a:xfrm>
-          <a:prstGeom prst="rect">
-            <a:avLst/>
-          </a:prstGeom>
-          <a:ln w="19050"/>
-          <a:effectLst/>
-        </p:spPr>
-        <p:style>
-          <a:lnRef idx="1">
-            <a:schemeClr val="accent4"/>
-          </a:lnRef>
-          <a:fillRef idx="2">
-            <a:schemeClr val="accent4"/>
-          </a:fillRef>
-          <a:effectRef idx="1">
-            <a:schemeClr val="accent4"/>
-          </a:effectRef>
-          <a:fontRef idx="minor">
-            <a:schemeClr val="dk1"/>
-          </a:fontRef>
-        </p:style>
-        <p:txBody>
-          <a:bodyPr rtlCol="0" anchor="ctr"/>
-          <a:lstStyle/>
-          <a:p>
-            <a:pPr algn="ctr"/>
-            <a:r>
-              <a:rPr lang="en-US" sz="1050" dirty="0" smtClean="0"/>
-              <a:t>Address</a:t>
             </a:r>
             <a:endParaRPr lang="en-SG" sz="1050" dirty="0"/>
           </a:p>
@@ -3671,7 +3608,7 @@
         </p:nvSpPr>
         <p:spPr>
           <a:xfrm>
-            <a:off x="1153227" y="4460471"/>
+            <a:off x="635825" y="4576929"/>
             <a:ext cx="929296" cy="346760"/>
           </a:xfrm>
           <a:prstGeom prst="rect">
@@ -3700,7 +3637,7 @@
           <a:p>
             <a:pPr algn="ctr"/>
             <a:r>
-              <a:rPr lang="en-US" sz="1050" dirty="0" err="1" smtClean="0"/>
+              <a:rPr lang="en-US" sz="1050" dirty="0" err="1"/>
               <a:t>StorageFile</a:t>
             </a:r>
             <a:endParaRPr lang="en-SG" sz="1050" dirty="0"/>
@@ -3715,7 +3652,7 @@
         </p:nvCxnSpPr>
         <p:spPr>
           <a:xfrm rot="5400000">
-            <a:off x="321738" y="4617731"/>
+            <a:off x="-195664" y="4734189"/>
             <a:ext cx="1047820" cy="1"/>
           </a:xfrm>
           <a:prstGeom prst="bentConnector3">
@@ -3758,7 +3695,7 @@
         </p:nvCxnSpPr>
         <p:spPr>
           <a:xfrm rot="5400000" flipH="1" flipV="1">
-            <a:off x="1053404" y="3352664"/>
+            <a:off x="536002" y="3469122"/>
             <a:ext cx="567640" cy="221152"/>
           </a:xfrm>
           <a:prstGeom prst="bentConnector2">
@@ -3797,7 +3734,7 @@
         </p:nvCxnSpPr>
         <p:spPr>
           <a:xfrm rot="16200000" flipH="1">
-            <a:off x="809847" y="4297627"/>
+            <a:off x="292445" y="4414085"/>
             <a:ext cx="530702" cy="141745"/>
           </a:xfrm>
           <a:prstGeom prst="bentConnector2">
@@ -3838,7 +3775,7 @@
         </p:nvCxnSpPr>
         <p:spPr>
           <a:xfrm flipV="1">
-            <a:off x="3230192" y="3205940"/>
+            <a:off x="2712790" y="3322398"/>
             <a:ext cx="450854" cy="712546"/>
           </a:xfrm>
           <a:prstGeom prst="bentConnector3">
@@ -3876,7 +3813,7 @@
         </p:nvCxnSpPr>
         <p:spPr>
           <a:xfrm>
-            <a:off x="3230192" y="3918486"/>
+            <a:off x="2712790" y="4034944"/>
             <a:ext cx="424477" cy="607579"/>
           </a:xfrm>
           <a:prstGeom prst="bentConnector3">
@@ -3916,7 +3853,7 @@
         </p:nvCxnSpPr>
         <p:spPr>
           <a:xfrm rot="5400000" flipH="1" flipV="1">
-            <a:off x="5197424" y="3866003"/>
+            <a:off x="4680022" y="3982461"/>
             <a:ext cx="973365" cy="12700"/>
           </a:xfrm>
           <a:prstGeom prst="bentConnector3">
@@ -3956,7 +3893,7 @@
         </p:nvCxnSpPr>
         <p:spPr>
           <a:xfrm flipV="1">
-            <a:off x="6384802" y="4209657"/>
+            <a:off x="5867400" y="4326115"/>
             <a:ext cx="396998" cy="312434"/>
           </a:xfrm>
           <a:prstGeom prst="bentConnector3">
@@ -3996,7 +3933,7 @@
         </p:nvCxnSpPr>
         <p:spPr>
           <a:xfrm>
-            <a:off x="6384802" y="4522091"/>
+            <a:off x="5867400" y="4638549"/>
             <a:ext cx="411652" cy="147089"/>
           </a:xfrm>
           <a:prstGeom prst="bentConnector3">
@@ -4029,14 +3966,14 @@
         <p:nvCxnSpPr>
           <p:cNvPr id="71" name="Elbow Connector 70"/>
           <p:cNvCxnSpPr>
+            <a:cxnSpLocks/>
             <a:stCxn id="90" idx="3"/>
-            <a:endCxn id="22" idx="1"/>
           </p:cNvCxnSpPr>
           <p:nvPr/>
         </p:nvCxnSpPr>
         <p:spPr>
           <a:xfrm>
-            <a:off x="6384802" y="4522091"/>
+            <a:off x="5867400" y="4638549"/>
             <a:ext cx="411652" cy="604289"/>
           </a:xfrm>
           <a:prstGeom prst="bentConnector3">
@@ -4073,7 +4010,7 @@
         </p:nvSpPr>
         <p:spPr>
           <a:xfrm>
-            <a:off x="5219458" y="3032560"/>
+            <a:off x="4702056" y="3149018"/>
             <a:ext cx="929296" cy="346760"/>
           </a:xfrm>
           <a:prstGeom prst="rect">
@@ -4117,7 +4054,7 @@
         </p:nvSpPr>
         <p:spPr>
           <a:xfrm>
-            <a:off x="6148754" y="4435401"/>
+            <a:off x="5631352" y="4551859"/>
             <a:ext cx="236048" cy="173380"/>
           </a:xfrm>
           <a:prstGeom prst="flowChartDecision">
@@ -4164,7 +4101,7 @@
         </p:nvSpPr>
         <p:spPr>
           <a:xfrm>
-            <a:off x="4610342" y="3131950"/>
+            <a:off x="4092940" y="3248408"/>
             <a:ext cx="236048" cy="173380"/>
           </a:xfrm>
           <a:prstGeom prst="flowChartDecision">
@@ -4205,7 +4142,7 @@
         </p:nvSpPr>
         <p:spPr>
           <a:xfrm>
-            <a:off x="4573941" y="4439375"/>
+            <a:off x="4056539" y="4555833"/>
             <a:ext cx="236048" cy="173380"/>
           </a:xfrm>
           <a:prstGeom prst="flowChartDecision">
@@ -4246,7 +4183,7 @@
         </p:nvSpPr>
         <p:spPr>
           <a:xfrm>
-            <a:off x="2994144" y="3831796"/>
+            <a:off x="2476742" y="3948254"/>
             <a:ext cx="236048" cy="173380"/>
           </a:xfrm>
           <a:prstGeom prst="flowChartDecision">
@@ -4292,7 +4229,7 @@
         </p:nvCxnSpPr>
         <p:spPr>
           <a:xfrm flipV="1">
-            <a:off x="4846390" y="3205940"/>
+            <a:off x="4328988" y="3322398"/>
             <a:ext cx="373068" cy="12700"/>
           </a:xfrm>
           <a:prstGeom prst="straightConnector1">
@@ -4330,7 +4267,7 @@
         </p:nvCxnSpPr>
         <p:spPr>
           <a:xfrm>
-            <a:off x="4809989" y="4526065"/>
+            <a:off x="4292587" y="4642523"/>
             <a:ext cx="409469" cy="0"/>
           </a:xfrm>
           <a:prstGeom prst="straightConnector1">
@@ -4368,7 +4305,7 @@
         </p:nvCxnSpPr>
         <p:spPr>
           <a:xfrm>
-            <a:off x="1691296" y="3920440"/>
+            <a:off x="1173894" y="4036898"/>
             <a:ext cx="373552" cy="0"/>
           </a:xfrm>
           <a:prstGeom prst="straightConnector1">
@@ -4406,7 +4343,7 @@
         </p:nvSpPr>
         <p:spPr>
           <a:xfrm>
-            <a:off x="2258278" y="5140408"/>
+            <a:off x="1740876" y="5256866"/>
             <a:ext cx="1408598" cy="346760"/>
           </a:xfrm>
           <a:prstGeom prst="rect">
@@ -4435,14 +4372,14 @@
           <a:p>
             <a:pPr algn="ctr"/>
             <a:r>
-              <a:rPr lang="en-US" sz="1050" dirty="0" smtClean="0"/>
+              <a:rPr lang="en-US" sz="1050" dirty="0"/>
               <a:t>&lt;&lt;interface&gt;&gt;</a:t>
             </a:r>
           </a:p>
           <a:p>
             <a:pPr algn="ctr"/>
             <a:r>
-              <a:rPr lang="en-US" sz="1050" dirty="0" err="1" smtClean="0"/>
+              <a:rPr lang="en-US" sz="1050" dirty="0" err="1"/>
               <a:t>ReadOnlyPerson</a:t>
             </a:r>
             <a:endParaRPr lang="en-SG" sz="1050" dirty="0"/>
@@ -4460,7 +4397,7 @@
         </p:nvCxnSpPr>
         <p:spPr>
           <a:xfrm flipV="1">
-            <a:off x="1691295" y="5313788"/>
+            <a:off x="1173893" y="5430246"/>
             <a:ext cx="566983" cy="1232"/>
           </a:xfrm>
           <a:prstGeom prst="bentConnector3">
@@ -4501,7 +4438,7 @@
         </p:nvSpPr>
         <p:spPr>
           <a:xfrm rot="16200000">
-            <a:off x="3619386" y="5226026"/>
+            <a:off x="3101984" y="5342484"/>
             <a:ext cx="270504" cy="175523"/>
           </a:xfrm>
           <a:prstGeom prst="triangle">
@@ -4544,7 +4481,7 @@
         </p:nvCxnSpPr>
         <p:spPr>
           <a:xfrm rot="5400000">
-            <a:off x="4456082" y="4085763"/>
+            <a:off x="3938680" y="4202221"/>
             <a:ext cx="614343" cy="1841706"/>
           </a:xfrm>
           <a:prstGeom prst="bentConnector2">
@@ -4580,7 +4517,7 @@
         </p:nvSpPr>
         <p:spPr>
           <a:xfrm>
-            <a:off x="2566828" y="1356188"/>
+            <a:off x="2049426" y="1472646"/>
             <a:ext cx="1611867" cy="444640"/>
           </a:xfrm>
           <a:prstGeom prst="rect">
@@ -4609,7 +4546,7 @@
           <a:p>
             <a:pPr algn="ctr"/>
             <a:r>
-              <a:rPr lang="en-US" sz="1050" dirty="0" smtClean="0"/>
+              <a:rPr lang="en-US" sz="1050" dirty="0"/>
               <a:t>Command</a:t>
             </a:r>
             <a:endParaRPr lang="en-SG" sz="1050" dirty="0"/>
@@ -4624,7 +4561,7 @@
         </p:nvSpPr>
         <p:spPr>
           <a:xfrm flipH="1">
-            <a:off x="4724400" y="1059080"/>
+            <a:off x="4206998" y="1175538"/>
             <a:ext cx="1404109" cy="346760"/>
           </a:xfrm>
           <a:prstGeom prst="rect">
@@ -4668,7 +4605,7 @@
         </p:nvSpPr>
         <p:spPr>
           <a:xfrm flipH="1">
-            <a:off x="4724400" y="1454067"/>
+            <a:off x="4206998" y="1570525"/>
             <a:ext cx="1404109" cy="346760"/>
           </a:xfrm>
           <a:prstGeom prst="rect">
@@ -4712,7 +4649,7 @@
         </p:nvSpPr>
         <p:spPr>
           <a:xfrm flipH="1">
-            <a:off x="4724400" y="1849054"/>
+            <a:off x="4206998" y="1965512"/>
             <a:ext cx="1404109" cy="346760"/>
           </a:xfrm>
           <a:prstGeom prst="rect">
@@ -4756,7 +4693,7 @@
         </p:nvSpPr>
         <p:spPr>
           <a:xfrm rot="16200000">
-            <a:off x="4131203" y="1571491"/>
+            <a:off x="3613801" y="1687949"/>
             <a:ext cx="270504" cy="175523"/>
           </a:xfrm>
           <a:prstGeom prst="triangle">
@@ -4799,7 +4736,7 @@
         </p:nvCxnSpPr>
         <p:spPr>
           <a:xfrm flipV="1">
-            <a:off x="4354217" y="1627447"/>
+            <a:off x="3836815" y="1743905"/>
             <a:ext cx="370183" cy="31806"/>
           </a:xfrm>
           <a:prstGeom prst="bentConnector3">
@@ -4837,7 +4774,7 @@
         </p:nvCxnSpPr>
         <p:spPr>
           <a:xfrm flipV="1">
-            <a:off x="4354217" y="1232460"/>
+            <a:off x="3836815" y="1348918"/>
             <a:ext cx="370183" cy="426793"/>
           </a:xfrm>
           <a:prstGeom prst="bentConnector3">
@@ -4875,7 +4812,7 @@
         </p:nvCxnSpPr>
         <p:spPr>
           <a:xfrm>
-            <a:off x="4354217" y="1659253"/>
+            <a:off x="3836815" y="1775711"/>
             <a:ext cx="370183" cy="363181"/>
           </a:xfrm>
           <a:prstGeom prst="bentConnector3">
@@ -4910,7 +4847,7 @@
         </p:nvSpPr>
         <p:spPr>
           <a:xfrm flipH="1">
-            <a:off x="4724400" y="2244040"/>
+            <a:off x="4206998" y="2360498"/>
             <a:ext cx="1404109" cy="346760"/>
           </a:xfrm>
           <a:prstGeom prst="rect">
@@ -4939,7 +4876,7 @@
           <a:p>
             <a:pPr algn="ctr"/>
             <a:r>
-              <a:rPr lang="en-US" sz="1050" dirty="0" smtClean="0"/>
+              <a:rPr lang="en-US" sz="1050" dirty="0"/>
               <a:t>…Command</a:t>
             </a:r>
             <a:endParaRPr lang="en-SG" sz="1050" dirty="0"/>
@@ -4957,7 +4894,7 @@
         </p:nvCxnSpPr>
         <p:spPr>
           <a:xfrm>
-            <a:off x="4354217" y="1659253"/>
+            <a:off x="3836815" y="1775711"/>
             <a:ext cx="370183" cy="758167"/>
           </a:xfrm>
           <a:prstGeom prst="bentConnector3">
@@ -4995,7 +4932,7 @@
         </p:nvCxnSpPr>
         <p:spPr>
           <a:xfrm rot="5400000" flipH="1" flipV="1">
-            <a:off x="1452229" y="1891441"/>
+            <a:off x="934827" y="2007899"/>
             <a:ext cx="1427532" cy="801666"/>
           </a:xfrm>
           <a:prstGeom prst="bentConnector2">
@@ -5031,7 +4968,7 @@
         </p:nvCxnSpPr>
         <p:spPr>
           <a:xfrm rot="5400000" flipH="1" flipV="1">
-            <a:off x="632132" y="1812364"/>
+            <a:off x="114730" y="1928822"/>
             <a:ext cx="2293164" cy="1576229"/>
           </a:xfrm>
           <a:prstGeom prst="bentConnector3">
@@ -5072,7 +5009,7 @@
         </p:nvCxnSpPr>
         <p:spPr>
           <a:xfrm rot="5400000">
-            <a:off x="1795164" y="2790743"/>
+            <a:off x="1277762" y="2907201"/>
             <a:ext cx="1889726" cy="6348"/>
           </a:xfrm>
           <a:prstGeom prst="bentConnector3">
@@ -5113,7 +5050,7 @@
         </p:nvSpPr>
         <p:spPr>
           <a:xfrm flipH="1">
-            <a:off x="1219200" y="720040"/>
+            <a:off x="701798" y="836498"/>
             <a:ext cx="1404109" cy="346760"/>
           </a:xfrm>
           <a:prstGeom prst="rect">
@@ -5160,7 +5097,7 @@
         </p:nvCxnSpPr>
         <p:spPr>
           <a:xfrm rot="16200000" flipV="1">
-            <a:off x="2766652" y="750077"/>
+            <a:off x="2249250" y="866535"/>
             <a:ext cx="462768" cy="749453"/>
           </a:xfrm>
           <a:prstGeom prst="bentConnector2">
@@ -5201,7 +5138,7 @@
         </p:nvCxnSpPr>
         <p:spPr>
           <a:xfrm rot="5400000" flipH="1" flipV="1">
-            <a:off x="-394396" y="2133468"/>
+            <a:off x="-911798" y="2249926"/>
             <a:ext cx="2853643" cy="373549"/>
           </a:xfrm>
           <a:prstGeom prst="bentConnector2">
@@ -5240,7 +5177,7 @@
         </p:nvSpPr>
         <p:spPr>
           <a:xfrm>
-            <a:off x="6781800" y="3539440"/>
+            <a:off x="6264398" y="3655898"/>
             <a:ext cx="929296" cy="346760"/>
           </a:xfrm>
           <a:prstGeom prst="rect">
@@ -5287,7 +5224,7 @@
         </p:nvCxnSpPr>
         <p:spPr>
           <a:xfrm flipV="1">
-            <a:off x="6384802" y="3712820"/>
+            <a:off x="5867400" y="3829278"/>
             <a:ext cx="396998" cy="809271"/>
           </a:xfrm>
           <a:prstGeom prst="bentConnector3">
@@ -5324,7 +5261,7 @@
         </p:nvSpPr>
         <p:spPr>
           <a:xfrm>
-            <a:off x="6384802" y="874142"/>
+            <a:off x="5867400" y="990600"/>
             <a:ext cx="929296" cy="346760"/>
           </a:xfrm>
           <a:prstGeom prst="rect">
@@ -5353,7 +5290,7 @@
           <a:p>
             <a:pPr algn="ctr"/>
             <a:r>
-              <a:rPr lang="en-US" sz="1050" dirty="0" smtClean="0"/>
+              <a:rPr lang="en-US" sz="1050" dirty="0"/>
               <a:t>Messages</a:t>
             </a:r>
             <a:endParaRPr lang="en-SG" sz="1050" dirty="0"/>
@@ -5368,7 +5305,7 @@
         </p:nvSpPr>
         <p:spPr>
           <a:xfrm>
-            <a:off x="7592520" y="874142"/>
+            <a:off x="7075118" y="990600"/>
             <a:ext cx="929296" cy="346760"/>
           </a:xfrm>
           <a:prstGeom prst="rect">
@@ -5397,7 +5334,7 @@
           <a:p>
             <a:pPr algn="ctr"/>
             <a:r>
-              <a:rPr lang="en-US" sz="1050" dirty="0" err="1" smtClean="0"/>
+              <a:rPr lang="en-US" sz="1050" dirty="0" err="1"/>
               <a:t>Utils</a:t>
             </a:r>
             <a:endParaRPr lang="en-SG" sz="1050" dirty="0"/>
@@ -5412,7 +5349,7 @@
         </p:nvSpPr>
         <p:spPr>
           <a:xfrm>
-            <a:off x="3666876" y="3710497"/>
+            <a:off x="3149474" y="3826955"/>
             <a:ext cx="929296" cy="346760"/>
           </a:xfrm>
           <a:prstGeom prst="rect">
@@ -5456,7 +5393,7 @@
         </p:nvSpPr>
         <p:spPr>
           <a:xfrm>
-            <a:off x="2356763" y="4455640"/>
+            <a:off x="1839361" y="4572098"/>
             <a:ext cx="929296" cy="346760"/>
           </a:xfrm>
           <a:prstGeom prst="rect">
@@ -5485,7 +5422,7 @@
           <a:p>
             <a:pPr algn="ctr"/>
             <a:r>
-              <a:rPr lang="en-US" sz="1050" dirty="0" smtClean="0"/>
+              <a:rPr lang="en-US" sz="1050" dirty="0"/>
               <a:t>Adapted…</a:t>
             </a:r>
             <a:endParaRPr lang="en-SG" sz="1050" dirty="0"/>
@@ -5503,7 +5440,7 @@
         </p:nvCxnSpPr>
         <p:spPr>
           <a:xfrm flipV="1">
-            <a:off x="2082523" y="4629020"/>
+            <a:off x="1565121" y="4745478"/>
             <a:ext cx="274240" cy="4831"/>
           </a:xfrm>
           <a:prstGeom prst="bentConnector3">
@@ -5544,7 +5481,7 @@
         </p:nvCxnSpPr>
         <p:spPr>
           <a:xfrm flipV="1">
-            <a:off x="6689603" y="1199445"/>
+            <a:off x="6172201" y="1315903"/>
             <a:ext cx="0" cy="304800"/>
           </a:xfrm>
           <a:prstGeom prst="straightConnector1">
@@ -5583,7 +5520,7 @@
         </p:nvCxnSpPr>
         <p:spPr>
           <a:xfrm flipV="1">
-            <a:off x="6842003" y="1199445"/>
+            <a:off x="6324601" y="1315903"/>
             <a:ext cx="0" cy="304800"/>
           </a:xfrm>
           <a:prstGeom prst="straightConnector1">
@@ -5622,7 +5559,7 @@
         </p:nvCxnSpPr>
         <p:spPr>
           <a:xfrm flipV="1">
-            <a:off x="6994403" y="1199445"/>
+            <a:off x="6477001" y="1315903"/>
             <a:ext cx="0" cy="304800"/>
           </a:xfrm>
           <a:prstGeom prst="straightConnector1">
@@ -5661,7 +5598,7 @@
         </p:nvCxnSpPr>
         <p:spPr>
           <a:xfrm flipV="1">
-            <a:off x="7864446" y="1199445"/>
+            <a:off x="7347044" y="1315903"/>
             <a:ext cx="0" cy="304800"/>
           </a:xfrm>
           <a:prstGeom prst="straightConnector1">
@@ -5700,7 +5637,7 @@
         </p:nvCxnSpPr>
         <p:spPr>
           <a:xfrm flipV="1">
-            <a:off x="8016846" y="1199445"/>
+            <a:off x="7499444" y="1315903"/>
             <a:ext cx="0" cy="304800"/>
           </a:xfrm>
           <a:prstGeom prst="straightConnector1">
@@ -5739,7 +5676,7 @@
         </p:nvCxnSpPr>
         <p:spPr>
           <a:xfrm flipV="1">
-            <a:off x="8169246" y="1199445"/>
+            <a:off x="7651844" y="1315903"/>
             <a:ext cx="0" cy="304800"/>
           </a:xfrm>
           <a:prstGeom prst="straightConnector1">
@@ -5764,6 +5701,489 @@
           </a:fillRef>
           <a:effectRef idx="1">
             <a:schemeClr val="accent2"/>
+          </a:effectRef>
+          <a:fontRef idx="minor">
+            <a:schemeClr val="dk1"/>
+          </a:fontRef>
+        </p:style>
+      </p:cxnSp>
+      <p:sp>
+        <p:nvSpPr>
+          <p:cNvPr id="80" name="Rectangle 21">
+            <a:extLst>
+              <a:ext uri="{FF2B5EF4-FFF2-40B4-BE49-F238E27FC236}">
+                <a16:creationId xmlns:a16="http://schemas.microsoft.com/office/drawing/2014/main" id="{AA934EAD-1473-4219-9A6E-F3CB35A72761}"/>
+              </a:ext>
+            </a:extLst>
+          </p:cNvPr>
+          <p:cNvSpPr/>
+          <p:nvPr/>
+        </p:nvSpPr>
+        <p:spPr>
+          <a:xfrm>
+            <a:off x="6279052" y="5065320"/>
+            <a:ext cx="929296" cy="346760"/>
+          </a:xfrm>
+          <a:prstGeom prst="rect">
+            <a:avLst/>
+          </a:prstGeom>
+          <a:ln w="19050"/>
+          <a:effectLst/>
+        </p:spPr>
+        <p:style>
+          <a:lnRef idx="1">
+            <a:schemeClr val="accent4"/>
+          </a:lnRef>
+          <a:fillRef idx="2">
+            <a:schemeClr val="accent4"/>
+          </a:fillRef>
+          <a:effectRef idx="1">
+            <a:schemeClr val="accent4"/>
+          </a:effectRef>
+          <a:fontRef idx="minor">
+            <a:schemeClr val="dk1"/>
+          </a:fontRef>
+        </p:style>
+        <p:txBody>
+          <a:bodyPr rtlCol="0" anchor="ctr"/>
+          <a:lstStyle/>
+          <a:p>
+            <a:pPr algn="ctr"/>
+            <a:r>
+              <a:rPr lang="en-US" sz="1050" dirty="0"/>
+              <a:t>Address</a:t>
+            </a:r>
+            <a:endParaRPr lang="en-SG" sz="1050" dirty="0"/>
+          </a:p>
+        </p:txBody>
+      </p:sp>
+      <p:sp>
+        <p:nvSpPr>
+          <p:cNvPr id="83" name="Rectangle 21">
+            <a:extLst>
+              <a:ext uri="{FF2B5EF4-FFF2-40B4-BE49-F238E27FC236}">
+                <a16:creationId xmlns:a16="http://schemas.microsoft.com/office/drawing/2014/main" id="{6A668E93-2848-4532-B61D-EF7F267A2766}"/>
+              </a:ext>
+            </a:extLst>
+          </p:cNvPr>
+          <p:cNvSpPr/>
+          <p:nvPr/>
+        </p:nvSpPr>
+        <p:spPr>
+          <a:xfrm>
+            <a:off x="7869808" y="5669609"/>
+            <a:ext cx="929296" cy="346760"/>
+          </a:xfrm>
+          <a:prstGeom prst="rect">
+            <a:avLst/>
+          </a:prstGeom>
+          <a:ln w="19050"/>
+          <a:effectLst/>
+        </p:spPr>
+        <p:style>
+          <a:lnRef idx="1">
+            <a:schemeClr val="accent4"/>
+          </a:lnRef>
+          <a:fillRef idx="2">
+            <a:schemeClr val="accent4"/>
+          </a:fillRef>
+          <a:effectRef idx="1">
+            <a:schemeClr val="accent4"/>
+          </a:effectRef>
+          <a:fontRef idx="minor">
+            <a:schemeClr val="dk1"/>
+          </a:fontRef>
+        </p:style>
+        <p:txBody>
+          <a:bodyPr rtlCol="0" anchor="ctr"/>
+          <a:lstStyle/>
+          <a:p>
+            <a:pPr algn="ctr"/>
+            <a:r>
+              <a:rPr lang="en-US" sz="1050" dirty="0"/>
+              <a:t>Unit</a:t>
+            </a:r>
+            <a:endParaRPr lang="en-SG" sz="1050" dirty="0"/>
+          </a:p>
+        </p:txBody>
+      </p:sp>
+      <p:cxnSp>
+        <p:nvCxnSpPr>
+          <p:cNvPr id="85" name="Elbow Connector 70">
+            <a:extLst>
+              <a:ext uri="{FF2B5EF4-FFF2-40B4-BE49-F238E27FC236}">
+                <a16:creationId xmlns:a16="http://schemas.microsoft.com/office/drawing/2014/main" id="{79AEBE50-D3E0-41D4-8D86-D82CAC284254}"/>
+              </a:ext>
+            </a:extLst>
+          </p:cNvPr>
+          <p:cNvCxnSpPr>
+            <a:stCxn id="86" idx="3"/>
+            <a:endCxn id="83" idx="1"/>
+          </p:cNvCxnSpPr>
+          <p:nvPr/>
+        </p:nvCxnSpPr>
+        <p:spPr>
+          <a:xfrm>
+            <a:off x="7458156" y="5238700"/>
+            <a:ext cx="411652" cy="604289"/>
+          </a:xfrm>
+          <a:prstGeom prst="bentConnector3">
+            <a:avLst>
+              <a:gd name="adj1" fmla="val 50000"/>
+            </a:avLst>
+          </a:prstGeom>
+          <a:ln w="19050">
+            <a:headEnd type="none" w="med" len="med"/>
+            <a:tailEnd type="arrow" w="med" len="med"/>
+          </a:ln>
+          <a:effectLst/>
+        </p:spPr>
+        <p:style>
+          <a:lnRef idx="1">
+            <a:schemeClr val="accent4"/>
+          </a:lnRef>
+          <a:fillRef idx="2">
+            <a:schemeClr val="accent4"/>
+          </a:fillRef>
+          <a:effectRef idx="1">
+            <a:schemeClr val="accent4"/>
+          </a:effectRef>
+          <a:fontRef idx="minor">
+            <a:schemeClr val="dk1"/>
+          </a:fontRef>
+        </p:style>
+      </p:cxnSp>
+      <p:sp>
+        <p:nvSpPr>
+          <p:cNvPr id="86" name="Flowchart: Decision 89">
+            <a:extLst>
+              <a:ext uri="{FF2B5EF4-FFF2-40B4-BE49-F238E27FC236}">
+                <a16:creationId xmlns:a16="http://schemas.microsoft.com/office/drawing/2014/main" id="{96645FE8-886E-4859-AFAB-64531E1C634D}"/>
+              </a:ext>
+            </a:extLst>
+          </p:cNvPr>
+          <p:cNvSpPr/>
+          <p:nvPr/>
+        </p:nvSpPr>
+        <p:spPr>
+          <a:xfrm>
+            <a:off x="7222108" y="5152010"/>
+            <a:ext cx="236048" cy="173380"/>
+          </a:xfrm>
+          <a:prstGeom prst="flowChartDecision">
+            <a:avLst/>
+          </a:prstGeom>
+          <a:solidFill>
+            <a:schemeClr val="accent4"/>
+          </a:solidFill>
+          <a:ln w="19050"/>
+          <a:effectLst/>
+        </p:spPr>
+        <p:style>
+          <a:lnRef idx="1">
+            <a:schemeClr val="accent4"/>
+          </a:lnRef>
+          <a:fillRef idx="2">
+            <a:schemeClr val="accent4"/>
+          </a:fillRef>
+          <a:effectRef idx="1">
+            <a:schemeClr val="accent4"/>
+          </a:effectRef>
+          <a:fontRef idx="minor">
+            <a:schemeClr val="dk1"/>
+          </a:fontRef>
+        </p:style>
+        <p:txBody>
+          <a:bodyPr rtlCol="0" anchor="ctr"/>
+          <a:lstStyle/>
+          <a:p>
+            <a:pPr algn="ctr"/>
+            <a:endParaRPr lang="en-US" sz="1050"/>
+          </a:p>
+        </p:txBody>
+      </p:sp>
+      <p:sp>
+        <p:nvSpPr>
+          <p:cNvPr id="88" name="Rectangle 21">
+            <a:extLst>
+              <a:ext uri="{FF2B5EF4-FFF2-40B4-BE49-F238E27FC236}">
+                <a16:creationId xmlns:a16="http://schemas.microsoft.com/office/drawing/2014/main" id="{77BEFA74-22F5-405F-BFBC-D9F351EF14EE}"/>
+              </a:ext>
+            </a:extLst>
+          </p:cNvPr>
+          <p:cNvSpPr/>
+          <p:nvPr/>
+        </p:nvSpPr>
+        <p:spPr>
+          <a:xfrm>
+            <a:off x="7869808" y="6168769"/>
+            <a:ext cx="929296" cy="346760"/>
+          </a:xfrm>
+          <a:prstGeom prst="rect">
+            <a:avLst/>
+          </a:prstGeom>
+          <a:ln w="19050"/>
+          <a:effectLst/>
+        </p:spPr>
+        <p:style>
+          <a:lnRef idx="1">
+            <a:schemeClr val="accent4"/>
+          </a:lnRef>
+          <a:fillRef idx="2">
+            <a:schemeClr val="accent4"/>
+          </a:fillRef>
+          <a:effectRef idx="1">
+            <a:schemeClr val="accent4"/>
+          </a:effectRef>
+          <a:fontRef idx="minor">
+            <a:schemeClr val="dk1"/>
+          </a:fontRef>
+        </p:style>
+        <p:txBody>
+          <a:bodyPr rtlCol="0" anchor="ctr"/>
+          <a:lstStyle/>
+          <a:p>
+            <a:pPr algn="ctr"/>
+            <a:r>
+              <a:rPr lang="en-US" sz="1050" dirty="0"/>
+              <a:t>Postal code</a:t>
+            </a:r>
+            <a:endParaRPr lang="en-SG" sz="1050" dirty="0"/>
+          </a:p>
+        </p:txBody>
+      </p:sp>
+      <p:sp>
+        <p:nvSpPr>
+          <p:cNvPr id="89" name="Rectangle 21">
+            <a:extLst>
+              <a:ext uri="{FF2B5EF4-FFF2-40B4-BE49-F238E27FC236}">
+                <a16:creationId xmlns:a16="http://schemas.microsoft.com/office/drawing/2014/main" id="{7DAB5DAD-719A-4721-B692-7AF95ED3CC2B}"/>
+              </a:ext>
+            </a:extLst>
+          </p:cNvPr>
+          <p:cNvSpPr/>
+          <p:nvPr/>
+        </p:nvSpPr>
+        <p:spPr>
+          <a:xfrm>
+            <a:off x="7869808" y="5152010"/>
+            <a:ext cx="929296" cy="346760"/>
+          </a:xfrm>
+          <a:prstGeom prst="rect">
+            <a:avLst/>
+          </a:prstGeom>
+          <a:ln w="19050"/>
+          <a:effectLst/>
+        </p:spPr>
+        <p:style>
+          <a:lnRef idx="1">
+            <a:schemeClr val="accent4"/>
+          </a:lnRef>
+          <a:fillRef idx="2">
+            <a:schemeClr val="accent4"/>
+          </a:fillRef>
+          <a:effectRef idx="1">
+            <a:schemeClr val="accent4"/>
+          </a:effectRef>
+          <a:fontRef idx="minor">
+            <a:schemeClr val="dk1"/>
+          </a:fontRef>
+        </p:style>
+        <p:txBody>
+          <a:bodyPr rtlCol="0" anchor="ctr"/>
+          <a:lstStyle/>
+          <a:p>
+            <a:pPr algn="ctr"/>
+            <a:r>
+              <a:rPr lang="en-US" sz="1050" dirty="0"/>
+              <a:t>Street</a:t>
+            </a:r>
+            <a:endParaRPr lang="en-SG" sz="1050" dirty="0"/>
+          </a:p>
+        </p:txBody>
+      </p:sp>
+      <p:sp>
+        <p:nvSpPr>
+          <p:cNvPr id="91" name="Rectangle 21">
+            <a:extLst>
+              <a:ext uri="{FF2B5EF4-FFF2-40B4-BE49-F238E27FC236}">
+                <a16:creationId xmlns:a16="http://schemas.microsoft.com/office/drawing/2014/main" id="{D5E958F0-3943-47F4-9678-11118AA5192E}"/>
+              </a:ext>
+            </a:extLst>
+          </p:cNvPr>
+          <p:cNvSpPr/>
+          <p:nvPr/>
+        </p:nvSpPr>
+        <p:spPr>
+          <a:xfrm>
+            <a:off x="7869808" y="4608120"/>
+            <a:ext cx="929296" cy="346760"/>
+          </a:xfrm>
+          <a:prstGeom prst="rect">
+            <a:avLst/>
+          </a:prstGeom>
+          <a:ln w="19050"/>
+          <a:effectLst/>
+        </p:spPr>
+        <p:style>
+          <a:lnRef idx="1">
+            <a:schemeClr val="accent4"/>
+          </a:lnRef>
+          <a:fillRef idx="2">
+            <a:schemeClr val="accent4"/>
+          </a:fillRef>
+          <a:effectRef idx="1">
+            <a:schemeClr val="accent4"/>
+          </a:effectRef>
+          <a:fontRef idx="minor">
+            <a:schemeClr val="dk1"/>
+          </a:fontRef>
+        </p:style>
+        <p:txBody>
+          <a:bodyPr rtlCol="0" anchor="ctr"/>
+          <a:lstStyle/>
+          <a:p>
+            <a:pPr algn="ctr"/>
+            <a:r>
+              <a:rPr lang="en-US" sz="1050" dirty="0"/>
+              <a:t>Block</a:t>
+            </a:r>
+            <a:endParaRPr lang="en-SG" sz="1050" dirty="0"/>
+          </a:p>
+        </p:txBody>
+      </p:sp>
+      <p:cxnSp>
+        <p:nvCxnSpPr>
+          <p:cNvPr id="94" name="Elbow Connector 70">
+            <a:extLst>
+              <a:ext uri="{FF2B5EF4-FFF2-40B4-BE49-F238E27FC236}">
+                <a16:creationId xmlns:a16="http://schemas.microsoft.com/office/drawing/2014/main" id="{84B06B44-1CDE-4C31-8844-D647A59CBBFE}"/>
+              </a:ext>
+            </a:extLst>
+          </p:cNvPr>
+          <p:cNvCxnSpPr>
+            <a:stCxn id="86" idx="3"/>
+            <a:endCxn id="91" idx="1"/>
+          </p:cNvCxnSpPr>
+          <p:nvPr/>
+        </p:nvCxnSpPr>
+        <p:spPr>
+          <a:xfrm flipV="1">
+            <a:off x="7458156" y="4781500"/>
+            <a:ext cx="411652" cy="457200"/>
+          </a:xfrm>
+          <a:prstGeom prst="bentConnector3">
+            <a:avLst>
+              <a:gd name="adj1" fmla="val 50000"/>
+            </a:avLst>
+          </a:prstGeom>
+          <a:ln w="19050">
+            <a:headEnd type="none" w="med" len="med"/>
+            <a:tailEnd type="arrow" w="med" len="med"/>
+          </a:ln>
+          <a:effectLst/>
+        </p:spPr>
+        <p:style>
+          <a:lnRef idx="1">
+            <a:schemeClr val="accent4"/>
+          </a:lnRef>
+          <a:fillRef idx="2">
+            <a:schemeClr val="accent4"/>
+          </a:fillRef>
+          <a:effectRef idx="1">
+            <a:schemeClr val="accent4"/>
+          </a:effectRef>
+          <a:fontRef idx="minor">
+            <a:schemeClr val="dk1"/>
+          </a:fontRef>
+        </p:style>
+      </p:cxnSp>
+      <p:cxnSp>
+        <p:nvCxnSpPr>
+          <p:cNvPr id="95" name="Elbow Connector 70">
+            <a:extLst>
+              <a:ext uri="{FF2B5EF4-FFF2-40B4-BE49-F238E27FC236}">
+                <a16:creationId xmlns:a16="http://schemas.microsoft.com/office/drawing/2014/main" id="{9A504C8D-11A9-47C1-AC00-1E88E0F56A06}"/>
+              </a:ext>
+            </a:extLst>
+          </p:cNvPr>
+          <p:cNvCxnSpPr>
+            <a:stCxn id="86" idx="3"/>
+            <a:endCxn id="88" idx="1"/>
+          </p:cNvCxnSpPr>
+          <p:nvPr/>
+        </p:nvCxnSpPr>
+        <p:spPr>
+          <a:xfrm>
+            <a:off x="7458156" y="5238700"/>
+            <a:ext cx="411652" cy="1103449"/>
+          </a:xfrm>
+          <a:prstGeom prst="bentConnector3">
+            <a:avLst>
+              <a:gd name="adj1" fmla="val 50000"/>
+            </a:avLst>
+          </a:prstGeom>
+          <a:ln w="19050">
+            <a:headEnd type="none" w="med" len="med"/>
+            <a:tailEnd type="arrow" w="med" len="med"/>
+          </a:ln>
+          <a:effectLst/>
+        </p:spPr>
+        <p:style>
+          <a:lnRef idx="1">
+            <a:schemeClr val="accent4"/>
+          </a:lnRef>
+          <a:fillRef idx="2">
+            <a:schemeClr val="accent4"/>
+          </a:fillRef>
+          <a:effectRef idx="1">
+            <a:schemeClr val="accent4"/>
+          </a:effectRef>
+          <a:fontRef idx="minor">
+            <a:schemeClr val="dk1"/>
+          </a:fontRef>
+        </p:style>
+      </p:cxnSp>
+      <p:cxnSp>
+        <p:nvCxnSpPr>
+          <p:cNvPr id="103" name="Elbow Connector 70">
+            <a:extLst>
+              <a:ext uri="{FF2B5EF4-FFF2-40B4-BE49-F238E27FC236}">
+                <a16:creationId xmlns:a16="http://schemas.microsoft.com/office/drawing/2014/main" id="{A733CFFD-67C4-405E-A62A-F4F790626BFD}"/>
+              </a:ext>
+            </a:extLst>
+          </p:cNvPr>
+          <p:cNvCxnSpPr>
+            <a:stCxn id="86" idx="3"/>
+            <a:endCxn id="89" idx="1"/>
+          </p:cNvCxnSpPr>
+          <p:nvPr/>
+        </p:nvCxnSpPr>
+        <p:spPr>
+          <a:xfrm>
+            <a:off x="7458156" y="5238700"/>
+            <a:ext cx="411652" cy="86690"/>
+          </a:xfrm>
+          <a:prstGeom prst="bentConnector3">
+            <a:avLst>
+              <a:gd name="adj1" fmla="val 50000"/>
+            </a:avLst>
+          </a:prstGeom>
+          <a:ln w="19050">
+            <a:headEnd type="none" w="med" len="med"/>
+            <a:tailEnd type="arrow" w="med" len="med"/>
+          </a:ln>
+          <a:effectLst/>
+        </p:spPr>
+        <p:style>
+          <a:lnRef idx="1">
+            <a:schemeClr val="accent4"/>
+          </a:lnRef>
+          <a:fillRef idx="2">
+            <a:schemeClr val="accent4"/>
+          </a:fillRef>
+          <a:effectRef idx="1">
+            <a:schemeClr val="accent4"/>
           </a:effectRef>
           <a:fontRef idx="minor">
             <a:schemeClr val="dk1"/>
@@ -5837,7 +6257,7 @@
           <a:p>
             <a:pPr algn="ctr"/>
             <a:r>
-              <a:rPr lang="en-US" sz="1050" dirty="0" smtClean="0"/>
+              <a:rPr lang="en-US" sz="1050" dirty="0"/>
               <a:t>Address</a:t>
             </a:r>
             <a:endParaRPr lang="en-SG" sz="1050" dirty="0"/>
@@ -5881,7 +6301,7 @@
           <a:p>
             <a:pPr algn="ctr"/>
             <a:r>
-              <a:rPr lang="en-US" sz="1050" dirty="0" smtClean="0"/>
+              <a:rPr lang="en-US" sz="1050" dirty="0"/>
               <a:t>Unit</a:t>
             </a:r>
             <a:endParaRPr lang="en-SG" sz="1050" dirty="0"/>
@@ -6008,7 +6428,7 @@
           <a:p>
             <a:pPr algn="ctr"/>
             <a:r>
-              <a:rPr lang="en-US" sz="1050" dirty="0" smtClean="0"/>
+              <a:rPr lang="en-US" sz="1050" dirty="0"/>
               <a:t>Postal code</a:t>
             </a:r>
             <a:endParaRPr lang="en-SG" sz="1050" dirty="0"/>
@@ -6052,7 +6472,7 @@
           <a:p>
             <a:pPr algn="ctr"/>
             <a:r>
-              <a:rPr lang="en-US" sz="1050" dirty="0" smtClean="0"/>
+              <a:rPr lang="en-US" sz="1050" dirty="0"/>
               <a:t>Street</a:t>
             </a:r>
             <a:endParaRPr lang="en-SG" sz="1050" dirty="0"/>
@@ -6096,7 +6516,7 @@
           <a:p>
             <a:pPr algn="ctr"/>
             <a:r>
-              <a:rPr lang="en-US" sz="1050" dirty="0" smtClean="0"/>
+              <a:rPr lang="en-US" sz="1050" dirty="0"/>
               <a:t>Block</a:t>
             </a:r>
             <a:endParaRPr lang="en-SG" sz="1050" dirty="0"/>
@@ -6260,10 +6680,9 @@
           <a:p>
             <a:pPr algn="ctr"/>
             <a:r>
-              <a:rPr lang="en-SG" sz="1050" dirty="0" smtClean="0"/>
+              <a:rPr lang="en-SG" sz="1050" dirty="0"/>
               <a:t>Contact</a:t>
             </a:r>
-            <a:endParaRPr lang="en-SG" sz="1050" dirty="0"/>
           </a:p>
         </p:txBody>
       </p:sp>
@@ -6304,7 +6723,7 @@
           <a:p>
             <a:pPr algn="ctr"/>
             <a:r>
-              <a:rPr lang="en-US" sz="1050" dirty="0" smtClean="0"/>
+              <a:rPr lang="en-US" sz="1050" dirty="0"/>
               <a:t>Phone</a:t>
             </a:r>
             <a:endParaRPr lang="en-SG" sz="1050" dirty="0"/>
@@ -6348,7 +6767,7 @@
           <a:p>
             <a:pPr algn="ctr"/>
             <a:r>
-              <a:rPr lang="en-US" sz="1050" dirty="0" smtClean="0"/>
+              <a:rPr lang="en-US" sz="1050" dirty="0"/>
               <a:t>Email</a:t>
             </a:r>
             <a:endParaRPr lang="en-SG" sz="1050" dirty="0"/>
@@ -6392,7 +6811,7 @@
           <a:p>
             <a:pPr algn="ctr"/>
             <a:r>
-              <a:rPr lang="en-US" sz="1050" dirty="0" smtClean="0"/>
+              <a:rPr lang="en-US" sz="1050" dirty="0"/>
               <a:t>Address</a:t>
             </a:r>
             <a:endParaRPr lang="en-SG" sz="1050" dirty="0"/>
@@ -6581,10 +7000,9 @@
           <a:p>
             <a:pPr algn="ctr"/>
             <a:r>
-              <a:rPr lang="en-SG" sz="1050" dirty="0" smtClean="0"/>
+              <a:rPr lang="en-SG" sz="1050" dirty="0"/>
               <a:t>&lt;&lt;interface&gt;&gt; Printable</a:t>
             </a:r>
-            <a:endParaRPr lang="en-SG" sz="1050" dirty="0"/>
           </a:p>
         </p:txBody>
       </p:sp>
@@ -6625,7 +7043,7 @@
           <a:p>
             <a:pPr algn="ctr"/>
             <a:r>
-              <a:rPr lang="en-US" sz="1050" dirty="0" smtClean="0"/>
+              <a:rPr lang="en-US" sz="1050" dirty="0"/>
               <a:t>Phone</a:t>
             </a:r>
             <a:endParaRPr lang="en-SG" sz="1050" dirty="0"/>
@@ -6669,7 +7087,7 @@
           <a:p>
             <a:pPr algn="ctr"/>
             <a:r>
-              <a:rPr lang="en-US" sz="1050" dirty="0" smtClean="0"/>
+              <a:rPr lang="en-US" sz="1050" dirty="0"/>
               <a:t>Email</a:t>
             </a:r>
             <a:endParaRPr lang="en-SG" sz="1050" dirty="0"/>
@@ -6713,7 +7131,7 @@
           <a:p>
             <a:pPr algn="ctr"/>
             <a:r>
-              <a:rPr lang="en-US" sz="1050" dirty="0" smtClean="0"/>
+              <a:rPr lang="en-US" sz="1050" dirty="0"/>
               <a:t>Address</a:t>
             </a:r>
             <a:endParaRPr lang="en-SG" sz="1050" dirty="0"/>
@@ -6914,7 +7332,7 @@
           <a:p>
             <a:pPr algn="ctr"/>
             <a:r>
-              <a:rPr lang="en-US" sz="1050" dirty="0" smtClean="0"/>
+              <a:rPr lang="en-US" sz="1050" dirty="0"/>
               <a:t>Name</a:t>
             </a:r>
             <a:endParaRPr lang="en-SG" sz="1050" dirty="0"/>
@@ -7037,15 +7455,15 @@
           <a:p>
             <a:pPr algn="ctr"/>
             <a:r>
-              <a:rPr lang="en-US" sz="1050" dirty="0" smtClean="0"/>
+              <a:rPr lang="en-US" sz="1050" dirty="0"/>
               <a:t>+ </a:t>
             </a:r>
             <a:r>
-              <a:rPr lang="en-US" sz="1050" dirty="0" err="1" smtClean="0"/>
+              <a:rPr lang="en-US" sz="1050" dirty="0" err="1"/>
               <a:t>getPrintableString</a:t>
             </a:r>
             <a:r>
-              <a:rPr lang="en-US" sz="1050" dirty="0" smtClean="0"/>
+              <a:rPr lang="en-US" sz="1050" dirty="0"/>
               <a:t>(): String</a:t>
             </a:r>
             <a:endParaRPr lang="en-SG" sz="1050" dirty="0"/>
@@ -7133,14 +7551,14 @@
           <a:p>
             <a:pPr algn="ctr"/>
             <a:r>
-              <a:rPr lang="en-US" sz="1050" dirty="0" smtClean="0"/>
+              <a:rPr lang="en-US" sz="1050" dirty="0"/>
               <a:t>Unique</a:t>
             </a:r>
             <a:br>
-              <a:rPr lang="en-US" sz="1050" dirty="0" smtClean="0"/>
+              <a:rPr lang="en-US" sz="1050" dirty="0"/>
             </a:br>
             <a:r>
-              <a:rPr lang="en-US" sz="1050" dirty="0" err="1" smtClean="0"/>
+              <a:rPr lang="en-US" sz="1050" dirty="0" err="1"/>
               <a:t>TagList</a:t>
             </a:r>
             <a:endParaRPr lang="en-SG" sz="1050" dirty="0"/>
@@ -7184,14 +7602,14 @@
           <a:p>
             <a:pPr algn="ctr"/>
             <a:r>
-              <a:rPr lang="en-US" sz="1050" dirty="0" smtClean="0"/>
+              <a:rPr lang="en-US" sz="1050" dirty="0"/>
               <a:t>Unique</a:t>
             </a:r>
             <a:br>
-              <a:rPr lang="en-US" sz="1050" dirty="0" smtClean="0"/>
+              <a:rPr lang="en-US" sz="1050" dirty="0"/>
             </a:br>
             <a:r>
-              <a:rPr lang="en-US" sz="1050" dirty="0" err="1" smtClean="0"/>
+              <a:rPr lang="en-US" sz="1050" dirty="0" err="1"/>
               <a:t>PersonList</a:t>
             </a:r>
             <a:endParaRPr lang="en-SG" sz="1050" dirty="0"/>
@@ -7235,7 +7653,7 @@
           <a:p>
             <a:pPr algn="ctr"/>
             <a:r>
-              <a:rPr lang="en-US" sz="1050" dirty="0" smtClean="0"/>
+              <a:rPr lang="en-US" sz="1050" dirty="0"/>
               <a:t>Person</a:t>
             </a:r>
             <a:endParaRPr lang="en-SG" sz="1050" dirty="0"/>
@@ -7602,7 +8020,7 @@
           <a:p>
             <a:pPr algn="ctr"/>
             <a:r>
-              <a:rPr lang="en-US" sz="1050" dirty="0" smtClean="0"/>
+              <a:rPr lang="en-US" sz="1050" dirty="0"/>
               <a:t>Tagging</a:t>
             </a:r>
             <a:endParaRPr lang="en-SG" sz="1050" dirty="0"/>
@@ -7746,7 +8164,7 @@
           <a:lstStyle/>
           <a:p>
             <a:r>
-              <a:rPr lang="en-US" dirty="0" smtClean="0">
+              <a:rPr lang="en-US" dirty="0">
                 <a:solidFill>
                   <a:schemeClr val="accent6">
                     <a:lumMod val="75000"/>
@@ -7755,13 +8173,6 @@
               </a:rPr>
               <a:t>*</a:t>
             </a:r>
-            <a:endParaRPr lang="en-US" dirty="0">
-              <a:solidFill>
-                <a:schemeClr val="accent6">
-                  <a:lumMod val="75000"/>
-                </a:schemeClr>
-              </a:solidFill>
-            </a:endParaRPr>
           </a:p>
         </p:txBody>
       </p:sp>
@@ -7788,7 +8199,7 @@
           <a:lstStyle/>
           <a:p>
             <a:r>
-              <a:rPr lang="en-US" sz="1100" dirty="0" err="1" smtClean="0">
+              <a:rPr lang="en-US" sz="1100" dirty="0" err="1">
                 <a:solidFill>
                   <a:schemeClr val="accent6">
                     <a:lumMod val="75000"/>
@@ -7918,14 +8329,14 @@
           <a:p>
             <a:pPr algn="ctr"/>
             <a:r>
-              <a:rPr lang="en-US" sz="1050" dirty="0" smtClean="0"/>
+              <a:rPr lang="en-US" sz="1050" dirty="0"/>
               <a:t>Unique</a:t>
             </a:r>
             <a:br>
-              <a:rPr lang="en-US" sz="1050" dirty="0" smtClean="0"/>
+              <a:rPr lang="en-US" sz="1050" dirty="0"/>
             </a:br>
             <a:r>
-              <a:rPr lang="en-US" sz="1050" dirty="0" err="1" smtClean="0"/>
+              <a:rPr lang="en-US" sz="1050" dirty="0" err="1"/>
               <a:t>TagList</a:t>
             </a:r>
             <a:endParaRPr lang="en-SG" sz="1050" dirty="0"/>
@@ -7969,14 +8380,14 @@
           <a:p>
             <a:pPr algn="ctr"/>
             <a:r>
-              <a:rPr lang="en-US" sz="1050" dirty="0" smtClean="0"/>
+              <a:rPr lang="en-US" sz="1050" dirty="0"/>
               <a:t>Unique</a:t>
             </a:r>
             <a:br>
-              <a:rPr lang="en-US" sz="1050" dirty="0" smtClean="0"/>
+              <a:rPr lang="en-US" sz="1050" dirty="0"/>
             </a:br>
             <a:r>
-              <a:rPr lang="en-US" sz="1050" dirty="0" err="1" smtClean="0"/>
+              <a:rPr lang="en-US" sz="1050" dirty="0" err="1"/>
               <a:t>PersonList</a:t>
             </a:r>
             <a:endParaRPr lang="en-SG" sz="1050" dirty="0"/>
@@ -8020,7 +8431,7 @@
           <a:p>
             <a:pPr algn="ctr"/>
             <a:r>
-              <a:rPr lang="en-US" sz="1050" dirty="0" smtClean="0"/>
+              <a:rPr lang="en-US" sz="1050" dirty="0"/>
               <a:t>Person</a:t>
             </a:r>
             <a:endParaRPr lang="en-SG" sz="1050" dirty="0"/>
@@ -8387,7 +8798,7 @@
           <a:p>
             <a:pPr algn="ctr"/>
             <a:r>
-              <a:rPr lang="en-US" sz="1050" dirty="0" smtClean="0"/>
+              <a:rPr lang="en-US" sz="1050" dirty="0"/>
               <a:t>Tagging</a:t>
             </a:r>
             <a:endParaRPr lang="en-SG" sz="1050" dirty="0"/>
@@ -8493,7 +8904,7 @@
           <a:lstStyle/>
           <a:p>
             <a:r>
-              <a:rPr lang="en-US" dirty="0" smtClean="0">
+              <a:rPr lang="en-US" dirty="0">
                 <a:solidFill>
                   <a:schemeClr val="accent6">
                     <a:lumMod val="75000"/>
@@ -8502,13 +8913,6 @@
               </a:rPr>
               <a:t>*</a:t>
             </a:r>
-            <a:endParaRPr lang="en-US" dirty="0">
-              <a:solidFill>
-                <a:schemeClr val="accent6">
-                  <a:lumMod val="75000"/>
-                </a:schemeClr>
-              </a:solidFill>
-            </a:endParaRPr>
           </a:p>
         </p:txBody>
       </p:sp>
@@ -8617,7 +9021,7 @@
           <a:lstStyle/>
           <a:p>
             <a:r>
-              <a:rPr lang="en-US" sz="1100" dirty="0" err="1" smtClean="0">
+              <a:rPr lang="en-US" sz="1100" dirty="0" err="1">
                 <a:solidFill>
                   <a:schemeClr val="accent6">
                     <a:lumMod val="75000"/>

</xml_diff>

<commit_message>
Update class diagram to include AddressComponent interface
</commit_message>
<xml_diff>
--- a/doc/Diagrams.pptx
+++ b/doc/Diagrams.pptx
@@ -4,6 +4,9 @@
   <p:sldMasterIdLst>
     <p:sldMasterId id="2147483648" r:id="rId1"/>
   </p:sldMasterIdLst>
+  <p:notesMasterIdLst>
+    <p:notesMasterId r:id="rId6"/>
+  </p:notesMasterIdLst>
   <p:sldIdLst>
     <p:sldId id="256" r:id="rId2"/>
     <p:sldId id="257" r:id="rId3"/>
@@ -130,6 +133,440 @@
 <p1510:revInfo xmlns:a="http://schemas.openxmlformats.org/drawingml/2006/main" xmlns:r="http://schemas.openxmlformats.org/officeDocument/2006/relationships" xmlns:p1510="http://schemas.microsoft.com/office/powerpoint/2015/10/main"/>
 </file>
 
+<file path=ppt/notesMasters/notesMaster1.xml><?xml version="1.0" encoding="utf-8"?>
+<p:notesMaster xmlns:a="http://schemas.openxmlformats.org/drawingml/2006/main" xmlns:r="http://schemas.openxmlformats.org/officeDocument/2006/relationships" xmlns:p="http://schemas.openxmlformats.org/presentationml/2006/main">
+  <p:cSld>
+    <p:bg>
+      <p:bgRef idx="1001">
+        <a:schemeClr val="bg1"/>
+      </p:bgRef>
+    </p:bg>
+    <p:spTree>
+      <p:nvGrpSpPr>
+        <p:cNvPr id="1" name=""/>
+        <p:cNvGrpSpPr/>
+        <p:nvPr/>
+      </p:nvGrpSpPr>
+      <p:grpSpPr>
+        <a:xfrm>
+          <a:off x="0" y="0"/>
+          <a:ext cx="0" cy="0"/>
+          <a:chOff x="0" y="0"/>
+          <a:chExt cx="0" cy="0"/>
+        </a:xfrm>
+      </p:grpSpPr>
+      <p:sp>
+        <p:nvSpPr>
+          <p:cNvPr id="2" name="页眉占位符 1"/>
+          <p:cNvSpPr>
+            <a:spLocks noGrp="1"/>
+          </p:cNvSpPr>
+          <p:nvPr>
+            <p:ph type="hdr" sz="quarter"/>
+          </p:nvPr>
+        </p:nvSpPr>
+        <p:spPr>
+          <a:xfrm>
+            <a:off x="0" y="0"/>
+            <a:ext cx="2971800" cy="458788"/>
+          </a:xfrm>
+          <a:prstGeom prst="rect">
+            <a:avLst/>
+          </a:prstGeom>
+        </p:spPr>
+        <p:txBody>
+          <a:bodyPr vert="horz" lIns="91440" tIns="45720" rIns="91440" bIns="45720" rtlCol="0"/>
+          <a:lstStyle>
+            <a:lvl1pPr algn="l">
+              <a:defRPr sz="1200"/>
+            </a:lvl1pPr>
+          </a:lstStyle>
+          <a:p>
+            <a:endParaRPr lang="zh-SG" altLang="en-US"/>
+          </a:p>
+        </p:txBody>
+      </p:sp>
+      <p:sp>
+        <p:nvSpPr>
+          <p:cNvPr id="3" name="日期占位符 2"/>
+          <p:cNvSpPr>
+            <a:spLocks noGrp="1"/>
+          </p:cNvSpPr>
+          <p:nvPr>
+            <p:ph type="dt" idx="1"/>
+          </p:nvPr>
+        </p:nvSpPr>
+        <p:spPr>
+          <a:xfrm>
+            <a:off x="3884613" y="0"/>
+            <a:ext cx="2971800" cy="458788"/>
+          </a:xfrm>
+          <a:prstGeom prst="rect">
+            <a:avLst/>
+          </a:prstGeom>
+        </p:spPr>
+        <p:txBody>
+          <a:bodyPr vert="horz" lIns="91440" tIns="45720" rIns="91440" bIns="45720" rtlCol="0"/>
+          <a:lstStyle>
+            <a:lvl1pPr algn="r">
+              <a:defRPr sz="1200"/>
+            </a:lvl1pPr>
+          </a:lstStyle>
+          <a:p>
+            <a:fld id="{F14F6701-F133-448E-A9EE-1722DA25EF93}" type="datetimeFigureOut">
+              <a:rPr lang="zh-SG" altLang="en-US" smtClean="0"/>
+              <a:t>2017/09/07</a:t>
+            </a:fld>
+            <a:endParaRPr lang="zh-SG" altLang="en-US"/>
+          </a:p>
+        </p:txBody>
+      </p:sp>
+      <p:sp>
+        <p:nvSpPr>
+          <p:cNvPr id="4" name="幻灯片图像占位符 3"/>
+          <p:cNvSpPr>
+            <a:spLocks noGrp="1" noRot="1" noChangeAspect="1"/>
+          </p:cNvSpPr>
+          <p:nvPr>
+            <p:ph type="sldImg" idx="2"/>
+          </p:nvPr>
+        </p:nvSpPr>
+        <p:spPr>
+          <a:xfrm>
+            <a:off x="1371600" y="1143000"/>
+            <a:ext cx="4114800" cy="3086100"/>
+          </a:xfrm>
+          <a:prstGeom prst="rect">
+            <a:avLst/>
+          </a:prstGeom>
+          <a:noFill/>
+          <a:ln w="12700">
+            <a:solidFill>
+              <a:prstClr val="black"/>
+            </a:solidFill>
+          </a:ln>
+        </p:spPr>
+        <p:txBody>
+          <a:bodyPr vert="horz" lIns="91440" tIns="45720" rIns="91440" bIns="45720" rtlCol="0" anchor="ctr"/>
+          <a:lstStyle/>
+          <a:p>
+            <a:endParaRPr lang="zh-SG" altLang="en-US"/>
+          </a:p>
+        </p:txBody>
+      </p:sp>
+      <p:sp>
+        <p:nvSpPr>
+          <p:cNvPr id="5" name="备注占位符 4"/>
+          <p:cNvSpPr>
+            <a:spLocks noGrp="1"/>
+          </p:cNvSpPr>
+          <p:nvPr>
+            <p:ph type="body" sz="quarter" idx="3"/>
+          </p:nvPr>
+        </p:nvSpPr>
+        <p:spPr>
+          <a:xfrm>
+            <a:off x="685800" y="4400550"/>
+            <a:ext cx="5486400" cy="3600450"/>
+          </a:xfrm>
+          <a:prstGeom prst="rect">
+            <a:avLst/>
+          </a:prstGeom>
+        </p:spPr>
+        <p:txBody>
+          <a:bodyPr vert="horz" lIns="91440" tIns="45720" rIns="91440" bIns="45720" rtlCol="0"/>
+          <a:lstStyle/>
+          <a:p>
+            <a:pPr lvl="0"/>
+            <a:r>
+              <a:rPr lang="zh-CN" altLang="en-US"/>
+              <a:t>编辑母版文本样式</a:t>
+            </a:r>
+          </a:p>
+          <a:p>
+            <a:pPr lvl="1"/>
+            <a:r>
+              <a:rPr lang="zh-CN" altLang="en-US"/>
+              <a:t>第二级</a:t>
+            </a:r>
+          </a:p>
+          <a:p>
+            <a:pPr lvl="2"/>
+            <a:r>
+              <a:rPr lang="zh-CN" altLang="en-US"/>
+              <a:t>第三级</a:t>
+            </a:r>
+          </a:p>
+          <a:p>
+            <a:pPr lvl="3"/>
+            <a:r>
+              <a:rPr lang="zh-CN" altLang="en-US"/>
+              <a:t>第四级</a:t>
+            </a:r>
+          </a:p>
+          <a:p>
+            <a:pPr lvl="4"/>
+            <a:r>
+              <a:rPr lang="zh-CN" altLang="en-US"/>
+              <a:t>第五级</a:t>
+            </a:r>
+            <a:endParaRPr lang="zh-SG" altLang="en-US"/>
+          </a:p>
+        </p:txBody>
+      </p:sp>
+      <p:sp>
+        <p:nvSpPr>
+          <p:cNvPr id="6" name="页脚占位符 5"/>
+          <p:cNvSpPr>
+            <a:spLocks noGrp="1"/>
+          </p:cNvSpPr>
+          <p:nvPr>
+            <p:ph type="ftr" sz="quarter" idx="4"/>
+          </p:nvPr>
+        </p:nvSpPr>
+        <p:spPr>
+          <a:xfrm>
+            <a:off x="0" y="8685213"/>
+            <a:ext cx="2971800" cy="458787"/>
+          </a:xfrm>
+          <a:prstGeom prst="rect">
+            <a:avLst/>
+          </a:prstGeom>
+        </p:spPr>
+        <p:txBody>
+          <a:bodyPr vert="horz" lIns="91440" tIns="45720" rIns="91440" bIns="45720" rtlCol="0" anchor="b"/>
+          <a:lstStyle>
+            <a:lvl1pPr algn="l">
+              <a:defRPr sz="1200"/>
+            </a:lvl1pPr>
+          </a:lstStyle>
+          <a:p>
+            <a:endParaRPr lang="zh-SG" altLang="en-US"/>
+          </a:p>
+        </p:txBody>
+      </p:sp>
+      <p:sp>
+        <p:nvSpPr>
+          <p:cNvPr id="7" name="灯片编号占位符 6"/>
+          <p:cNvSpPr>
+            <a:spLocks noGrp="1"/>
+          </p:cNvSpPr>
+          <p:nvPr>
+            <p:ph type="sldNum" sz="quarter" idx="5"/>
+          </p:nvPr>
+        </p:nvSpPr>
+        <p:spPr>
+          <a:xfrm>
+            <a:off x="3884613" y="8685213"/>
+            <a:ext cx="2971800" cy="458787"/>
+          </a:xfrm>
+          <a:prstGeom prst="rect">
+            <a:avLst/>
+          </a:prstGeom>
+        </p:spPr>
+        <p:txBody>
+          <a:bodyPr vert="horz" lIns="91440" tIns="45720" rIns="91440" bIns="45720" rtlCol="0" anchor="b"/>
+          <a:lstStyle>
+            <a:lvl1pPr algn="r">
+              <a:defRPr sz="1200"/>
+            </a:lvl1pPr>
+          </a:lstStyle>
+          <a:p>
+            <a:fld id="{C16AB676-1CE6-47D3-A9B3-43E4E7701AAD}" type="slidenum">
+              <a:rPr lang="zh-SG" altLang="en-US" smtClean="0"/>
+              <a:t>‹#›</a:t>
+            </a:fld>
+            <a:endParaRPr lang="zh-SG" altLang="en-US"/>
+          </a:p>
+        </p:txBody>
+      </p:sp>
+    </p:spTree>
+    <p:extLst>
+      <p:ext uri="{BB962C8B-B14F-4D97-AF65-F5344CB8AC3E}">
+        <p14:creationId xmlns:p14="http://schemas.microsoft.com/office/powerpoint/2010/main" val="744683554"/>
+      </p:ext>
+    </p:extLst>
+  </p:cSld>
+  <p:clrMap bg1="lt1" tx1="dk1" bg2="lt2" tx2="dk2" accent1="accent1" accent2="accent2" accent3="accent3" accent4="accent4" accent5="accent5" accent6="accent6" hlink="hlink" folHlink="folHlink"/>
+  <p:notesStyle>
+    <a:lvl1pPr marL="0" algn="l" defTabSz="914400" rtl="0" eaLnBrk="1" latinLnBrk="0" hangingPunct="1">
+      <a:defRPr sz="1200" kern="1200">
+        <a:solidFill>
+          <a:schemeClr val="tx1"/>
+        </a:solidFill>
+        <a:latin typeface="+mn-lt"/>
+        <a:ea typeface="+mn-ea"/>
+        <a:cs typeface="+mn-cs"/>
+      </a:defRPr>
+    </a:lvl1pPr>
+    <a:lvl2pPr marL="457200" algn="l" defTabSz="914400" rtl="0" eaLnBrk="1" latinLnBrk="0" hangingPunct="1">
+      <a:defRPr sz="1200" kern="1200">
+        <a:solidFill>
+          <a:schemeClr val="tx1"/>
+        </a:solidFill>
+        <a:latin typeface="+mn-lt"/>
+        <a:ea typeface="+mn-ea"/>
+        <a:cs typeface="+mn-cs"/>
+      </a:defRPr>
+    </a:lvl2pPr>
+    <a:lvl3pPr marL="914400" algn="l" defTabSz="914400" rtl="0" eaLnBrk="1" latinLnBrk="0" hangingPunct="1">
+      <a:defRPr sz="1200" kern="1200">
+        <a:solidFill>
+          <a:schemeClr val="tx1"/>
+        </a:solidFill>
+        <a:latin typeface="+mn-lt"/>
+        <a:ea typeface="+mn-ea"/>
+        <a:cs typeface="+mn-cs"/>
+      </a:defRPr>
+    </a:lvl3pPr>
+    <a:lvl4pPr marL="1371600" algn="l" defTabSz="914400" rtl="0" eaLnBrk="1" latinLnBrk="0" hangingPunct="1">
+      <a:defRPr sz="1200" kern="1200">
+        <a:solidFill>
+          <a:schemeClr val="tx1"/>
+        </a:solidFill>
+        <a:latin typeface="+mn-lt"/>
+        <a:ea typeface="+mn-ea"/>
+        <a:cs typeface="+mn-cs"/>
+      </a:defRPr>
+    </a:lvl4pPr>
+    <a:lvl5pPr marL="1828800" algn="l" defTabSz="914400" rtl="0" eaLnBrk="1" latinLnBrk="0" hangingPunct="1">
+      <a:defRPr sz="1200" kern="1200">
+        <a:solidFill>
+          <a:schemeClr val="tx1"/>
+        </a:solidFill>
+        <a:latin typeface="+mn-lt"/>
+        <a:ea typeface="+mn-ea"/>
+        <a:cs typeface="+mn-cs"/>
+      </a:defRPr>
+    </a:lvl5pPr>
+    <a:lvl6pPr marL="2286000" algn="l" defTabSz="914400" rtl="0" eaLnBrk="1" latinLnBrk="0" hangingPunct="1">
+      <a:defRPr sz="1200" kern="1200">
+        <a:solidFill>
+          <a:schemeClr val="tx1"/>
+        </a:solidFill>
+        <a:latin typeface="+mn-lt"/>
+        <a:ea typeface="+mn-ea"/>
+        <a:cs typeface="+mn-cs"/>
+      </a:defRPr>
+    </a:lvl6pPr>
+    <a:lvl7pPr marL="2743200" algn="l" defTabSz="914400" rtl="0" eaLnBrk="1" latinLnBrk="0" hangingPunct="1">
+      <a:defRPr sz="1200" kern="1200">
+        <a:solidFill>
+          <a:schemeClr val="tx1"/>
+        </a:solidFill>
+        <a:latin typeface="+mn-lt"/>
+        <a:ea typeface="+mn-ea"/>
+        <a:cs typeface="+mn-cs"/>
+      </a:defRPr>
+    </a:lvl7pPr>
+    <a:lvl8pPr marL="3200400" algn="l" defTabSz="914400" rtl="0" eaLnBrk="1" latinLnBrk="0" hangingPunct="1">
+      <a:defRPr sz="1200" kern="1200">
+        <a:solidFill>
+          <a:schemeClr val="tx1"/>
+        </a:solidFill>
+        <a:latin typeface="+mn-lt"/>
+        <a:ea typeface="+mn-ea"/>
+        <a:cs typeface="+mn-cs"/>
+      </a:defRPr>
+    </a:lvl8pPr>
+    <a:lvl9pPr marL="3657600" algn="l" defTabSz="914400" rtl="0" eaLnBrk="1" latinLnBrk="0" hangingPunct="1">
+      <a:defRPr sz="1200" kern="1200">
+        <a:solidFill>
+          <a:schemeClr val="tx1"/>
+        </a:solidFill>
+        <a:latin typeface="+mn-lt"/>
+        <a:ea typeface="+mn-ea"/>
+        <a:cs typeface="+mn-cs"/>
+      </a:defRPr>
+    </a:lvl9pPr>
+  </p:notesStyle>
+</p:notesMaster>
+</file>
+
+<file path=ppt/notesSlides/notesSlide1.xml><?xml version="1.0" encoding="utf-8"?>
+<p:notes xmlns:a="http://schemas.openxmlformats.org/drawingml/2006/main" xmlns:r="http://schemas.openxmlformats.org/officeDocument/2006/relationships" xmlns:p="http://schemas.openxmlformats.org/presentationml/2006/main">
+  <p:cSld>
+    <p:spTree>
+      <p:nvGrpSpPr>
+        <p:cNvPr id="1" name=""/>
+        <p:cNvGrpSpPr/>
+        <p:nvPr/>
+      </p:nvGrpSpPr>
+      <p:grpSpPr>
+        <a:xfrm>
+          <a:off x="0" y="0"/>
+          <a:ext cx="0" cy="0"/>
+          <a:chOff x="0" y="0"/>
+          <a:chExt cx="0" cy="0"/>
+        </a:xfrm>
+      </p:grpSpPr>
+      <p:sp>
+        <p:nvSpPr>
+          <p:cNvPr id="2" name="幻灯片图像占位符 1"/>
+          <p:cNvSpPr>
+            <a:spLocks noGrp="1" noRot="1" noChangeAspect="1"/>
+          </p:cNvSpPr>
+          <p:nvPr>
+            <p:ph type="sldImg"/>
+          </p:nvPr>
+        </p:nvSpPr>
+        <p:spPr/>
+      </p:sp>
+      <p:sp>
+        <p:nvSpPr>
+          <p:cNvPr id="3" name="备注占位符 2"/>
+          <p:cNvSpPr>
+            <a:spLocks noGrp="1"/>
+          </p:cNvSpPr>
+          <p:nvPr>
+            <p:ph type="body" idx="1"/>
+          </p:nvPr>
+        </p:nvSpPr>
+        <p:spPr/>
+        <p:txBody>
+          <a:bodyPr/>
+          <a:lstStyle/>
+          <a:p>
+            <a:endParaRPr lang="zh-SG" altLang="en-US" dirty="0"/>
+          </a:p>
+        </p:txBody>
+      </p:sp>
+      <p:sp>
+        <p:nvSpPr>
+          <p:cNvPr id="4" name="灯片编号占位符 3"/>
+          <p:cNvSpPr>
+            <a:spLocks noGrp="1"/>
+          </p:cNvSpPr>
+          <p:nvPr>
+            <p:ph type="sldNum" sz="quarter" idx="10"/>
+          </p:nvPr>
+        </p:nvSpPr>
+        <p:spPr/>
+        <p:txBody>
+          <a:bodyPr/>
+          <a:lstStyle/>
+          <a:p>
+            <a:fld id="{C16AB676-1CE6-47D3-A9B3-43E4E7701AAD}" type="slidenum">
+              <a:rPr lang="zh-SG" altLang="en-US" smtClean="0"/>
+              <a:t>2</a:t>
+            </a:fld>
+            <a:endParaRPr lang="zh-SG" altLang="en-US"/>
+          </a:p>
+        </p:txBody>
+      </p:sp>
+    </p:spTree>
+    <p:extLst>
+      <p:ext uri="{BB962C8B-B14F-4D97-AF65-F5344CB8AC3E}">
+        <p14:creationId xmlns:p14="http://schemas.microsoft.com/office/powerpoint/2010/main" val="382226872"/>
+      </p:ext>
+    </p:extLst>
+  </p:cSld>
+  <p:clrMapOvr>
+    <a:masterClrMapping/>
+  </p:clrMapOvr>
+</p:notes>
+</file>
+
 <file path=ppt/slideLayouts/slideLayout1.xml><?xml version="1.0" encoding="utf-8"?>
 <p:sldLayout xmlns:a="http://schemas.openxmlformats.org/drawingml/2006/main" xmlns:r="http://schemas.openxmlformats.org/officeDocument/2006/relationships" xmlns:p="http://schemas.openxmlformats.org/presentationml/2006/main" type="title" preserve="1">
   <p:cSld name="Title Slide">
@@ -309,7 +746,7 @@
           <a:p>
             <a:fld id="{78C97017-6FC3-485B-9764-EAC9E56C1D49}" type="datetimeFigureOut">
               <a:rPr lang="en-US" smtClean="0"/>
-              <a:t>9/3/2017</a:t>
+              <a:t>9/7/2017</a:t>
             </a:fld>
             <a:endParaRPr lang="en-US"/>
           </a:p>
@@ -477,7 +914,7 @@
           <a:p>
             <a:fld id="{78C97017-6FC3-485B-9764-EAC9E56C1D49}" type="datetimeFigureOut">
               <a:rPr lang="en-US" smtClean="0"/>
-              <a:t>9/3/2017</a:t>
+              <a:t>9/7/2017</a:t>
             </a:fld>
             <a:endParaRPr lang="en-US"/>
           </a:p>
@@ -655,7 +1092,7 @@
           <a:p>
             <a:fld id="{78C97017-6FC3-485B-9764-EAC9E56C1D49}" type="datetimeFigureOut">
               <a:rPr lang="en-US" smtClean="0"/>
-              <a:t>9/3/2017</a:t>
+              <a:t>9/7/2017</a:t>
             </a:fld>
             <a:endParaRPr lang="en-US"/>
           </a:p>
@@ -823,7 +1260,7 @@
           <a:p>
             <a:fld id="{78C97017-6FC3-485B-9764-EAC9E56C1D49}" type="datetimeFigureOut">
               <a:rPr lang="en-US" smtClean="0"/>
-              <a:t>9/3/2017</a:t>
+              <a:t>9/7/2017</a:t>
             </a:fld>
             <a:endParaRPr lang="en-US"/>
           </a:p>
@@ -1068,7 +1505,7 @@
           <a:p>
             <a:fld id="{78C97017-6FC3-485B-9764-EAC9E56C1D49}" type="datetimeFigureOut">
               <a:rPr lang="en-US" smtClean="0"/>
-              <a:t>9/3/2017</a:t>
+              <a:t>9/7/2017</a:t>
             </a:fld>
             <a:endParaRPr lang="en-US"/>
           </a:p>
@@ -1353,7 +1790,7 @@
           <a:p>
             <a:fld id="{78C97017-6FC3-485B-9764-EAC9E56C1D49}" type="datetimeFigureOut">
               <a:rPr lang="en-US" smtClean="0"/>
-              <a:t>9/3/2017</a:t>
+              <a:t>9/7/2017</a:t>
             </a:fld>
             <a:endParaRPr lang="en-US"/>
           </a:p>
@@ -1772,7 +2209,7 @@
           <a:p>
             <a:fld id="{78C97017-6FC3-485B-9764-EAC9E56C1D49}" type="datetimeFigureOut">
               <a:rPr lang="en-US" smtClean="0"/>
-              <a:t>9/3/2017</a:t>
+              <a:t>9/7/2017</a:t>
             </a:fld>
             <a:endParaRPr lang="en-US"/>
           </a:p>
@@ -1889,7 +2326,7 @@
           <a:p>
             <a:fld id="{78C97017-6FC3-485B-9764-EAC9E56C1D49}" type="datetimeFigureOut">
               <a:rPr lang="en-US" smtClean="0"/>
-              <a:t>9/3/2017</a:t>
+              <a:t>9/7/2017</a:t>
             </a:fld>
             <a:endParaRPr lang="en-US"/>
           </a:p>
@@ -1984,7 +2421,7 @@
           <a:p>
             <a:fld id="{78C97017-6FC3-485B-9764-EAC9E56C1D49}" type="datetimeFigureOut">
               <a:rPr lang="en-US" smtClean="0"/>
-              <a:t>9/3/2017</a:t>
+              <a:t>9/7/2017</a:t>
             </a:fld>
             <a:endParaRPr lang="en-US"/>
           </a:p>
@@ -2259,7 +2696,7 @@
           <a:p>
             <a:fld id="{78C97017-6FC3-485B-9764-EAC9E56C1D49}" type="datetimeFigureOut">
               <a:rPr lang="en-US" smtClean="0"/>
-              <a:t>9/3/2017</a:t>
+              <a:t>9/7/2017</a:t>
             </a:fld>
             <a:endParaRPr lang="en-US"/>
           </a:p>
@@ -2511,7 +2948,7 @@
           <a:p>
             <a:fld id="{78C97017-6FC3-485B-9764-EAC9E56C1D49}" type="datetimeFigureOut">
               <a:rPr lang="en-US" smtClean="0"/>
-              <a:t>9/3/2017</a:t>
+              <a:t>9/7/2017</a:t>
             </a:fld>
             <a:endParaRPr lang="en-US"/>
           </a:p>
@@ -2722,7 +3159,7 @@
           <a:p>
             <a:fld id="{78C97017-6FC3-485B-9764-EAC9E56C1D49}" type="datetimeFigureOut">
               <a:rPr lang="en-US" smtClean="0"/>
-              <a:t>9/3/2017</a:t>
+              <a:t>9/7/2017</a:t>
             </a:fld>
             <a:endParaRPr lang="en-US"/>
           </a:p>
@@ -3183,7 +3620,7 @@
         </p:nvSpPr>
         <p:spPr>
           <a:xfrm>
-            <a:off x="244597" y="5258098"/>
+            <a:off x="22167" y="5157052"/>
             <a:ext cx="929296" cy="346760"/>
           </a:xfrm>
           <a:prstGeom prst="rect">
@@ -3227,7 +3664,7 @@
         </p:nvSpPr>
         <p:spPr>
           <a:xfrm>
-            <a:off x="244598" y="3863518"/>
+            <a:off x="22168" y="3762472"/>
             <a:ext cx="929296" cy="346760"/>
           </a:xfrm>
           <a:prstGeom prst="rect">
@@ -3286,7 +3723,7 @@
         </p:nvSpPr>
         <p:spPr>
           <a:xfrm>
-            <a:off x="1547446" y="3863518"/>
+            <a:off x="1325016" y="3762472"/>
             <a:ext cx="929296" cy="346760"/>
           </a:xfrm>
           <a:prstGeom prst="rect">
@@ -3330,7 +3767,7 @@
         </p:nvSpPr>
         <p:spPr>
           <a:xfrm>
-            <a:off x="930398" y="3122498"/>
+            <a:off x="707968" y="3021452"/>
             <a:ext cx="634723" cy="346760"/>
           </a:xfrm>
           <a:prstGeom prst="rect">
@@ -3374,7 +3811,7 @@
         </p:nvSpPr>
         <p:spPr>
           <a:xfrm>
-            <a:off x="3163644" y="3149018"/>
+            <a:off x="2941214" y="3047972"/>
             <a:ext cx="929296" cy="346760"/>
           </a:xfrm>
           <a:prstGeom prst="rect">
@@ -3425,7 +3862,7 @@
         </p:nvSpPr>
         <p:spPr>
           <a:xfrm>
-            <a:off x="3137267" y="4469143"/>
+            <a:off x="2914837" y="4368097"/>
             <a:ext cx="929296" cy="346760"/>
           </a:xfrm>
           <a:prstGeom prst="rect">
@@ -3476,7 +3913,7 @@
         </p:nvSpPr>
         <p:spPr>
           <a:xfrm>
-            <a:off x="4702056" y="4469143"/>
+            <a:off x="4479626" y="4368097"/>
             <a:ext cx="929296" cy="346760"/>
           </a:xfrm>
           <a:prstGeom prst="rect">
@@ -3520,7 +3957,7 @@
         </p:nvSpPr>
         <p:spPr>
           <a:xfrm>
-            <a:off x="6264398" y="4152735"/>
+            <a:off x="6041968" y="4051689"/>
             <a:ext cx="929296" cy="346760"/>
           </a:xfrm>
           <a:prstGeom prst="rect">
@@ -3564,7 +4001,7 @@
         </p:nvSpPr>
         <p:spPr>
           <a:xfrm>
-            <a:off x="6279052" y="4612258"/>
+            <a:off x="6052434" y="4548526"/>
             <a:ext cx="929296" cy="346760"/>
           </a:xfrm>
           <a:prstGeom prst="rect">
@@ -3608,7 +4045,7 @@
         </p:nvSpPr>
         <p:spPr>
           <a:xfrm>
-            <a:off x="635825" y="4576929"/>
+            <a:off x="413395" y="4475883"/>
             <a:ext cx="929296" cy="346760"/>
           </a:xfrm>
           <a:prstGeom prst="rect">
@@ -3652,7 +4089,7 @@
         </p:nvCxnSpPr>
         <p:spPr>
           <a:xfrm rot="5400000">
-            <a:off x="-195664" y="4734189"/>
+            <a:off x="-418094" y="4633143"/>
             <a:ext cx="1047820" cy="1"/>
           </a:xfrm>
           <a:prstGeom prst="bentConnector3">
@@ -3695,7 +4132,7 @@
         </p:nvCxnSpPr>
         <p:spPr>
           <a:xfrm rot="5400000" flipH="1" flipV="1">
-            <a:off x="536002" y="3469122"/>
+            <a:off x="313572" y="3368076"/>
             <a:ext cx="567640" cy="221152"/>
           </a:xfrm>
           <a:prstGeom prst="bentConnector2">
@@ -3734,7 +4171,7 @@
         </p:nvCxnSpPr>
         <p:spPr>
           <a:xfrm rot="16200000" flipH="1">
-            <a:off x="292445" y="4414085"/>
+            <a:off x="70015" y="4313039"/>
             <a:ext cx="530702" cy="141745"/>
           </a:xfrm>
           <a:prstGeom prst="bentConnector2">
@@ -3775,7 +4212,7 @@
         </p:nvCxnSpPr>
         <p:spPr>
           <a:xfrm flipV="1">
-            <a:off x="2712790" y="3322398"/>
+            <a:off x="2490360" y="3221352"/>
             <a:ext cx="450854" cy="712546"/>
           </a:xfrm>
           <a:prstGeom prst="bentConnector3">
@@ -3813,7 +4250,7 @@
         </p:nvCxnSpPr>
         <p:spPr>
           <a:xfrm>
-            <a:off x="2712790" y="4034944"/>
+            <a:off x="2490360" y="3933898"/>
             <a:ext cx="424477" cy="607579"/>
           </a:xfrm>
           <a:prstGeom prst="bentConnector3">
@@ -3853,7 +4290,7 @@
         </p:nvCxnSpPr>
         <p:spPr>
           <a:xfrm rot="5400000" flipH="1" flipV="1">
-            <a:off x="4680022" y="3982461"/>
+            <a:off x="4457592" y="3881415"/>
             <a:ext cx="973365" cy="12700"/>
           </a:xfrm>
           <a:prstGeom prst="bentConnector3">
@@ -3893,7 +4330,7 @@
         </p:nvCxnSpPr>
         <p:spPr>
           <a:xfrm flipV="1">
-            <a:off x="5867400" y="4326115"/>
+            <a:off x="5644970" y="4225069"/>
             <a:ext cx="396998" cy="312434"/>
           </a:xfrm>
           <a:prstGeom prst="bentConnector3">
@@ -3933,8 +4370,8 @@
         </p:nvCxnSpPr>
         <p:spPr>
           <a:xfrm>
-            <a:off x="5867400" y="4638549"/>
-            <a:ext cx="411652" cy="147089"/>
+            <a:off x="5644970" y="4537503"/>
+            <a:ext cx="407464" cy="184403"/>
           </a:xfrm>
           <a:prstGeom prst="bentConnector3">
             <a:avLst>
@@ -3973,7 +4410,7 @@
         </p:nvCxnSpPr>
         <p:spPr>
           <a:xfrm>
-            <a:off x="5867400" y="4638549"/>
+            <a:off x="5644970" y="4537503"/>
             <a:ext cx="411652" cy="604289"/>
           </a:xfrm>
           <a:prstGeom prst="bentConnector3">
@@ -4010,7 +4447,7 @@
         </p:nvSpPr>
         <p:spPr>
           <a:xfrm>
-            <a:off x="4702056" y="3149018"/>
+            <a:off x="4479626" y="3047972"/>
             <a:ext cx="929296" cy="346760"/>
           </a:xfrm>
           <a:prstGeom prst="rect">
@@ -4054,7 +4491,7 @@
         </p:nvSpPr>
         <p:spPr>
           <a:xfrm>
-            <a:off x="5631352" y="4551859"/>
+            <a:off x="5408922" y="4450813"/>
             <a:ext cx="236048" cy="173380"/>
           </a:xfrm>
           <a:prstGeom prst="flowChartDecision">
@@ -4101,7 +4538,7 @@
         </p:nvSpPr>
         <p:spPr>
           <a:xfrm>
-            <a:off x="4092940" y="3248408"/>
+            <a:off x="3870510" y="3147362"/>
             <a:ext cx="236048" cy="173380"/>
           </a:xfrm>
           <a:prstGeom prst="flowChartDecision">
@@ -4142,7 +4579,7 @@
         </p:nvSpPr>
         <p:spPr>
           <a:xfrm>
-            <a:off x="4056539" y="4555833"/>
+            <a:off x="3834109" y="4454787"/>
             <a:ext cx="236048" cy="173380"/>
           </a:xfrm>
           <a:prstGeom prst="flowChartDecision">
@@ -4183,7 +4620,7 @@
         </p:nvSpPr>
         <p:spPr>
           <a:xfrm>
-            <a:off x="2476742" y="3948254"/>
+            <a:off x="2254312" y="3847208"/>
             <a:ext cx="236048" cy="173380"/>
           </a:xfrm>
           <a:prstGeom prst="flowChartDecision">
@@ -4229,7 +4666,7 @@
         </p:nvCxnSpPr>
         <p:spPr>
           <a:xfrm flipV="1">
-            <a:off x="4328988" y="3322398"/>
+            <a:off x="4106558" y="3221352"/>
             <a:ext cx="373068" cy="12700"/>
           </a:xfrm>
           <a:prstGeom prst="straightConnector1">
@@ -4267,7 +4704,7 @@
         </p:nvCxnSpPr>
         <p:spPr>
           <a:xfrm>
-            <a:off x="4292587" y="4642523"/>
+            <a:off x="4070157" y="4541477"/>
             <a:ext cx="409469" cy="0"/>
           </a:xfrm>
           <a:prstGeom prst="straightConnector1">
@@ -4305,7 +4742,7 @@
         </p:nvCxnSpPr>
         <p:spPr>
           <a:xfrm>
-            <a:off x="1173894" y="4036898"/>
+            <a:off x="951464" y="3935852"/>
             <a:ext cx="373552" cy="0"/>
           </a:xfrm>
           <a:prstGeom prst="straightConnector1">
@@ -4343,7 +4780,7 @@
         </p:nvSpPr>
         <p:spPr>
           <a:xfrm>
-            <a:off x="1740876" y="5256866"/>
+            <a:off x="1518446" y="5155820"/>
             <a:ext cx="1408598" cy="346760"/>
           </a:xfrm>
           <a:prstGeom prst="rect">
@@ -4397,7 +4834,7 @@
         </p:nvCxnSpPr>
         <p:spPr>
           <a:xfrm flipV="1">
-            <a:off x="1173893" y="5430246"/>
+            <a:off x="951463" y="5329200"/>
             <a:ext cx="566983" cy="1232"/>
           </a:xfrm>
           <a:prstGeom prst="bentConnector3">
@@ -4438,7 +4875,7 @@
         </p:nvSpPr>
         <p:spPr>
           <a:xfrm rot="16200000">
-            <a:off x="3101984" y="5342484"/>
+            <a:off x="2879554" y="5241438"/>
             <a:ext cx="270504" cy="175523"/>
           </a:xfrm>
           <a:prstGeom prst="triangle">
@@ -4481,7 +4918,7 @@
         </p:nvCxnSpPr>
         <p:spPr>
           <a:xfrm rot="5400000">
-            <a:off x="3938680" y="4202221"/>
+            <a:off x="3716250" y="4101175"/>
             <a:ext cx="614343" cy="1841706"/>
           </a:xfrm>
           <a:prstGeom prst="bentConnector2">
@@ -4517,7 +4954,7 @@
         </p:nvSpPr>
         <p:spPr>
           <a:xfrm>
-            <a:off x="2049426" y="1472646"/>
+            <a:off x="1826996" y="1371600"/>
             <a:ext cx="1611867" cy="444640"/>
           </a:xfrm>
           <a:prstGeom prst="rect">
@@ -4561,7 +4998,7 @@
         </p:nvSpPr>
         <p:spPr>
           <a:xfrm flipH="1">
-            <a:off x="4206998" y="1175538"/>
+            <a:off x="3984568" y="1074492"/>
             <a:ext cx="1404109" cy="346760"/>
           </a:xfrm>
           <a:prstGeom prst="rect">
@@ -4605,7 +5042,7 @@
         </p:nvSpPr>
         <p:spPr>
           <a:xfrm flipH="1">
-            <a:off x="4206998" y="1570525"/>
+            <a:off x="3984568" y="1469479"/>
             <a:ext cx="1404109" cy="346760"/>
           </a:xfrm>
           <a:prstGeom prst="rect">
@@ -4649,7 +5086,7 @@
         </p:nvSpPr>
         <p:spPr>
           <a:xfrm flipH="1">
-            <a:off x="4206998" y="1965512"/>
+            <a:off x="3984568" y="1864466"/>
             <a:ext cx="1404109" cy="346760"/>
           </a:xfrm>
           <a:prstGeom prst="rect">
@@ -4693,7 +5130,7 @@
         </p:nvSpPr>
         <p:spPr>
           <a:xfrm rot="16200000">
-            <a:off x="3613801" y="1687949"/>
+            <a:off x="3391371" y="1586903"/>
             <a:ext cx="270504" cy="175523"/>
           </a:xfrm>
           <a:prstGeom prst="triangle">
@@ -4736,7 +5173,7 @@
         </p:nvCxnSpPr>
         <p:spPr>
           <a:xfrm flipV="1">
-            <a:off x="3836815" y="1743905"/>
+            <a:off x="3614385" y="1642859"/>
             <a:ext cx="370183" cy="31806"/>
           </a:xfrm>
           <a:prstGeom prst="bentConnector3">
@@ -4774,7 +5211,7 @@
         </p:nvCxnSpPr>
         <p:spPr>
           <a:xfrm flipV="1">
-            <a:off x="3836815" y="1348918"/>
+            <a:off x="3614385" y="1247872"/>
             <a:ext cx="370183" cy="426793"/>
           </a:xfrm>
           <a:prstGeom prst="bentConnector3">
@@ -4812,7 +5249,7 @@
         </p:nvCxnSpPr>
         <p:spPr>
           <a:xfrm>
-            <a:off x="3836815" y="1775711"/>
+            <a:off x="3614385" y="1674665"/>
             <a:ext cx="370183" cy="363181"/>
           </a:xfrm>
           <a:prstGeom prst="bentConnector3">
@@ -4847,7 +5284,7 @@
         </p:nvSpPr>
         <p:spPr>
           <a:xfrm flipH="1">
-            <a:off x="4206998" y="2360498"/>
+            <a:off x="3984568" y="2259452"/>
             <a:ext cx="1404109" cy="346760"/>
           </a:xfrm>
           <a:prstGeom prst="rect">
@@ -4894,7 +5331,7 @@
         </p:nvCxnSpPr>
         <p:spPr>
           <a:xfrm>
-            <a:off x="3836815" y="1775711"/>
+            <a:off x="3614385" y="1674665"/>
             <a:ext cx="370183" cy="758167"/>
           </a:xfrm>
           <a:prstGeom prst="bentConnector3">
@@ -4932,7 +5369,7 @@
         </p:nvCxnSpPr>
         <p:spPr>
           <a:xfrm rot="5400000" flipH="1" flipV="1">
-            <a:off x="934827" y="2007899"/>
+            <a:off x="712397" y="1906853"/>
             <a:ext cx="1427532" cy="801666"/>
           </a:xfrm>
           <a:prstGeom prst="bentConnector2">
@@ -4968,7 +5405,7 @@
         </p:nvCxnSpPr>
         <p:spPr>
           <a:xfrm rot="5400000" flipH="1" flipV="1">
-            <a:off x="114730" y="1928822"/>
+            <a:off x="-107700" y="1827776"/>
             <a:ext cx="2293164" cy="1576229"/>
           </a:xfrm>
           <a:prstGeom prst="bentConnector3">
@@ -5009,7 +5446,7 @@
         </p:nvCxnSpPr>
         <p:spPr>
           <a:xfrm rot="5400000">
-            <a:off x="1277762" y="2907201"/>
+            <a:off x="1055332" y="2806155"/>
             <a:ext cx="1889726" cy="6348"/>
           </a:xfrm>
           <a:prstGeom prst="bentConnector3">
@@ -5050,7 +5487,7 @@
         </p:nvSpPr>
         <p:spPr>
           <a:xfrm flipH="1">
-            <a:off x="701798" y="836498"/>
+            <a:off x="479368" y="735452"/>
             <a:ext cx="1404109" cy="346760"/>
           </a:xfrm>
           <a:prstGeom prst="rect">
@@ -5097,7 +5534,7 @@
         </p:nvCxnSpPr>
         <p:spPr>
           <a:xfrm rot="16200000" flipV="1">
-            <a:off x="2249250" y="866535"/>
+            <a:off x="2026820" y="765489"/>
             <a:ext cx="462768" cy="749453"/>
           </a:xfrm>
           <a:prstGeom prst="bentConnector2">
@@ -5138,7 +5575,7 @@
         </p:nvCxnSpPr>
         <p:spPr>
           <a:xfrm rot="5400000" flipH="1" flipV="1">
-            <a:off x="-911798" y="2249926"/>
+            <a:off x="-1134228" y="2148880"/>
             <a:ext cx="2853643" cy="373549"/>
           </a:xfrm>
           <a:prstGeom prst="bentConnector2">
@@ -5177,7 +5614,7 @@
         </p:nvSpPr>
         <p:spPr>
           <a:xfrm>
-            <a:off x="6264398" y="3655898"/>
+            <a:off x="6041968" y="3554852"/>
             <a:ext cx="929296" cy="346760"/>
           </a:xfrm>
           <a:prstGeom prst="rect">
@@ -5224,7 +5661,7 @@
         </p:nvCxnSpPr>
         <p:spPr>
           <a:xfrm flipV="1">
-            <a:off x="5867400" y="3829278"/>
+            <a:off x="5644970" y="3728232"/>
             <a:ext cx="396998" cy="809271"/>
           </a:xfrm>
           <a:prstGeom prst="bentConnector3">
@@ -5261,7 +5698,7 @@
         </p:nvSpPr>
         <p:spPr>
           <a:xfrm>
-            <a:off x="5867400" y="990600"/>
+            <a:off x="5644970" y="889554"/>
             <a:ext cx="929296" cy="346760"/>
           </a:xfrm>
           <a:prstGeom prst="rect">
@@ -5305,7 +5742,7 @@
         </p:nvSpPr>
         <p:spPr>
           <a:xfrm>
-            <a:off x="7075118" y="990600"/>
+            <a:off x="6852688" y="889554"/>
             <a:ext cx="929296" cy="346760"/>
           </a:xfrm>
           <a:prstGeom prst="rect">
@@ -5349,7 +5786,7 @@
         </p:nvSpPr>
         <p:spPr>
           <a:xfrm>
-            <a:off x="3149474" y="3826955"/>
+            <a:off x="2927044" y="3725909"/>
             <a:ext cx="929296" cy="346760"/>
           </a:xfrm>
           <a:prstGeom prst="rect">
@@ -5393,7 +5830,7 @@
         </p:nvSpPr>
         <p:spPr>
           <a:xfrm>
-            <a:off x="1839361" y="4572098"/>
+            <a:off x="1616931" y="4471052"/>
             <a:ext cx="929296" cy="346760"/>
           </a:xfrm>
           <a:prstGeom prst="rect">
@@ -5440,7 +5877,7 @@
         </p:nvCxnSpPr>
         <p:spPr>
           <a:xfrm flipV="1">
-            <a:off x="1565121" y="4745478"/>
+            <a:off x="1342691" y="4644432"/>
             <a:ext cx="274240" cy="4831"/>
           </a:xfrm>
           <a:prstGeom prst="bentConnector3">
@@ -5481,7 +5918,7 @@
         </p:nvCxnSpPr>
         <p:spPr>
           <a:xfrm flipV="1">
-            <a:off x="6172201" y="1315903"/>
+            <a:off x="5949771" y="1214857"/>
             <a:ext cx="0" cy="304800"/>
           </a:xfrm>
           <a:prstGeom prst="straightConnector1">
@@ -5520,7 +5957,7 @@
         </p:nvCxnSpPr>
         <p:spPr>
           <a:xfrm flipV="1">
-            <a:off x="6324601" y="1315903"/>
+            <a:off x="6102171" y="1214857"/>
             <a:ext cx="0" cy="304800"/>
           </a:xfrm>
           <a:prstGeom prst="straightConnector1">
@@ -5559,7 +5996,7 @@
         </p:nvCxnSpPr>
         <p:spPr>
           <a:xfrm flipV="1">
-            <a:off x="6477001" y="1315903"/>
+            <a:off x="6254571" y="1214857"/>
             <a:ext cx="0" cy="304800"/>
           </a:xfrm>
           <a:prstGeom prst="straightConnector1">
@@ -5598,7 +6035,7 @@
         </p:nvCxnSpPr>
         <p:spPr>
           <a:xfrm flipV="1">
-            <a:off x="7347044" y="1315903"/>
+            <a:off x="7124614" y="1214857"/>
             <a:ext cx="0" cy="304800"/>
           </a:xfrm>
           <a:prstGeom prst="straightConnector1">
@@ -5637,7 +6074,7 @@
         </p:nvCxnSpPr>
         <p:spPr>
           <a:xfrm flipV="1">
-            <a:off x="7499444" y="1315903"/>
+            <a:off x="7277014" y="1214857"/>
             <a:ext cx="0" cy="304800"/>
           </a:xfrm>
           <a:prstGeom prst="straightConnector1">
@@ -5676,7 +6113,7 @@
         </p:nvCxnSpPr>
         <p:spPr>
           <a:xfrm flipV="1">
-            <a:off x="7651844" y="1315903"/>
+            <a:off x="7429414" y="1214857"/>
             <a:ext cx="0" cy="304800"/>
           </a:xfrm>
           <a:prstGeom prst="straightConnector1">
@@ -5709,10 +6146,10 @@
       </p:cxnSp>
       <p:sp>
         <p:nvSpPr>
-          <p:cNvPr id="80" name="Rectangle 21">
+          <p:cNvPr id="72" name="Rectangle 21">
             <a:extLst>
               <a:ext uri="{FF2B5EF4-FFF2-40B4-BE49-F238E27FC236}">
-                <a16:creationId xmlns:a16="http://schemas.microsoft.com/office/drawing/2014/main" id="{AA934EAD-1473-4219-9A6E-F3CB35A72761}"/>
+                <a16:creationId xmlns:a16="http://schemas.microsoft.com/office/drawing/2014/main" id="{FB2A9FD0-E05C-4451-A9F0-EE53A6B692DB}"/>
               </a:ext>
             </a:extLst>
           </p:cNvPr>
@@ -5721,7 +6158,7 @@
         </p:nvSpPr>
         <p:spPr>
           <a:xfrm>
-            <a:off x="6279052" y="5065320"/>
+            <a:off x="6043514" y="5007811"/>
             <a:ext cx="929296" cy="346760"/>
           </a:xfrm>
           <a:prstGeom prst="rect">
@@ -5759,10 +6196,10 @@
       </p:sp>
       <p:sp>
         <p:nvSpPr>
-          <p:cNvPr id="83" name="Rectangle 21">
+          <p:cNvPr id="74" name="Rectangle 21">
             <a:extLst>
               <a:ext uri="{FF2B5EF4-FFF2-40B4-BE49-F238E27FC236}">
-                <a16:creationId xmlns:a16="http://schemas.microsoft.com/office/drawing/2014/main" id="{6A668E93-2848-4532-B61D-EF7F267A2766}"/>
+                <a16:creationId xmlns:a16="http://schemas.microsoft.com/office/drawing/2014/main" id="{B98F8E66-71DC-4CCE-81BA-7D8FE15BB0AC}"/>
               </a:ext>
             </a:extLst>
           </p:cNvPr>
@@ -5771,7 +6208,7 @@
         </p:nvSpPr>
         <p:spPr>
           <a:xfrm>
-            <a:off x="7869808" y="5669609"/>
+            <a:off x="7629914" y="5568755"/>
             <a:ext cx="929296" cy="346760"/>
           </a:xfrm>
           <a:prstGeom prst="rect">
@@ -5809,22 +6246,22 @@
       </p:sp>
       <p:cxnSp>
         <p:nvCxnSpPr>
-          <p:cNvPr id="85" name="Elbow Connector 70">
+          <p:cNvPr id="75" name="Elbow Connector 70">
             <a:extLst>
               <a:ext uri="{FF2B5EF4-FFF2-40B4-BE49-F238E27FC236}">
-                <a16:creationId xmlns:a16="http://schemas.microsoft.com/office/drawing/2014/main" id="{79AEBE50-D3E0-41D4-8D86-D82CAC284254}"/>
+                <a16:creationId xmlns:a16="http://schemas.microsoft.com/office/drawing/2014/main" id="{3F50CA70-C39F-44DE-B110-38AF74F3DD51}"/>
               </a:ext>
             </a:extLst>
           </p:cNvPr>
           <p:cNvCxnSpPr>
-            <a:stCxn id="86" idx="3"/>
-            <a:endCxn id="83" idx="1"/>
+            <a:stCxn id="76" idx="3"/>
+            <a:endCxn id="74" idx="1"/>
           </p:cNvCxnSpPr>
           <p:nvPr/>
         </p:nvCxnSpPr>
         <p:spPr>
           <a:xfrm>
-            <a:off x="7458156" y="5238700"/>
+            <a:off x="7218262" y="5137846"/>
             <a:ext cx="411652" cy="604289"/>
           </a:xfrm>
           <a:prstGeom prst="bentConnector3">
@@ -5855,10 +6292,10 @@
       </p:cxnSp>
       <p:sp>
         <p:nvSpPr>
-          <p:cNvPr id="86" name="Flowchart: Decision 89">
+          <p:cNvPr id="76" name="Flowchart: Decision 89">
             <a:extLst>
               <a:ext uri="{FF2B5EF4-FFF2-40B4-BE49-F238E27FC236}">
-                <a16:creationId xmlns:a16="http://schemas.microsoft.com/office/drawing/2014/main" id="{96645FE8-886E-4859-AFAB-64531E1C634D}"/>
+                <a16:creationId xmlns:a16="http://schemas.microsoft.com/office/drawing/2014/main" id="{DF40D995-B6E8-4D2C-A546-E45F4E20C744}"/>
               </a:ext>
             </a:extLst>
           </p:cNvPr>
@@ -5867,7 +6304,7 @@
         </p:nvSpPr>
         <p:spPr>
           <a:xfrm>
-            <a:off x="7222108" y="5152010"/>
+            <a:off x="6982214" y="5051156"/>
             <a:ext cx="236048" cy="173380"/>
           </a:xfrm>
           <a:prstGeom prst="flowChartDecision">
@@ -5904,10 +6341,10 @@
       </p:sp>
       <p:sp>
         <p:nvSpPr>
-          <p:cNvPr id="88" name="Rectangle 21">
+          <p:cNvPr id="77" name="Rectangle 21">
             <a:extLst>
               <a:ext uri="{FF2B5EF4-FFF2-40B4-BE49-F238E27FC236}">
-                <a16:creationId xmlns:a16="http://schemas.microsoft.com/office/drawing/2014/main" id="{77BEFA74-22F5-405F-BFBC-D9F351EF14EE}"/>
+                <a16:creationId xmlns:a16="http://schemas.microsoft.com/office/drawing/2014/main" id="{D16A8D50-A750-432F-B8C8-43F5A9881A6A}"/>
               </a:ext>
             </a:extLst>
           </p:cNvPr>
@@ -5916,7 +6353,7 @@
         </p:nvSpPr>
         <p:spPr>
           <a:xfrm>
-            <a:off x="7869808" y="6168769"/>
+            <a:off x="7629914" y="6067915"/>
             <a:ext cx="929296" cy="346760"/>
           </a:xfrm>
           <a:prstGeom prst="rect">
@@ -5954,10 +6391,10 @@
       </p:sp>
       <p:sp>
         <p:nvSpPr>
-          <p:cNvPr id="89" name="Rectangle 21">
+          <p:cNvPr id="78" name="Rectangle 21">
             <a:extLst>
               <a:ext uri="{FF2B5EF4-FFF2-40B4-BE49-F238E27FC236}">
-                <a16:creationId xmlns:a16="http://schemas.microsoft.com/office/drawing/2014/main" id="{7DAB5DAD-719A-4721-B692-7AF95ED3CC2B}"/>
+                <a16:creationId xmlns:a16="http://schemas.microsoft.com/office/drawing/2014/main" id="{8AE6C55F-81A8-4B12-8BA9-483C7C27AA63}"/>
               </a:ext>
             </a:extLst>
           </p:cNvPr>
@@ -5966,7 +6403,7 @@
         </p:nvSpPr>
         <p:spPr>
           <a:xfrm>
-            <a:off x="7869808" y="5152010"/>
+            <a:off x="7629914" y="5051156"/>
             <a:ext cx="929296" cy="346760"/>
           </a:xfrm>
           <a:prstGeom prst="rect">
@@ -6004,10 +6441,10 @@
       </p:sp>
       <p:sp>
         <p:nvSpPr>
-          <p:cNvPr id="91" name="Rectangle 21">
+          <p:cNvPr id="104" name="Rectangle 21">
             <a:extLst>
               <a:ext uri="{FF2B5EF4-FFF2-40B4-BE49-F238E27FC236}">
-                <a16:creationId xmlns:a16="http://schemas.microsoft.com/office/drawing/2014/main" id="{D5E958F0-3943-47F4-9678-11118AA5192E}"/>
+                <a16:creationId xmlns:a16="http://schemas.microsoft.com/office/drawing/2014/main" id="{FB06ED45-05A9-4117-AB10-C5AF1A3BCBB3}"/>
               </a:ext>
             </a:extLst>
           </p:cNvPr>
@@ -6016,7 +6453,7 @@
         </p:nvSpPr>
         <p:spPr>
           <a:xfrm>
-            <a:off x="7869808" y="4608120"/>
+            <a:off x="7629914" y="4507266"/>
             <a:ext cx="929296" cy="346760"/>
           </a:xfrm>
           <a:prstGeom prst="rect">
@@ -6054,22 +6491,22 @@
       </p:sp>
       <p:cxnSp>
         <p:nvCxnSpPr>
-          <p:cNvPr id="94" name="Elbow Connector 70">
+          <p:cNvPr id="105" name="Elbow Connector 70">
             <a:extLst>
               <a:ext uri="{FF2B5EF4-FFF2-40B4-BE49-F238E27FC236}">
-                <a16:creationId xmlns:a16="http://schemas.microsoft.com/office/drawing/2014/main" id="{84B06B44-1CDE-4C31-8844-D647A59CBBFE}"/>
+                <a16:creationId xmlns:a16="http://schemas.microsoft.com/office/drawing/2014/main" id="{A1082B14-6B20-4AFD-BDCD-C2997E7E0BB6}"/>
               </a:ext>
             </a:extLst>
           </p:cNvPr>
           <p:cNvCxnSpPr>
-            <a:stCxn id="86" idx="3"/>
-            <a:endCxn id="91" idx="1"/>
+            <a:stCxn id="76" idx="3"/>
+            <a:endCxn id="104" idx="1"/>
           </p:cNvCxnSpPr>
           <p:nvPr/>
         </p:nvCxnSpPr>
         <p:spPr>
           <a:xfrm flipV="1">
-            <a:off x="7458156" y="4781500"/>
+            <a:off x="7218262" y="4680646"/>
             <a:ext cx="411652" cy="457200"/>
           </a:xfrm>
           <a:prstGeom prst="bentConnector3">
@@ -6100,22 +6537,22 @@
       </p:cxnSp>
       <p:cxnSp>
         <p:nvCxnSpPr>
-          <p:cNvPr id="95" name="Elbow Connector 70">
+          <p:cNvPr id="112" name="Elbow Connector 70">
             <a:extLst>
               <a:ext uri="{FF2B5EF4-FFF2-40B4-BE49-F238E27FC236}">
-                <a16:creationId xmlns:a16="http://schemas.microsoft.com/office/drawing/2014/main" id="{9A504C8D-11A9-47C1-AC00-1E88E0F56A06}"/>
+                <a16:creationId xmlns:a16="http://schemas.microsoft.com/office/drawing/2014/main" id="{83F021F6-8239-4BD9-84DC-711CD9DE5EF9}"/>
               </a:ext>
             </a:extLst>
           </p:cNvPr>
           <p:cNvCxnSpPr>
-            <a:stCxn id="86" idx="3"/>
-            <a:endCxn id="88" idx="1"/>
+            <a:stCxn id="76" idx="3"/>
+            <a:endCxn id="77" idx="1"/>
           </p:cNvCxnSpPr>
           <p:nvPr/>
         </p:nvCxnSpPr>
         <p:spPr>
           <a:xfrm>
-            <a:off x="7458156" y="5238700"/>
+            <a:off x="7218262" y="5137846"/>
             <a:ext cx="411652" cy="1103449"/>
           </a:xfrm>
           <a:prstGeom prst="bentConnector3">
@@ -6146,22 +6583,22 @@
       </p:cxnSp>
       <p:cxnSp>
         <p:nvCxnSpPr>
-          <p:cNvPr id="103" name="Elbow Connector 70">
+          <p:cNvPr id="113" name="Elbow Connector 70">
             <a:extLst>
               <a:ext uri="{FF2B5EF4-FFF2-40B4-BE49-F238E27FC236}">
-                <a16:creationId xmlns:a16="http://schemas.microsoft.com/office/drawing/2014/main" id="{A733CFFD-67C4-405E-A62A-F4F790626BFD}"/>
+                <a16:creationId xmlns:a16="http://schemas.microsoft.com/office/drawing/2014/main" id="{7041A85B-5BCC-4DD6-A020-C779AF5A96B3}"/>
               </a:ext>
             </a:extLst>
           </p:cNvPr>
           <p:cNvCxnSpPr>
-            <a:stCxn id="86" idx="3"/>
-            <a:endCxn id="89" idx="1"/>
+            <a:stCxn id="76" idx="3"/>
+            <a:endCxn id="78" idx="1"/>
           </p:cNvCxnSpPr>
           <p:nvPr/>
         </p:nvCxnSpPr>
         <p:spPr>
           <a:xfrm>
-            <a:off x="7458156" y="5238700"/>
+            <a:off x="7218262" y="5137846"/>
             <a:ext cx="411652" cy="86690"/>
           </a:xfrm>
           <a:prstGeom prst="bentConnector3">
@@ -6187,6 +6624,459 @@
           </a:effectRef>
           <a:fontRef idx="minor">
             <a:schemeClr val="dk1"/>
+          </a:fontRef>
+        </p:style>
+      </p:cxnSp>
+      <p:sp>
+        <p:nvSpPr>
+          <p:cNvPr id="116" name="Rectangle 6">
+            <a:extLst>
+              <a:ext uri="{FF2B5EF4-FFF2-40B4-BE49-F238E27FC236}">
+                <a16:creationId xmlns:a16="http://schemas.microsoft.com/office/drawing/2014/main" id="{32126F2A-EA30-4DF8-AC7D-DAEA86EA272F}"/>
+              </a:ext>
+            </a:extLst>
+          </p:cNvPr>
+          <p:cNvSpPr/>
+          <p:nvPr/>
+        </p:nvSpPr>
+        <p:spPr>
+          <a:xfrm>
+            <a:off x="7258358" y="3265917"/>
+            <a:ext cx="1905000" cy="327923"/>
+          </a:xfrm>
+          <a:prstGeom prst="rect">
+            <a:avLst/>
+          </a:prstGeom>
+          <a:ln w="19050"/>
+          <a:effectLst/>
+        </p:spPr>
+        <p:style>
+          <a:lnRef idx="1">
+            <a:schemeClr val="accent4"/>
+          </a:lnRef>
+          <a:fillRef idx="2">
+            <a:schemeClr val="accent4"/>
+          </a:fillRef>
+          <a:effectRef idx="1">
+            <a:schemeClr val="accent4"/>
+          </a:effectRef>
+          <a:fontRef idx="minor">
+            <a:schemeClr val="dk1"/>
+          </a:fontRef>
+        </p:style>
+        <p:txBody>
+          <a:bodyPr rtlCol="0" anchor="ctr"/>
+          <a:lstStyle/>
+          <a:p>
+            <a:pPr algn="ctr"/>
+            <a:r>
+              <a:rPr lang="en-SG" sz="1050" dirty="0"/>
+              <a:t>&lt;&lt;interface&gt;&gt; </a:t>
+            </a:r>
+            <a:r>
+              <a:rPr lang="en-SG" sz="1050" dirty="0" err="1"/>
+              <a:t>AddressComponent</a:t>
+            </a:r>
+            <a:endParaRPr lang="en-SG" sz="1050" dirty="0"/>
+          </a:p>
+        </p:txBody>
+      </p:sp>
+      <p:sp>
+        <p:nvSpPr>
+          <p:cNvPr id="117" name="Rectangle 6">
+            <a:extLst>
+              <a:ext uri="{FF2B5EF4-FFF2-40B4-BE49-F238E27FC236}">
+                <a16:creationId xmlns:a16="http://schemas.microsoft.com/office/drawing/2014/main" id="{A9A3270E-7CBE-4A34-9A75-867D6E42E160}"/>
+              </a:ext>
+            </a:extLst>
+          </p:cNvPr>
+          <p:cNvSpPr/>
+          <p:nvPr/>
+        </p:nvSpPr>
+        <p:spPr>
+          <a:xfrm>
+            <a:off x="7258358" y="3593742"/>
+            <a:ext cx="1905000" cy="118391"/>
+          </a:xfrm>
+          <a:prstGeom prst="rect">
+            <a:avLst/>
+          </a:prstGeom>
+          <a:ln w="19050"/>
+          <a:effectLst/>
+        </p:spPr>
+        <p:style>
+          <a:lnRef idx="1">
+            <a:schemeClr val="accent4"/>
+          </a:lnRef>
+          <a:fillRef idx="2">
+            <a:schemeClr val="accent4"/>
+          </a:fillRef>
+          <a:effectRef idx="1">
+            <a:schemeClr val="accent4"/>
+          </a:effectRef>
+          <a:fontRef idx="minor">
+            <a:schemeClr val="dk1"/>
+          </a:fontRef>
+        </p:style>
+        <p:txBody>
+          <a:bodyPr rtlCol="0" anchor="ctr"/>
+          <a:lstStyle/>
+          <a:p>
+            <a:pPr algn="ctr"/>
+            <a:endParaRPr lang="en-SG" sz="1050" dirty="0"/>
+          </a:p>
+        </p:txBody>
+      </p:sp>
+      <p:sp>
+        <p:nvSpPr>
+          <p:cNvPr id="119" name="Rectangle 6">
+            <a:extLst>
+              <a:ext uri="{FF2B5EF4-FFF2-40B4-BE49-F238E27FC236}">
+                <a16:creationId xmlns:a16="http://schemas.microsoft.com/office/drawing/2014/main" id="{A743FBED-2832-42C7-8CB2-56B235DB3E56}"/>
+              </a:ext>
+            </a:extLst>
+          </p:cNvPr>
+          <p:cNvSpPr/>
+          <p:nvPr/>
+        </p:nvSpPr>
+        <p:spPr>
+          <a:xfrm>
+            <a:off x="7258358" y="3712134"/>
+            <a:ext cx="1905000" cy="271943"/>
+          </a:xfrm>
+          <a:prstGeom prst="rect">
+            <a:avLst/>
+          </a:prstGeom>
+          <a:ln w="19050"/>
+          <a:effectLst/>
+        </p:spPr>
+        <p:style>
+          <a:lnRef idx="1">
+            <a:schemeClr val="accent4"/>
+          </a:lnRef>
+          <a:fillRef idx="2">
+            <a:schemeClr val="accent4"/>
+          </a:fillRef>
+          <a:effectRef idx="1">
+            <a:schemeClr val="accent4"/>
+          </a:effectRef>
+          <a:fontRef idx="minor">
+            <a:schemeClr val="dk1"/>
+          </a:fontRef>
+        </p:style>
+        <p:txBody>
+          <a:bodyPr rtlCol="0" anchor="ctr"/>
+          <a:lstStyle/>
+          <a:p>
+            <a:pPr algn="ctr"/>
+            <a:r>
+              <a:rPr lang="en-US" sz="1050" dirty="0"/>
+              <a:t>+</a:t>
+            </a:r>
+            <a:r>
+              <a:rPr lang="en-US" sz="1050" dirty="0" err="1"/>
+              <a:t>isValidAddress</a:t>
+            </a:r>
+            <a:r>
+              <a:rPr lang="en-US" sz="1050" dirty="0"/>
+              <a:t>(String address)</a:t>
+            </a:r>
+            <a:endParaRPr lang="en-SG" sz="1050" dirty="0"/>
+          </a:p>
+        </p:txBody>
+      </p:sp>
+      <p:sp>
+        <p:nvSpPr>
+          <p:cNvPr id="120" name="Isosceles Triangle 24">
+            <a:extLst>
+              <a:ext uri="{FF2B5EF4-FFF2-40B4-BE49-F238E27FC236}">
+                <a16:creationId xmlns:a16="http://schemas.microsoft.com/office/drawing/2014/main" id="{D1EE50D2-EAD1-43E7-88C1-1486B606E3FD}"/>
+              </a:ext>
+            </a:extLst>
+          </p:cNvPr>
+          <p:cNvSpPr/>
+          <p:nvPr/>
+        </p:nvSpPr>
+        <p:spPr>
+          <a:xfrm>
+            <a:off x="7940354" y="3984345"/>
+            <a:ext cx="270504" cy="175523"/>
+          </a:xfrm>
+          <a:prstGeom prst="triangle">
+            <a:avLst/>
+          </a:prstGeom>
+          <a:ln w="19050"/>
+          <a:effectLst/>
+        </p:spPr>
+        <p:style>
+          <a:lnRef idx="1">
+            <a:schemeClr val="accent4"/>
+          </a:lnRef>
+          <a:fillRef idx="2">
+            <a:schemeClr val="accent4"/>
+          </a:fillRef>
+          <a:effectRef idx="1">
+            <a:schemeClr val="accent4"/>
+          </a:effectRef>
+          <a:fontRef idx="minor">
+            <a:schemeClr val="dk1"/>
+          </a:fontRef>
+        </p:style>
+        <p:txBody>
+          <a:bodyPr rtlCol="0" anchor="ctr"/>
+          <a:lstStyle/>
+          <a:p>
+            <a:pPr algn="ctr"/>
+            <a:endParaRPr lang="en-SG" sz="1050"/>
+          </a:p>
+        </p:txBody>
+      </p:sp>
+      <p:cxnSp>
+        <p:nvCxnSpPr>
+          <p:cNvPr id="121" name="Elbow Connector 26">
+            <a:extLst>
+              <a:ext uri="{FF2B5EF4-FFF2-40B4-BE49-F238E27FC236}">
+                <a16:creationId xmlns:a16="http://schemas.microsoft.com/office/drawing/2014/main" id="{BA85D7BF-F89D-4B63-86A2-83338EEE1E3A}"/>
+              </a:ext>
+            </a:extLst>
+          </p:cNvPr>
+          <p:cNvCxnSpPr>
+            <a:cxnSpLocks/>
+            <a:endCxn id="120" idx="3"/>
+          </p:cNvCxnSpPr>
+          <p:nvPr/>
+        </p:nvCxnSpPr>
+        <p:spPr>
+          <a:xfrm rot="10800000">
+            <a:off x="8075606" y="4159869"/>
+            <a:ext cx="839672" cy="170839"/>
+          </a:xfrm>
+          <a:prstGeom prst="bentConnector2">
+            <a:avLst/>
+          </a:prstGeom>
+          <a:ln w="19050">
+            <a:prstDash val="dash"/>
+          </a:ln>
+          <a:effectLst/>
+        </p:spPr>
+        <p:style>
+          <a:lnRef idx="1">
+            <a:schemeClr val="accent4"/>
+          </a:lnRef>
+          <a:fillRef idx="2">
+            <a:schemeClr val="accent4"/>
+          </a:fillRef>
+          <a:effectRef idx="1">
+            <a:schemeClr val="accent4"/>
+          </a:effectRef>
+          <a:fontRef idx="minor">
+            <a:schemeClr val="dk1"/>
+          </a:fontRef>
+        </p:style>
+      </p:cxnSp>
+      <p:cxnSp>
+        <p:nvCxnSpPr>
+          <p:cNvPr id="122" name="直接连接符 121">
+            <a:extLst>
+              <a:ext uri="{FF2B5EF4-FFF2-40B4-BE49-F238E27FC236}">
+                <a16:creationId xmlns:a16="http://schemas.microsoft.com/office/drawing/2014/main" id="{7DF4CAFC-FE72-47A6-897D-DDB3BAEBD39D}"/>
+              </a:ext>
+            </a:extLst>
+          </p:cNvPr>
+          <p:cNvCxnSpPr>
+            <a:cxnSpLocks/>
+          </p:cNvCxnSpPr>
+          <p:nvPr/>
+        </p:nvCxnSpPr>
+        <p:spPr>
+          <a:xfrm>
+            <a:off x="8915278" y="4330709"/>
+            <a:ext cx="0" cy="1910586"/>
+          </a:xfrm>
+          <a:prstGeom prst="line">
+            <a:avLst/>
+          </a:prstGeom>
+          <a:ln w="19050">
+            <a:prstDash val="dash"/>
+          </a:ln>
+        </p:spPr>
+        <p:style>
+          <a:lnRef idx="1">
+            <a:schemeClr val="accent4"/>
+          </a:lnRef>
+          <a:fillRef idx="0">
+            <a:schemeClr val="accent4"/>
+          </a:fillRef>
+          <a:effectRef idx="0">
+            <a:schemeClr val="accent4"/>
+          </a:effectRef>
+          <a:fontRef idx="minor">
+            <a:schemeClr val="tx1"/>
+          </a:fontRef>
+        </p:style>
+      </p:cxnSp>
+      <p:cxnSp>
+        <p:nvCxnSpPr>
+          <p:cNvPr id="123" name="直接连接符 122">
+            <a:extLst>
+              <a:ext uri="{FF2B5EF4-FFF2-40B4-BE49-F238E27FC236}">
+                <a16:creationId xmlns:a16="http://schemas.microsoft.com/office/drawing/2014/main" id="{29948541-624F-4372-8D04-AE749C2513D5}"/>
+              </a:ext>
+            </a:extLst>
+          </p:cNvPr>
+          <p:cNvCxnSpPr>
+            <a:cxnSpLocks/>
+            <a:endCxn id="77" idx="3"/>
+          </p:cNvCxnSpPr>
+          <p:nvPr/>
+        </p:nvCxnSpPr>
+        <p:spPr>
+          <a:xfrm flipH="1">
+            <a:off x="8559210" y="6241295"/>
+            <a:ext cx="356068" cy="0"/>
+          </a:xfrm>
+          <a:prstGeom prst="line">
+            <a:avLst/>
+          </a:prstGeom>
+          <a:ln w="19050">
+            <a:prstDash val="dash"/>
+          </a:ln>
+        </p:spPr>
+        <p:style>
+          <a:lnRef idx="1">
+            <a:schemeClr val="accent4"/>
+          </a:lnRef>
+          <a:fillRef idx="0">
+            <a:schemeClr val="accent4"/>
+          </a:fillRef>
+          <a:effectRef idx="0">
+            <a:schemeClr val="accent4"/>
+          </a:effectRef>
+          <a:fontRef idx="minor">
+            <a:schemeClr val="tx1"/>
+          </a:fontRef>
+        </p:style>
+      </p:cxnSp>
+      <p:cxnSp>
+        <p:nvCxnSpPr>
+          <p:cNvPr id="124" name="直接连接符 123">
+            <a:extLst>
+              <a:ext uri="{FF2B5EF4-FFF2-40B4-BE49-F238E27FC236}">
+                <a16:creationId xmlns:a16="http://schemas.microsoft.com/office/drawing/2014/main" id="{805D1DC1-4F41-4A13-870B-57829BEED399}"/>
+              </a:ext>
+            </a:extLst>
+          </p:cNvPr>
+          <p:cNvCxnSpPr>
+            <a:cxnSpLocks/>
+          </p:cNvCxnSpPr>
+          <p:nvPr/>
+        </p:nvCxnSpPr>
+        <p:spPr>
+          <a:xfrm flipH="1">
+            <a:off x="8568654" y="5742135"/>
+            <a:ext cx="356068" cy="0"/>
+          </a:xfrm>
+          <a:prstGeom prst="line">
+            <a:avLst/>
+          </a:prstGeom>
+          <a:ln w="19050">
+            <a:prstDash val="dash"/>
+          </a:ln>
+        </p:spPr>
+        <p:style>
+          <a:lnRef idx="1">
+            <a:schemeClr val="accent4"/>
+          </a:lnRef>
+          <a:fillRef idx="0">
+            <a:schemeClr val="accent4"/>
+          </a:fillRef>
+          <a:effectRef idx="0">
+            <a:schemeClr val="accent4"/>
+          </a:effectRef>
+          <a:fontRef idx="minor">
+            <a:schemeClr val="tx1"/>
+          </a:fontRef>
+        </p:style>
+      </p:cxnSp>
+      <p:cxnSp>
+        <p:nvCxnSpPr>
+          <p:cNvPr id="125" name="直接连接符 124">
+            <a:extLst>
+              <a:ext uri="{FF2B5EF4-FFF2-40B4-BE49-F238E27FC236}">
+                <a16:creationId xmlns:a16="http://schemas.microsoft.com/office/drawing/2014/main" id="{ED349FCF-6C24-48D5-BD93-3E348804B8B0}"/>
+              </a:ext>
+            </a:extLst>
+          </p:cNvPr>
+          <p:cNvCxnSpPr>
+            <a:cxnSpLocks/>
+          </p:cNvCxnSpPr>
+          <p:nvPr/>
+        </p:nvCxnSpPr>
+        <p:spPr>
+          <a:xfrm flipH="1">
+            <a:off x="8559210" y="5228380"/>
+            <a:ext cx="356068" cy="0"/>
+          </a:xfrm>
+          <a:prstGeom prst="line">
+            <a:avLst/>
+          </a:prstGeom>
+          <a:ln w="19050">
+            <a:prstDash val="dash"/>
+          </a:ln>
+        </p:spPr>
+        <p:style>
+          <a:lnRef idx="1">
+            <a:schemeClr val="accent4"/>
+          </a:lnRef>
+          <a:fillRef idx="0">
+            <a:schemeClr val="accent4"/>
+          </a:fillRef>
+          <a:effectRef idx="0">
+            <a:schemeClr val="accent4"/>
+          </a:effectRef>
+          <a:fontRef idx="minor">
+            <a:schemeClr val="tx1"/>
+          </a:fontRef>
+        </p:style>
+      </p:cxnSp>
+      <p:cxnSp>
+        <p:nvCxnSpPr>
+          <p:cNvPr id="126" name="直接连接符 125">
+            <a:extLst>
+              <a:ext uri="{FF2B5EF4-FFF2-40B4-BE49-F238E27FC236}">
+                <a16:creationId xmlns:a16="http://schemas.microsoft.com/office/drawing/2014/main" id="{9999FE68-DBEB-4AE4-B2DE-C1F4EE17842D}"/>
+              </a:ext>
+            </a:extLst>
+          </p:cNvPr>
+          <p:cNvCxnSpPr>
+            <a:cxnSpLocks/>
+          </p:cNvCxnSpPr>
+          <p:nvPr/>
+        </p:nvCxnSpPr>
+        <p:spPr>
+          <a:xfrm flipH="1">
+            <a:off x="8559210" y="4659634"/>
+            <a:ext cx="356068" cy="0"/>
+          </a:xfrm>
+          <a:prstGeom prst="line">
+            <a:avLst/>
+          </a:prstGeom>
+          <a:ln w="19050">
+            <a:prstDash val="dash"/>
+          </a:ln>
+        </p:spPr>
+        <p:style>
+          <a:lnRef idx="1">
+            <a:schemeClr val="accent4"/>
+          </a:lnRef>
+          <a:fillRef idx="0">
+            <a:schemeClr val="accent4"/>
+          </a:fillRef>
+          <a:effectRef idx="0">
+            <a:schemeClr val="accent4"/>
+          </a:effectRef>
+          <a:fontRef idx="minor">
+            <a:schemeClr val="tx1"/>
           </a:fontRef>
         </p:style>
       </p:cxnSp>
@@ -6228,7 +7118,7 @@
         </p:nvSpPr>
         <p:spPr>
           <a:xfrm>
-            <a:off x="1009446" y="3810000"/>
+            <a:off x="228600" y="4825676"/>
             <a:ext cx="929296" cy="346760"/>
           </a:xfrm>
           <a:prstGeom prst="rect">
@@ -6272,7 +7162,7 @@
         </p:nvSpPr>
         <p:spPr>
           <a:xfrm>
-            <a:off x="2600202" y="4414289"/>
+            <a:off x="1819356" y="5429965"/>
             <a:ext cx="929296" cy="346760"/>
           </a:xfrm>
           <a:prstGeom prst="rect">
@@ -6319,7 +7209,7 @@
         </p:nvCxnSpPr>
         <p:spPr>
           <a:xfrm>
-            <a:off x="2188550" y="3983380"/>
+            <a:off x="1407704" y="4999056"/>
             <a:ext cx="411652" cy="604289"/>
           </a:xfrm>
           <a:prstGeom prst="bentConnector3">
@@ -6356,7 +7246,7 @@
         </p:nvSpPr>
         <p:spPr>
           <a:xfrm>
-            <a:off x="1952502" y="3896690"/>
+            <a:off x="1171656" y="4912366"/>
             <a:ext cx="236048" cy="173380"/>
           </a:xfrm>
           <a:prstGeom prst="flowChartDecision">
@@ -6399,7 +7289,7 @@
         </p:nvSpPr>
         <p:spPr>
           <a:xfrm>
-            <a:off x="2600202" y="4913449"/>
+            <a:off x="1819356" y="5929125"/>
             <a:ext cx="929296" cy="346760"/>
           </a:xfrm>
           <a:prstGeom prst="rect">
@@ -6443,7 +7333,7 @@
         </p:nvSpPr>
         <p:spPr>
           <a:xfrm>
-            <a:off x="2600202" y="3896690"/>
+            <a:off x="1819356" y="4912366"/>
             <a:ext cx="929296" cy="346760"/>
           </a:xfrm>
           <a:prstGeom prst="rect">
@@ -6487,7 +7377,7 @@
         </p:nvSpPr>
         <p:spPr>
           <a:xfrm>
-            <a:off x="2600202" y="3352800"/>
+            <a:off x="1819356" y="4368476"/>
             <a:ext cx="929296" cy="346760"/>
           </a:xfrm>
           <a:prstGeom prst="rect">
@@ -6534,7 +7424,7 @@
         </p:nvCxnSpPr>
         <p:spPr>
           <a:xfrm flipV="1">
-            <a:off x="2188550" y="3526180"/>
+            <a:off x="1407704" y="4541856"/>
             <a:ext cx="411652" cy="457200"/>
           </a:xfrm>
           <a:prstGeom prst="bentConnector3">
@@ -6574,7 +7464,7 @@
         </p:nvCxnSpPr>
         <p:spPr>
           <a:xfrm>
-            <a:off x="2188550" y="3983380"/>
+            <a:off x="1407704" y="4999056"/>
             <a:ext cx="411652" cy="1103449"/>
           </a:xfrm>
           <a:prstGeom prst="bentConnector3">
@@ -6614,7 +7504,7 @@
         </p:nvCxnSpPr>
         <p:spPr>
           <a:xfrm>
-            <a:off x="2188550" y="3983380"/>
+            <a:off x="1407704" y="4999056"/>
             <a:ext cx="411652" cy="86690"/>
           </a:xfrm>
           <a:prstGeom prst="bentConnector3">
@@ -6971,7 +7861,7 @@
         </p:nvSpPr>
         <p:spPr>
           <a:xfrm>
-            <a:off x="6132002" y="4597467"/>
+            <a:off x="6789713" y="4473304"/>
             <a:ext cx="1868998" cy="327923"/>
           </a:xfrm>
           <a:prstGeom prst="rect">
@@ -7014,7 +7904,7 @@
         </p:nvSpPr>
         <p:spPr>
           <a:xfrm>
-            <a:off x="4481146" y="4467827"/>
+            <a:off x="5138857" y="4343664"/>
             <a:ext cx="929296" cy="346760"/>
           </a:xfrm>
           <a:prstGeom prst="rect">
@@ -7058,7 +7948,7 @@
         </p:nvSpPr>
         <p:spPr>
           <a:xfrm>
-            <a:off x="4481146" y="4862814"/>
+            <a:off x="5138857" y="4738651"/>
             <a:ext cx="929296" cy="346760"/>
           </a:xfrm>
           <a:prstGeom prst="rect">
@@ -7102,7 +7992,7 @@
         </p:nvSpPr>
         <p:spPr>
           <a:xfrm>
-            <a:off x="4481146" y="5257800"/>
+            <a:off x="5138857" y="5133637"/>
             <a:ext cx="929296" cy="346760"/>
           </a:xfrm>
           <a:prstGeom prst="rect">
@@ -7146,7 +8036,7 @@
         </p:nvSpPr>
         <p:spPr>
           <a:xfrm rot="5400000">
-            <a:off x="5896110" y="4726825"/>
+            <a:off x="6553821" y="4602662"/>
             <a:ext cx="270504" cy="175523"/>
           </a:xfrm>
           <a:prstGeom prst="triangle">
@@ -7189,7 +8079,7 @@
         </p:nvCxnSpPr>
         <p:spPr>
           <a:xfrm rot="10800000" flipV="1">
-            <a:off x="5410443" y="4814586"/>
+            <a:off x="6068154" y="4690423"/>
             <a:ext cx="533159" cy="221607"/>
           </a:xfrm>
           <a:prstGeom prst="bentConnector3">
@@ -7228,7 +8118,7 @@
         </p:nvCxnSpPr>
         <p:spPr>
           <a:xfrm rot="10800000">
-            <a:off x="5410443" y="4641207"/>
+            <a:off x="6068154" y="4517044"/>
             <a:ext cx="533159" cy="173380"/>
           </a:xfrm>
           <a:prstGeom prst="bentConnector3">
@@ -7267,7 +8157,7 @@
         </p:nvCxnSpPr>
         <p:spPr>
           <a:xfrm rot="10800000" flipV="1">
-            <a:off x="5410443" y="4814586"/>
+            <a:off x="6068154" y="4690423"/>
             <a:ext cx="533159" cy="616593"/>
           </a:xfrm>
           <a:prstGeom prst="bentConnector3">
@@ -7303,7 +8193,7 @@
         </p:nvSpPr>
         <p:spPr>
           <a:xfrm>
-            <a:off x="4481146" y="4072840"/>
+            <a:off x="5138857" y="3948677"/>
             <a:ext cx="929296" cy="346760"/>
           </a:xfrm>
           <a:prstGeom prst="rect">
@@ -7350,7 +8240,7 @@
         </p:nvCxnSpPr>
         <p:spPr>
           <a:xfrm rot="10800000">
-            <a:off x="5410443" y="4246221"/>
+            <a:off x="6068154" y="4122058"/>
             <a:ext cx="533159" cy="568367"/>
           </a:xfrm>
           <a:prstGeom prst="bentConnector3">
@@ -7386,7 +8276,7 @@
         </p:nvSpPr>
         <p:spPr>
           <a:xfrm>
-            <a:off x="6132002" y="4925292"/>
+            <a:off x="6789713" y="4801129"/>
             <a:ext cx="1868998" cy="122745"/>
           </a:xfrm>
           <a:prstGeom prst="rect">
@@ -7426,7 +8316,7 @@
         </p:nvSpPr>
         <p:spPr>
           <a:xfrm>
-            <a:off x="6132002" y="5043684"/>
+            <a:off x="6789713" y="4919521"/>
             <a:ext cx="1868998" cy="271943"/>
           </a:xfrm>
           <a:prstGeom prst="rect">
@@ -7478,7 +8368,7 @@
         </p:nvSpPr>
         <p:spPr>
           <a:xfrm>
-            <a:off x="1031322" y="1206785"/>
+            <a:off x="441202" y="911424"/>
             <a:ext cx="929296" cy="346760"/>
           </a:xfrm>
           <a:prstGeom prst="rect">
@@ -7522,7 +8412,7 @@
         </p:nvSpPr>
         <p:spPr>
           <a:xfrm>
-            <a:off x="2647520" y="517686"/>
+            <a:off x="2057400" y="222325"/>
             <a:ext cx="929296" cy="346760"/>
           </a:xfrm>
           <a:prstGeom prst="rect">
@@ -7573,7 +8463,7 @@
         </p:nvSpPr>
         <p:spPr>
           <a:xfrm>
-            <a:off x="2621143" y="1837811"/>
+            <a:off x="2031023" y="1542450"/>
             <a:ext cx="929296" cy="346760"/>
           </a:xfrm>
           <a:prstGeom prst="rect">
@@ -7624,7 +8514,7 @@
         </p:nvSpPr>
         <p:spPr>
           <a:xfrm>
-            <a:off x="4190165" y="1837811"/>
+            <a:off x="3600045" y="1542450"/>
             <a:ext cx="929296" cy="346760"/>
           </a:xfrm>
           <a:prstGeom prst="rect">
@@ -7671,7 +8561,7 @@
         </p:nvCxnSpPr>
         <p:spPr>
           <a:xfrm flipV="1">
-            <a:off x="2196666" y="691066"/>
+            <a:off x="1606546" y="395705"/>
             <a:ext cx="450854" cy="687145"/>
           </a:xfrm>
           <a:prstGeom prst="bentConnector3">
@@ -7709,7 +8599,7 @@
         </p:nvCxnSpPr>
         <p:spPr>
           <a:xfrm>
-            <a:off x="2196666" y="1378211"/>
+            <a:off x="1606546" y="1082850"/>
             <a:ext cx="424477" cy="632980"/>
           </a:xfrm>
           <a:prstGeom prst="bentConnector3">
@@ -7746,7 +8636,7 @@
         </p:nvSpPr>
         <p:spPr>
           <a:xfrm>
-            <a:off x="4190165" y="517686"/>
+            <a:off x="3600045" y="222325"/>
             <a:ext cx="929296" cy="346760"/>
           </a:xfrm>
           <a:prstGeom prst="rect">
@@ -7790,7 +8680,7 @@
         </p:nvSpPr>
         <p:spPr>
           <a:xfrm>
-            <a:off x="3576816" y="617076"/>
+            <a:off x="2986696" y="321715"/>
             <a:ext cx="236048" cy="173380"/>
           </a:xfrm>
           <a:prstGeom prst="flowChartDecision">
@@ -7831,7 +8721,7 @@
         </p:nvSpPr>
         <p:spPr>
           <a:xfrm>
-            <a:off x="3540415" y="1924501"/>
+            <a:off x="2950295" y="1629140"/>
             <a:ext cx="236048" cy="173380"/>
           </a:xfrm>
           <a:prstGeom prst="flowChartDecision">
@@ -7872,7 +8762,7 @@
         </p:nvSpPr>
         <p:spPr>
           <a:xfrm>
-            <a:off x="1960618" y="1291521"/>
+            <a:off x="1370498" y="996160"/>
             <a:ext cx="236048" cy="173380"/>
           </a:xfrm>
           <a:prstGeom prst="flowChartDecision">
@@ -7918,7 +8808,7 @@
         </p:nvCxnSpPr>
         <p:spPr>
           <a:xfrm flipV="1">
-            <a:off x="3812864" y="691066"/>
+            <a:off x="3222744" y="395705"/>
             <a:ext cx="377301" cy="12700"/>
           </a:xfrm>
           <a:prstGeom prst="straightConnector1">
@@ -7956,7 +8846,7 @@
         </p:nvCxnSpPr>
         <p:spPr>
           <a:xfrm>
-            <a:off x="3776463" y="2011191"/>
+            <a:off x="3186343" y="1715830"/>
             <a:ext cx="413702" cy="0"/>
           </a:xfrm>
           <a:prstGeom prst="straightConnector1">
@@ -7991,7 +8881,7 @@
         </p:nvSpPr>
         <p:spPr>
           <a:xfrm>
-            <a:off x="3348216" y="1195623"/>
+            <a:off x="2758096" y="900262"/>
             <a:ext cx="929296" cy="346760"/>
           </a:xfrm>
           <a:prstGeom prst="rect">
@@ -8038,7 +8928,7 @@
         </p:nvCxnSpPr>
         <p:spPr>
           <a:xfrm flipV="1">
-            <a:off x="4654813" y="864446"/>
+            <a:off x="4064693" y="569085"/>
             <a:ext cx="0" cy="973365"/>
           </a:xfrm>
           <a:prstGeom prst="straightConnector1">
@@ -8075,7 +8965,7 @@
         </p:nvCxnSpPr>
         <p:spPr>
           <a:xfrm>
-            <a:off x="4277512" y="1369003"/>
+            <a:off x="3687392" y="1073642"/>
             <a:ext cx="377301" cy="0"/>
           </a:xfrm>
           <a:prstGeom prst="line">
@@ -8114,7 +9004,7 @@
         </p:nvCxnSpPr>
         <p:spPr>
           <a:xfrm flipV="1">
-            <a:off x="2196666" y="1369003"/>
+            <a:off x="1606546" y="1073642"/>
             <a:ext cx="1151550" cy="9208"/>
           </a:xfrm>
           <a:prstGeom prst="straightConnector1">
@@ -8149,7 +9039,7 @@
         </p:nvSpPr>
         <p:spPr>
           <a:xfrm>
-            <a:off x="3112168" y="1066800"/>
+            <a:off x="2522048" y="771439"/>
             <a:ext cx="88232" cy="369332"/>
           </a:xfrm>
           <a:prstGeom prst="rect">
@@ -8184,7 +9074,7 @@
         </p:nvSpPr>
         <p:spPr>
           <a:xfrm>
-            <a:off x="2753969" y="1343892"/>
+            <a:off x="2163849" y="1048531"/>
             <a:ext cx="777998" cy="261610"/>
           </a:xfrm>
           <a:prstGeom prst="rect">
@@ -8218,6 +9108,459 @@
           </a:p>
         </p:txBody>
       </p:sp>
+      <p:sp>
+        <p:nvSpPr>
+          <p:cNvPr id="50" name="Rectangle 6">
+            <a:extLst>
+              <a:ext uri="{FF2B5EF4-FFF2-40B4-BE49-F238E27FC236}">
+                <a16:creationId xmlns:a16="http://schemas.microsoft.com/office/drawing/2014/main" id="{C044A9BD-F032-4048-B415-BFD8E6A133C7}"/>
+              </a:ext>
+            </a:extLst>
+          </p:cNvPr>
+          <p:cNvSpPr/>
+          <p:nvPr/>
+        </p:nvSpPr>
+        <p:spPr>
+          <a:xfrm>
+            <a:off x="1447800" y="3127127"/>
+            <a:ext cx="1905000" cy="327923"/>
+          </a:xfrm>
+          <a:prstGeom prst="rect">
+            <a:avLst/>
+          </a:prstGeom>
+          <a:ln w="19050"/>
+          <a:effectLst/>
+        </p:spPr>
+        <p:style>
+          <a:lnRef idx="1">
+            <a:schemeClr val="accent4"/>
+          </a:lnRef>
+          <a:fillRef idx="2">
+            <a:schemeClr val="accent4"/>
+          </a:fillRef>
+          <a:effectRef idx="1">
+            <a:schemeClr val="accent4"/>
+          </a:effectRef>
+          <a:fontRef idx="minor">
+            <a:schemeClr val="dk1"/>
+          </a:fontRef>
+        </p:style>
+        <p:txBody>
+          <a:bodyPr rtlCol="0" anchor="ctr"/>
+          <a:lstStyle/>
+          <a:p>
+            <a:pPr algn="ctr"/>
+            <a:r>
+              <a:rPr lang="en-SG" sz="1050" dirty="0"/>
+              <a:t>&lt;&lt;interface&gt;&gt; </a:t>
+            </a:r>
+            <a:r>
+              <a:rPr lang="en-SG" sz="1050" dirty="0" err="1"/>
+              <a:t>AddressComponent</a:t>
+            </a:r>
+            <a:endParaRPr lang="en-SG" sz="1050" dirty="0"/>
+          </a:p>
+        </p:txBody>
+      </p:sp>
+      <p:sp>
+        <p:nvSpPr>
+          <p:cNvPr id="61" name="Rectangle 6">
+            <a:extLst>
+              <a:ext uri="{FF2B5EF4-FFF2-40B4-BE49-F238E27FC236}">
+                <a16:creationId xmlns:a16="http://schemas.microsoft.com/office/drawing/2014/main" id="{4DB869D7-7420-4933-B3FD-5216FBDEE605}"/>
+              </a:ext>
+            </a:extLst>
+          </p:cNvPr>
+          <p:cNvSpPr/>
+          <p:nvPr/>
+        </p:nvSpPr>
+        <p:spPr>
+          <a:xfrm>
+            <a:off x="1447800" y="3454952"/>
+            <a:ext cx="1905000" cy="118391"/>
+          </a:xfrm>
+          <a:prstGeom prst="rect">
+            <a:avLst/>
+          </a:prstGeom>
+          <a:ln w="19050"/>
+          <a:effectLst/>
+        </p:spPr>
+        <p:style>
+          <a:lnRef idx="1">
+            <a:schemeClr val="accent4"/>
+          </a:lnRef>
+          <a:fillRef idx="2">
+            <a:schemeClr val="accent4"/>
+          </a:fillRef>
+          <a:effectRef idx="1">
+            <a:schemeClr val="accent4"/>
+          </a:effectRef>
+          <a:fontRef idx="minor">
+            <a:schemeClr val="dk1"/>
+          </a:fontRef>
+        </p:style>
+        <p:txBody>
+          <a:bodyPr rtlCol="0" anchor="ctr"/>
+          <a:lstStyle/>
+          <a:p>
+            <a:pPr algn="ctr"/>
+            <a:endParaRPr lang="en-SG" sz="1050" dirty="0"/>
+          </a:p>
+        </p:txBody>
+      </p:sp>
+      <p:sp>
+        <p:nvSpPr>
+          <p:cNvPr id="62" name="Rectangle 6">
+            <a:extLst>
+              <a:ext uri="{FF2B5EF4-FFF2-40B4-BE49-F238E27FC236}">
+                <a16:creationId xmlns:a16="http://schemas.microsoft.com/office/drawing/2014/main" id="{2AA34B7A-21BF-463A-AE31-24792691AE99}"/>
+              </a:ext>
+            </a:extLst>
+          </p:cNvPr>
+          <p:cNvSpPr/>
+          <p:nvPr/>
+        </p:nvSpPr>
+        <p:spPr>
+          <a:xfrm>
+            <a:off x="1447800" y="3573344"/>
+            <a:ext cx="1905000" cy="271943"/>
+          </a:xfrm>
+          <a:prstGeom prst="rect">
+            <a:avLst/>
+          </a:prstGeom>
+          <a:ln w="19050"/>
+          <a:effectLst/>
+        </p:spPr>
+        <p:style>
+          <a:lnRef idx="1">
+            <a:schemeClr val="accent4"/>
+          </a:lnRef>
+          <a:fillRef idx="2">
+            <a:schemeClr val="accent4"/>
+          </a:fillRef>
+          <a:effectRef idx="1">
+            <a:schemeClr val="accent4"/>
+          </a:effectRef>
+          <a:fontRef idx="minor">
+            <a:schemeClr val="dk1"/>
+          </a:fontRef>
+        </p:style>
+        <p:txBody>
+          <a:bodyPr rtlCol="0" anchor="ctr"/>
+          <a:lstStyle/>
+          <a:p>
+            <a:pPr algn="ctr"/>
+            <a:r>
+              <a:rPr lang="en-US" sz="1050" dirty="0"/>
+              <a:t>+</a:t>
+            </a:r>
+            <a:r>
+              <a:rPr lang="en-US" sz="1050" dirty="0" err="1"/>
+              <a:t>isValidAddress</a:t>
+            </a:r>
+            <a:r>
+              <a:rPr lang="en-US" sz="1050" dirty="0"/>
+              <a:t>(String address)</a:t>
+            </a:r>
+            <a:endParaRPr lang="en-SG" sz="1050" dirty="0"/>
+          </a:p>
+        </p:txBody>
+      </p:sp>
+      <p:sp>
+        <p:nvSpPr>
+          <p:cNvPr id="63" name="Isosceles Triangle 24">
+            <a:extLst>
+              <a:ext uri="{FF2B5EF4-FFF2-40B4-BE49-F238E27FC236}">
+                <a16:creationId xmlns:a16="http://schemas.microsoft.com/office/drawing/2014/main" id="{FAC2D536-9817-4DD5-A1D6-5F4F53F1E923}"/>
+              </a:ext>
+            </a:extLst>
+          </p:cNvPr>
+          <p:cNvSpPr/>
+          <p:nvPr/>
+        </p:nvSpPr>
+        <p:spPr>
+          <a:xfrm>
+            <a:off x="2129796" y="3845555"/>
+            <a:ext cx="270504" cy="175523"/>
+          </a:xfrm>
+          <a:prstGeom prst="triangle">
+            <a:avLst/>
+          </a:prstGeom>
+          <a:ln w="19050"/>
+          <a:effectLst/>
+        </p:spPr>
+        <p:style>
+          <a:lnRef idx="1">
+            <a:schemeClr val="accent4"/>
+          </a:lnRef>
+          <a:fillRef idx="2">
+            <a:schemeClr val="accent4"/>
+          </a:fillRef>
+          <a:effectRef idx="1">
+            <a:schemeClr val="accent4"/>
+          </a:effectRef>
+          <a:fontRef idx="minor">
+            <a:schemeClr val="dk1"/>
+          </a:fontRef>
+        </p:style>
+        <p:txBody>
+          <a:bodyPr rtlCol="0" anchor="ctr"/>
+          <a:lstStyle/>
+          <a:p>
+            <a:pPr algn="ctr"/>
+            <a:endParaRPr lang="en-SG" sz="1050"/>
+          </a:p>
+        </p:txBody>
+      </p:sp>
+      <p:cxnSp>
+        <p:nvCxnSpPr>
+          <p:cNvPr id="64" name="Elbow Connector 26">
+            <a:extLst>
+              <a:ext uri="{FF2B5EF4-FFF2-40B4-BE49-F238E27FC236}">
+                <a16:creationId xmlns:a16="http://schemas.microsoft.com/office/drawing/2014/main" id="{42145CED-9599-42EA-98F1-E3150574ABC1}"/>
+              </a:ext>
+            </a:extLst>
+          </p:cNvPr>
+          <p:cNvCxnSpPr>
+            <a:cxnSpLocks/>
+            <a:endCxn id="63" idx="3"/>
+          </p:cNvCxnSpPr>
+          <p:nvPr/>
+        </p:nvCxnSpPr>
+        <p:spPr>
+          <a:xfrm rot="10800000">
+            <a:off x="2265048" y="4021079"/>
+            <a:ext cx="839672" cy="170839"/>
+          </a:xfrm>
+          <a:prstGeom prst="bentConnector2">
+            <a:avLst/>
+          </a:prstGeom>
+          <a:ln w="19050">
+            <a:prstDash val="dash"/>
+          </a:ln>
+          <a:effectLst/>
+        </p:spPr>
+        <p:style>
+          <a:lnRef idx="1">
+            <a:schemeClr val="accent4"/>
+          </a:lnRef>
+          <a:fillRef idx="2">
+            <a:schemeClr val="accent4"/>
+          </a:fillRef>
+          <a:effectRef idx="1">
+            <a:schemeClr val="accent4"/>
+          </a:effectRef>
+          <a:fontRef idx="minor">
+            <a:schemeClr val="dk1"/>
+          </a:fontRef>
+        </p:style>
+      </p:cxnSp>
+      <p:cxnSp>
+        <p:nvCxnSpPr>
+          <p:cNvPr id="68" name="直接连接符 67">
+            <a:extLst>
+              <a:ext uri="{FF2B5EF4-FFF2-40B4-BE49-F238E27FC236}">
+                <a16:creationId xmlns:a16="http://schemas.microsoft.com/office/drawing/2014/main" id="{7199A964-6BB9-4B8B-91E3-4AA73C97AAB3}"/>
+              </a:ext>
+            </a:extLst>
+          </p:cNvPr>
+          <p:cNvCxnSpPr>
+            <a:cxnSpLocks/>
+          </p:cNvCxnSpPr>
+          <p:nvPr/>
+        </p:nvCxnSpPr>
+        <p:spPr>
+          <a:xfrm>
+            <a:off x="3104720" y="4191919"/>
+            <a:ext cx="0" cy="1910586"/>
+          </a:xfrm>
+          <a:prstGeom prst="line">
+            <a:avLst/>
+          </a:prstGeom>
+          <a:ln w="19050">
+            <a:prstDash val="dash"/>
+          </a:ln>
+        </p:spPr>
+        <p:style>
+          <a:lnRef idx="1">
+            <a:schemeClr val="accent4"/>
+          </a:lnRef>
+          <a:fillRef idx="0">
+            <a:schemeClr val="accent4"/>
+          </a:fillRef>
+          <a:effectRef idx="0">
+            <a:schemeClr val="accent4"/>
+          </a:effectRef>
+          <a:fontRef idx="minor">
+            <a:schemeClr val="tx1"/>
+          </a:fontRef>
+        </p:style>
+      </p:cxnSp>
+      <p:cxnSp>
+        <p:nvCxnSpPr>
+          <p:cNvPr id="70" name="直接连接符 69">
+            <a:extLst>
+              <a:ext uri="{FF2B5EF4-FFF2-40B4-BE49-F238E27FC236}">
+                <a16:creationId xmlns:a16="http://schemas.microsoft.com/office/drawing/2014/main" id="{D2F1CFCF-5EF4-420E-982C-26C4C934279B}"/>
+              </a:ext>
+            </a:extLst>
+          </p:cNvPr>
+          <p:cNvCxnSpPr>
+            <a:cxnSpLocks/>
+            <a:endCxn id="6" idx="3"/>
+          </p:cNvCxnSpPr>
+          <p:nvPr/>
+        </p:nvCxnSpPr>
+        <p:spPr>
+          <a:xfrm flipH="1">
+            <a:off x="2748652" y="6102505"/>
+            <a:ext cx="356068" cy="0"/>
+          </a:xfrm>
+          <a:prstGeom prst="line">
+            <a:avLst/>
+          </a:prstGeom>
+          <a:ln w="19050">
+            <a:prstDash val="dash"/>
+          </a:ln>
+        </p:spPr>
+        <p:style>
+          <a:lnRef idx="1">
+            <a:schemeClr val="accent4"/>
+          </a:lnRef>
+          <a:fillRef idx="0">
+            <a:schemeClr val="accent4"/>
+          </a:fillRef>
+          <a:effectRef idx="0">
+            <a:schemeClr val="accent4"/>
+          </a:effectRef>
+          <a:fontRef idx="minor">
+            <a:schemeClr val="tx1"/>
+          </a:fontRef>
+        </p:style>
+      </p:cxnSp>
+      <p:cxnSp>
+        <p:nvCxnSpPr>
+          <p:cNvPr id="73" name="直接连接符 72">
+            <a:extLst>
+              <a:ext uri="{FF2B5EF4-FFF2-40B4-BE49-F238E27FC236}">
+                <a16:creationId xmlns:a16="http://schemas.microsoft.com/office/drawing/2014/main" id="{705A3F67-ED98-4C51-AFE9-E04E22F600C5}"/>
+              </a:ext>
+            </a:extLst>
+          </p:cNvPr>
+          <p:cNvCxnSpPr>
+            <a:cxnSpLocks/>
+          </p:cNvCxnSpPr>
+          <p:nvPr/>
+        </p:nvCxnSpPr>
+        <p:spPr>
+          <a:xfrm flipH="1">
+            <a:off x="2758096" y="5603345"/>
+            <a:ext cx="356068" cy="0"/>
+          </a:xfrm>
+          <a:prstGeom prst="line">
+            <a:avLst/>
+          </a:prstGeom>
+          <a:ln w="19050">
+            <a:prstDash val="dash"/>
+          </a:ln>
+        </p:spPr>
+        <p:style>
+          <a:lnRef idx="1">
+            <a:schemeClr val="accent4"/>
+          </a:lnRef>
+          <a:fillRef idx="0">
+            <a:schemeClr val="accent4"/>
+          </a:fillRef>
+          <a:effectRef idx="0">
+            <a:schemeClr val="accent4"/>
+          </a:effectRef>
+          <a:fontRef idx="minor">
+            <a:schemeClr val="tx1"/>
+          </a:fontRef>
+        </p:style>
+      </p:cxnSp>
+      <p:cxnSp>
+        <p:nvCxnSpPr>
+          <p:cNvPr id="74" name="直接连接符 73">
+            <a:extLst>
+              <a:ext uri="{FF2B5EF4-FFF2-40B4-BE49-F238E27FC236}">
+                <a16:creationId xmlns:a16="http://schemas.microsoft.com/office/drawing/2014/main" id="{8CD0BDE3-7F52-4D8E-9B4D-598B6EE34EEC}"/>
+              </a:ext>
+            </a:extLst>
+          </p:cNvPr>
+          <p:cNvCxnSpPr>
+            <a:cxnSpLocks/>
+          </p:cNvCxnSpPr>
+          <p:nvPr/>
+        </p:nvCxnSpPr>
+        <p:spPr>
+          <a:xfrm flipH="1">
+            <a:off x="2748652" y="5089590"/>
+            <a:ext cx="356068" cy="0"/>
+          </a:xfrm>
+          <a:prstGeom prst="line">
+            <a:avLst/>
+          </a:prstGeom>
+          <a:ln w="19050">
+            <a:prstDash val="dash"/>
+          </a:ln>
+        </p:spPr>
+        <p:style>
+          <a:lnRef idx="1">
+            <a:schemeClr val="accent4"/>
+          </a:lnRef>
+          <a:fillRef idx="0">
+            <a:schemeClr val="accent4"/>
+          </a:fillRef>
+          <a:effectRef idx="0">
+            <a:schemeClr val="accent4"/>
+          </a:effectRef>
+          <a:fontRef idx="minor">
+            <a:schemeClr val="tx1"/>
+          </a:fontRef>
+        </p:style>
+      </p:cxnSp>
+      <p:cxnSp>
+        <p:nvCxnSpPr>
+          <p:cNvPr id="75" name="直接连接符 74">
+            <a:extLst>
+              <a:ext uri="{FF2B5EF4-FFF2-40B4-BE49-F238E27FC236}">
+                <a16:creationId xmlns:a16="http://schemas.microsoft.com/office/drawing/2014/main" id="{A69AE8D5-89DA-4789-9FC9-FFDC813C8296}"/>
+              </a:ext>
+            </a:extLst>
+          </p:cNvPr>
+          <p:cNvCxnSpPr>
+            <a:cxnSpLocks/>
+          </p:cNvCxnSpPr>
+          <p:nvPr/>
+        </p:nvCxnSpPr>
+        <p:spPr>
+          <a:xfrm flipH="1">
+            <a:off x="2748652" y="4520844"/>
+            <a:ext cx="356068" cy="0"/>
+          </a:xfrm>
+          <a:prstGeom prst="line">
+            <a:avLst/>
+          </a:prstGeom>
+          <a:ln w="19050">
+            <a:prstDash val="dash"/>
+          </a:ln>
+        </p:spPr>
+        <p:style>
+          <a:lnRef idx="1">
+            <a:schemeClr val="accent4"/>
+          </a:lnRef>
+          <a:fillRef idx="0">
+            <a:schemeClr val="accent4"/>
+          </a:fillRef>
+          <a:effectRef idx="0">
+            <a:schemeClr val="accent4"/>
+          </a:effectRef>
+          <a:fontRef idx="minor">
+            <a:schemeClr val="tx1"/>
+          </a:fontRef>
+        </p:style>
+      </p:cxnSp>
     </p:spTree>
     <p:extLst>
       <p:ext uri="{BB962C8B-B14F-4D97-AF65-F5344CB8AC3E}">
@@ -9336,4 +10679,299 @@
   <a:objectDefaults/>
   <a:extraClrSchemeLst/>
 </a:theme>
+</file>
+
+<file path=ppt/theme/theme2.xml><?xml version="1.0" encoding="utf-8"?>
+<a:theme xmlns:a="http://schemas.openxmlformats.org/drawingml/2006/main" name="Office 主题​​">
+  <a:themeElements>
+    <a:clrScheme name="Office">
+      <a:dk1>
+        <a:sysClr val="windowText" lastClr="000000"/>
+      </a:dk1>
+      <a:lt1>
+        <a:sysClr val="window" lastClr="FFFFFF"/>
+      </a:lt1>
+      <a:dk2>
+        <a:srgbClr val="44546A"/>
+      </a:dk2>
+      <a:lt2>
+        <a:srgbClr val="E7E6E6"/>
+      </a:lt2>
+      <a:accent1>
+        <a:srgbClr val="4472C4"/>
+      </a:accent1>
+      <a:accent2>
+        <a:srgbClr val="ED7D31"/>
+      </a:accent2>
+      <a:accent3>
+        <a:srgbClr val="A5A5A5"/>
+      </a:accent3>
+      <a:accent4>
+        <a:srgbClr val="FFC000"/>
+      </a:accent4>
+      <a:accent5>
+        <a:srgbClr val="5B9BD5"/>
+      </a:accent5>
+      <a:accent6>
+        <a:srgbClr val="70AD47"/>
+      </a:accent6>
+      <a:hlink>
+        <a:srgbClr val="0563C1"/>
+      </a:hlink>
+      <a:folHlink>
+        <a:srgbClr val="954F72"/>
+      </a:folHlink>
+    </a:clrScheme>
+    <a:fontScheme name="Office">
+      <a:majorFont>
+        <a:latin typeface="Calibri Light" panose="020F0302020204030204"/>
+        <a:ea typeface=""/>
+        <a:cs typeface=""/>
+        <a:font script="Jpan" typeface="游ゴシック Light"/>
+        <a:font script="Hang" typeface="맑은 고딕"/>
+        <a:font script="Hans" typeface="等线 Light"/>
+        <a:font script="Hant" typeface="新細明體"/>
+        <a:font script="Arab" typeface="Times New Roman"/>
+        <a:font script="Hebr" typeface="Times New Roman"/>
+        <a:font script="Thai" typeface="Angsana New"/>
+        <a:font script="Ethi" typeface="Nyala"/>
+        <a:font script="Beng" typeface="Vrinda"/>
+        <a:font script="Gujr" typeface="Shruti"/>
+        <a:font script="Khmr" typeface="MoolBoran"/>
+        <a:font script="Knda" typeface="Tunga"/>
+        <a:font script="Guru" typeface="Raavi"/>
+        <a:font script="Cans" typeface="Euphemia"/>
+        <a:font script="Cher" typeface="Plantagenet Cherokee"/>
+        <a:font script="Yiii" typeface="Microsoft Yi Baiti"/>
+        <a:font script="Tibt" typeface="Microsoft Himalaya"/>
+        <a:font script="Thaa" typeface="MV Boli"/>
+        <a:font script="Deva" typeface="Mangal"/>
+        <a:font script="Telu" typeface="Gautami"/>
+        <a:font script="Taml" typeface="Latha"/>
+        <a:font script="Syrc" typeface="Estrangelo Edessa"/>
+        <a:font script="Orya" typeface="Kalinga"/>
+        <a:font script="Mlym" typeface="Kartika"/>
+        <a:font script="Laoo" typeface="DokChampa"/>
+        <a:font script="Sinh" typeface="Iskoola Pota"/>
+        <a:font script="Mong" typeface="Mongolian Baiti"/>
+        <a:font script="Viet" typeface="Times New Roman"/>
+        <a:font script="Uigh" typeface="Microsoft Uighur"/>
+        <a:font script="Geor" typeface="Sylfaen"/>
+        <a:font script="Armn" typeface="Arial"/>
+        <a:font script="Bugi" typeface="Leelawadee UI"/>
+        <a:font script="Bopo" typeface="Microsoft JhengHei"/>
+        <a:font script="Java" typeface="Javanese Text"/>
+        <a:font script="Lisu" typeface="Segoe UI"/>
+        <a:font script="Mymr" typeface="Myanmar Text"/>
+        <a:font script="Nkoo" typeface="Ebrima"/>
+        <a:font script="Olck" typeface="Nirmala UI"/>
+        <a:font script="Osma" typeface="Ebrima"/>
+        <a:font script="Phag" typeface="Phagspa"/>
+        <a:font script="Syrn" typeface="Estrangelo Edessa"/>
+        <a:font script="Syrj" typeface="Estrangelo Edessa"/>
+        <a:font script="Syre" typeface="Estrangelo Edessa"/>
+        <a:font script="Sora" typeface="Nirmala UI"/>
+        <a:font script="Tale" typeface="Microsoft Tai Le"/>
+        <a:font script="Talu" typeface="Microsoft New Tai Lue"/>
+        <a:font script="Tfng" typeface="Ebrima"/>
+      </a:majorFont>
+      <a:minorFont>
+        <a:latin typeface="Calibri" panose="020F0502020204030204"/>
+        <a:ea typeface=""/>
+        <a:cs typeface=""/>
+        <a:font script="Jpan" typeface="游ゴシック"/>
+        <a:font script="Hang" typeface="맑은 고딕"/>
+        <a:font script="Hans" typeface="等线"/>
+        <a:font script="Hant" typeface="新細明體"/>
+        <a:font script="Arab" typeface="Arial"/>
+        <a:font script="Hebr" typeface="Arial"/>
+        <a:font script="Thai" typeface="Cordia New"/>
+        <a:font script="Ethi" typeface="Nyala"/>
+        <a:font script="Beng" typeface="Vrinda"/>
+        <a:font script="Gujr" typeface="Shruti"/>
+        <a:font script="Khmr" typeface="DaunPenh"/>
+        <a:font script="Knda" typeface="Tunga"/>
+        <a:font script="Guru" typeface="Raavi"/>
+        <a:font script="Cans" typeface="Euphemia"/>
+        <a:font script="Cher" typeface="Plantagenet Cherokee"/>
+        <a:font script="Yiii" typeface="Microsoft Yi Baiti"/>
+        <a:font script="Tibt" typeface="Microsoft Himalaya"/>
+        <a:font script="Thaa" typeface="MV Boli"/>
+        <a:font script="Deva" typeface="Mangal"/>
+        <a:font script="Telu" typeface="Gautami"/>
+        <a:font script="Taml" typeface="Latha"/>
+        <a:font script="Syrc" typeface="Estrangelo Edessa"/>
+        <a:font script="Orya" typeface="Kalinga"/>
+        <a:font script="Mlym" typeface="Kartika"/>
+        <a:font script="Laoo" typeface="DokChampa"/>
+        <a:font script="Sinh" typeface="Iskoola Pota"/>
+        <a:font script="Mong" typeface="Mongolian Baiti"/>
+        <a:font script="Viet" typeface="Arial"/>
+        <a:font script="Uigh" typeface="Microsoft Uighur"/>
+        <a:font script="Geor" typeface="Sylfaen"/>
+        <a:font script="Armn" typeface="Arial"/>
+        <a:font script="Bugi" typeface="Leelawadee UI"/>
+        <a:font script="Bopo" typeface="Microsoft JhengHei"/>
+        <a:font script="Java" typeface="Javanese Text"/>
+        <a:font script="Lisu" typeface="Segoe UI"/>
+        <a:font script="Mymr" typeface="Myanmar Text"/>
+        <a:font script="Nkoo" typeface="Ebrima"/>
+        <a:font script="Olck" typeface="Nirmala UI"/>
+        <a:font script="Osma" typeface="Ebrima"/>
+        <a:font script="Phag" typeface="Phagspa"/>
+        <a:font script="Syrn" typeface="Estrangelo Edessa"/>
+        <a:font script="Syrj" typeface="Estrangelo Edessa"/>
+        <a:font script="Syre" typeface="Estrangelo Edessa"/>
+        <a:font script="Sora" typeface="Nirmala UI"/>
+        <a:font script="Tale" typeface="Microsoft Tai Le"/>
+        <a:font script="Talu" typeface="Microsoft New Tai Lue"/>
+        <a:font script="Tfng" typeface="Ebrima"/>
+      </a:minorFont>
+    </a:fontScheme>
+    <a:fmtScheme name="Office">
+      <a:fillStyleLst>
+        <a:solidFill>
+          <a:schemeClr val="phClr"/>
+        </a:solidFill>
+        <a:gradFill rotWithShape="1">
+          <a:gsLst>
+            <a:gs pos="0">
+              <a:schemeClr val="phClr">
+                <a:lumMod val="110000"/>
+                <a:satMod val="105000"/>
+                <a:tint val="67000"/>
+              </a:schemeClr>
+            </a:gs>
+            <a:gs pos="50000">
+              <a:schemeClr val="phClr">
+                <a:lumMod val="105000"/>
+                <a:satMod val="103000"/>
+                <a:tint val="73000"/>
+              </a:schemeClr>
+            </a:gs>
+            <a:gs pos="100000">
+              <a:schemeClr val="phClr">
+                <a:lumMod val="105000"/>
+                <a:satMod val="109000"/>
+                <a:tint val="81000"/>
+              </a:schemeClr>
+            </a:gs>
+          </a:gsLst>
+          <a:lin ang="5400000" scaled="0"/>
+        </a:gradFill>
+        <a:gradFill rotWithShape="1">
+          <a:gsLst>
+            <a:gs pos="0">
+              <a:schemeClr val="phClr">
+                <a:satMod val="103000"/>
+                <a:lumMod val="102000"/>
+                <a:tint val="94000"/>
+              </a:schemeClr>
+            </a:gs>
+            <a:gs pos="50000">
+              <a:schemeClr val="phClr">
+                <a:satMod val="110000"/>
+                <a:lumMod val="100000"/>
+                <a:shade val="100000"/>
+              </a:schemeClr>
+            </a:gs>
+            <a:gs pos="100000">
+              <a:schemeClr val="phClr">
+                <a:lumMod val="99000"/>
+                <a:satMod val="120000"/>
+                <a:shade val="78000"/>
+              </a:schemeClr>
+            </a:gs>
+          </a:gsLst>
+          <a:lin ang="5400000" scaled="0"/>
+        </a:gradFill>
+      </a:fillStyleLst>
+      <a:lnStyleLst>
+        <a:ln w="6350" cap="flat" cmpd="sng" algn="ctr">
+          <a:solidFill>
+            <a:schemeClr val="phClr"/>
+          </a:solidFill>
+          <a:prstDash val="solid"/>
+          <a:miter lim="800000"/>
+        </a:ln>
+        <a:ln w="12700" cap="flat" cmpd="sng" algn="ctr">
+          <a:solidFill>
+            <a:schemeClr val="phClr"/>
+          </a:solidFill>
+          <a:prstDash val="solid"/>
+          <a:miter lim="800000"/>
+        </a:ln>
+        <a:ln w="19050" cap="flat" cmpd="sng" algn="ctr">
+          <a:solidFill>
+            <a:schemeClr val="phClr"/>
+          </a:solidFill>
+          <a:prstDash val="solid"/>
+          <a:miter lim="800000"/>
+        </a:ln>
+      </a:lnStyleLst>
+      <a:effectStyleLst>
+        <a:effectStyle>
+          <a:effectLst/>
+        </a:effectStyle>
+        <a:effectStyle>
+          <a:effectLst/>
+        </a:effectStyle>
+        <a:effectStyle>
+          <a:effectLst>
+            <a:outerShdw blurRad="57150" dist="19050" dir="5400000" algn="ctr" rotWithShape="0">
+              <a:srgbClr val="000000">
+                <a:alpha val="63000"/>
+              </a:srgbClr>
+            </a:outerShdw>
+          </a:effectLst>
+        </a:effectStyle>
+      </a:effectStyleLst>
+      <a:bgFillStyleLst>
+        <a:solidFill>
+          <a:schemeClr val="phClr"/>
+        </a:solidFill>
+        <a:solidFill>
+          <a:schemeClr val="phClr">
+            <a:tint val="95000"/>
+            <a:satMod val="170000"/>
+          </a:schemeClr>
+        </a:solidFill>
+        <a:gradFill rotWithShape="1">
+          <a:gsLst>
+            <a:gs pos="0">
+              <a:schemeClr val="phClr">
+                <a:tint val="93000"/>
+                <a:satMod val="150000"/>
+                <a:shade val="98000"/>
+                <a:lumMod val="102000"/>
+              </a:schemeClr>
+            </a:gs>
+            <a:gs pos="50000">
+              <a:schemeClr val="phClr">
+                <a:tint val="98000"/>
+                <a:satMod val="130000"/>
+                <a:shade val="90000"/>
+                <a:lumMod val="103000"/>
+              </a:schemeClr>
+            </a:gs>
+            <a:gs pos="100000">
+              <a:schemeClr val="phClr">
+                <a:shade val="63000"/>
+                <a:satMod val="120000"/>
+              </a:schemeClr>
+            </a:gs>
+          </a:gsLst>
+          <a:lin ang="5400000" scaled="0"/>
+        </a:gradFill>
+      </a:bgFillStyleLst>
+    </a:fmtScheme>
+  </a:themeElements>
+  <a:objectDefaults/>
+  <a:extraClrSchemeLst/>
+  <a:extLst>
+    <a:ext uri="{05A4C25C-085E-4340-85A3-A5531E510DB2}">
+      <thm15:themeFamily xmlns:thm15="http://schemas.microsoft.com/office/thememl/2012/main" name="Office Theme" id="{62F939B6-93AF-4DB8-9C6B-D6C7DFDC589F}" vid="{4A3C46E8-61CC-4603-A589-7422A47A8E4A}"/>
+    </a:ext>
+  </a:extLst>
+</a:theme>
 </file>
</xml_diff>

<commit_message>
update pptx user diagram
</commit_message>
<xml_diff>
--- a/doc/Diagrams.pptx
+++ b/doc/Diagrams.pptx
@@ -126,6 +126,10 @@
 </p:presentation>
 </file>
 
+<file path=ppt/revisionInfo.xml><?xml version="1.0" encoding="utf-8"?>
+<p1510:revInfo xmlns:a="http://schemas.openxmlformats.org/drawingml/2006/main" xmlns:r="http://schemas.openxmlformats.org/officeDocument/2006/relationships" xmlns:p1510="http://schemas.microsoft.com/office/powerpoint/2015/10/main"/>
+</file>
+
 <file path=ppt/slideLayouts/slideLayout1.xml><?xml version="1.0" encoding="utf-8"?>
 <p:sldLayout xmlns:a="http://schemas.openxmlformats.org/drawingml/2006/main" xmlns:r="http://schemas.openxmlformats.org/officeDocument/2006/relationships" xmlns:p="http://schemas.openxmlformats.org/presentationml/2006/main" type="title" preserve="1">
   <p:cSld name="Title Slide">
@@ -164,10 +168,9 @@
           <a:lstStyle/>
           <a:p>
             <a:r>
-              <a:rPr lang="en-US" smtClean="0"/>
+              <a:rPr lang="en-US"/>
               <a:t>Click to edit Master title style</a:t>
             </a:r>
-            <a:endParaRPr lang="en-US"/>
           </a:p>
         </p:txBody>
       </p:sp>
@@ -283,10 +286,9 @@
           </a:lstStyle>
           <a:p>
             <a:r>
-              <a:rPr lang="en-US" smtClean="0"/>
+              <a:rPr lang="en-US"/>
               <a:t>Click to edit Master subtitle style</a:t>
             </a:r>
-            <a:endParaRPr lang="en-US"/>
           </a:p>
         </p:txBody>
       </p:sp>
@@ -307,7 +309,7 @@
           <a:p>
             <a:fld id="{78C97017-6FC3-485B-9764-EAC9E56C1D49}" type="datetimeFigureOut">
               <a:rPr lang="en-US" smtClean="0"/>
-              <a:t>8/31/2017</a:t>
+              <a:t>9/11/2017</a:t>
             </a:fld>
             <a:endParaRPr lang="en-US"/>
           </a:p>
@@ -401,10 +403,9 @@
           <a:lstStyle/>
           <a:p>
             <a:r>
-              <a:rPr lang="en-US" smtClean="0"/>
+              <a:rPr lang="en-US"/>
               <a:t>Click to edit Master title style</a:t>
             </a:r>
-            <a:endParaRPr lang="en-US"/>
           </a:p>
         </p:txBody>
       </p:sp>
@@ -425,38 +426,37 @@
           <a:p>
             <a:pPr lvl="0"/>
             <a:r>
-              <a:rPr lang="en-US" smtClean="0"/>
+              <a:rPr lang="en-US"/>
               <a:t>Click to edit Master text styles</a:t>
             </a:r>
           </a:p>
           <a:p>
             <a:pPr lvl="1"/>
             <a:r>
-              <a:rPr lang="en-US" smtClean="0"/>
+              <a:rPr lang="en-US"/>
               <a:t>Second level</a:t>
             </a:r>
           </a:p>
           <a:p>
             <a:pPr lvl="2"/>
             <a:r>
-              <a:rPr lang="en-US" smtClean="0"/>
+              <a:rPr lang="en-US"/>
               <a:t>Third level</a:t>
             </a:r>
           </a:p>
           <a:p>
             <a:pPr lvl="3"/>
             <a:r>
-              <a:rPr lang="en-US" smtClean="0"/>
+              <a:rPr lang="en-US"/>
               <a:t>Fourth level</a:t>
             </a:r>
           </a:p>
           <a:p>
             <a:pPr lvl="4"/>
             <a:r>
-              <a:rPr lang="en-US" smtClean="0"/>
+              <a:rPr lang="en-US"/>
               <a:t>Fifth level</a:t>
             </a:r>
-            <a:endParaRPr lang="en-US"/>
           </a:p>
         </p:txBody>
       </p:sp>
@@ -477,7 +477,7 @@
           <a:p>
             <a:fld id="{78C97017-6FC3-485B-9764-EAC9E56C1D49}" type="datetimeFigureOut">
               <a:rPr lang="en-US" smtClean="0"/>
-              <a:t>8/31/2017</a:t>
+              <a:t>9/11/2017</a:t>
             </a:fld>
             <a:endParaRPr lang="en-US"/>
           </a:p>
@@ -576,10 +576,9 @@
           <a:lstStyle/>
           <a:p>
             <a:r>
-              <a:rPr lang="en-US" smtClean="0"/>
+              <a:rPr lang="en-US"/>
               <a:t>Click to edit Master title style</a:t>
             </a:r>
-            <a:endParaRPr lang="en-US"/>
           </a:p>
         </p:txBody>
       </p:sp>
@@ -605,38 +604,37 @@
           <a:p>
             <a:pPr lvl="0"/>
             <a:r>
-              <a:rPr lang="en-US" smtClean="0"/>
+              <a:rPr lang="en-US"/>
               <a:t>Click to edit Master text styles</a:t>
             </a:r>
           </a:p>
           <a:p>
             <a:pPr lvl="1"/>
             <a:r>
-              <a:rPr lang="en-US" smtClean="0"/>
+              <a:rPr lang="en-US"/>
               <a:t>Second level</a:t>
             </a:r>
           </a:p>
           <a:p>
             <a:pPr lvl="2"/>
             <a:r>
-              <a:rPr lang="en-US" smtClean="0"/>
+              <a:rPr lang="en-US"/>
               <a:t>Third level</a:t>
             </a:r>
           </a:p>
           <a:p>
             <a:pPr lvl="3"/>
             <a:r>
-              <a:rPr lang="en-US" smtClean="0"/>
+              <a:rPr lang="en-US"/>
               <a:t>Fourth level</a:t>
             </a:r>
           </a:p>
           <a:p>
             <a:pPr lvl="4"/>
             <a:r>
-              <a:rPr lang="en-US" smtClean="0"/>
+              <a:rPr lang="en-US"/>
               <a:t>Fifth level</a:t>
             </a:r>
-            <a:endParaRPr lang="en-US"/>
           </a:p>
         </p:txBody>
       </p:sp>
@@ -657,7 +655,7 @@
           <a:p>
             <a:fld id="{78C97017-6FC3-485B-9764-EAC9E56C1D49}" type="datetimeFigureOut">
               <a:rPr lang="en-US" smtClean="0"/>
-              <a:t>8/31/2017</a:t>
+              <a:t>9/11/2017</a:t>
             </a:fld>
             <a:endParaRPr lang="en-US"/>
           </a:p>
@@ -751,10 +749,9 @@
           <a:lstStyle/>
           <a:p>
             <a:r>
-              <a:rPr lang="en-US" smtClean="0"/>
+              <a:rPr lang="en-US"/>
               <a:t>Click to edit Master title style</a:t>
             </a:r>
-            <a:endParaRPr lang="en-US"/>
           </a:p>
         </p:txBody>
       </p:sp>
@@ -775,38 +772,37 @@
           <a:p>
             <a:pPr lvl="0"/>
             <a:r>
-              <a:rPr lang="en-US" smtClean="0"/>
+              <a:rPr lang="en-US"/>
               <a:t>Click to edit Master text styles</a:t>
             </a:r>
           </a:p>
           <a:p>
             <a:pPr lvl="1"/>
             <a:r>
-              <a:rPr lang="en-US" smtClean="0"/>
+              <a:rPr lang="en-US"/>
               <a:t>Second level</a:t>
             </a:r>
           </a:p>
           <a:p>
             <a:pPr lvl="2"/>
             <a:r>
-              <a:rPr lang="en-US" smtClean="0"/>
+              <a:rPr lang="en-US"/>
               <a:t>Third level</a:t>
             </a:r>
           </a:p>
           <a:p>
             <a:pPr lvl="3"/>
             <a:r>
-              <a:rPr lang="en-US" smtClean="0"/>
+              <a:rPr lang="en-US"/>
               <a:t>Fourth level</a:t>
             </a:r>
           </a:p>
           <a:p>
             <a:pPr lvl="4"/>
             <a:r>
-              <a:rPr lang="en-US" smtClean="0"/>
+              <a:rPr lang="en-US"/>
               <a:t>Fifth level</a:t>
             </a:r>
-            <a:endParaRPr lang="en-US"/>
           </a:p>
         </p:txBody>
       </p:sp>
@@ -827,7 +823,7 @@
           <a:p>
             <a:fld id="{78C97017-6FC3-485B-9764-EAC9E56C1D49}" type="datetimeFigureOut">
               <a:rPr lang="en-US" smtClean="0"/>
-              <a:t>8/31/2017</a:t>
+              <a:t>9/11/2017</a:t>
             </a:fld>
             <a:endParaRPr lang="en-US"/>
           </a:p>
@@ -930,10 +926,9 @@
           </a:lstStyle>
           <a:p>
             <a:r>
-              <a:rPr lang="en-US" smtClean="0"/>
+              <a:rPr lang="en-US"/>
               <a:t>Click to edit Master title style</a:t>
             </a:r>
-            <a:endParaRPr lang="en-US"/>
           </a:p>
         </p:txBody>
       </p:sp>
@@ -1050,7 +1045,7 @@
           <a:p>
             <a:pPr lvl="0"/>
             <a:r>
-              <a:rPr lang="en-US" smtClean="0"/>
+              <a:rPr lang="en-US"/>
               <a:t>Click to edit Master text styles</a:t>
             </a:r>
           </a:p>
@@ -1073,7 +1068,7 @@
           <a:p>
             <a:fld id="{78C97017-6FC3-485B-9764-EAC9E56C1D49}" type="datetimeFigureOut">
               <a:rPr lang="en-US" smtClean="0"/>
-              <a:t>8/31/2017</a:t>
+              <a:t>9/11/2017</a:t>
             </a:fld>
             <a:endParaRPr lang="en-US"/>
           </a:p>
@@ -1167,10 +1162,9 @@
           <a:lstStyle/>
           <a:p>
             <a:r>
-              <a:rPr lang="en-US" smtClean="0"/>
+              <a:rPr lang="en-US"/>
               <a:t>Click to edit Master title style</a:t>
             </a:r>
-            <a:endParaRPr lang="en-US"/>
           </a:p>
         </p:txBody>
       </p:sp>
@@ -1224,38 +1218,37 @@
           <a:p>
             <a:pPr lvl="0"/>
             <a:r>
-              <a:rPr lang="en-US" smtClean="0"/>
+              <a:rPr lang="en-US"/>
               <a:t>Click to edit Master text styles</a:t>
             </a:r>
           </a:p>
           <a:p>
             <a:pPr lvl="1"/>
             <a:r>
-              <a:rPr lang="en-US" smtClean="0"/>
+              <a:rPr lang="en-US"/>
               <a:t>Second level</a:t>
             </a:r>
           </a:p>
           <a:p>
             <a:pPr lvl="2"/>
             <a:r>
-              <a:rPr lang="en-US" smtClean="0"/>
+              <a:rPr lang="en-US"/>
               <a:t>Third level</a:t>
             </a:r>
           </a:p>
           <a:p>
             <a:pPr lvl="3"/>
             <a:r>
-              <a:rPr lang="en-US" smtClean="0"/>
+              <a:rPr lang="en-US"/>
               <a:t>Fourth level</a:t>
             </a:r>
           </a:p>
           <a:p>
             <a:pPr lvl="4"/>
             <a:r>
-              <a:rPr lang="en-US" smtClean="0"/>
+              <a:rPr lang="en-US"/>
               <a:t>Fifth level</a:t>
             </a:r>
-            <a:endParaRPr lang="en-US"/>
           </a:p>
         </p:txBody>
       </p:sp>
@@ -1309,38 +1302,37 @@
           <a:p>
             <a:pPr lvl="0"/>
             <a:r>
-              <a:rPr lang="en-US" smtClean="0"/>
+              <a:rPr lang="en-US"/>
               <a:t>Click to edit Master text styles</a:t>
             </a:r>
           </a:p>
           <a:p>
             <a:pPr lvl="1"/>
             <a:r>
-              <a:rPr lang="en-US" smtClean="0"/>
+              <a:rPr lang="en-US"/>
               <a:t>Second level</a:t>
             </a:r>
           </a:p>
           <a:p>
             <a:pPr lvl="2"/>
             <a:r>
-              <a:rPr lang="en-US" smtClean="0"/>
+              <a:rPr lang="en-US"/>
               <a:t>Third level</a:t>
             </a:r>
           </a:p>
           <a:p>
             <a:pPr lvl="3"/>
             <a:r>
-              <a:rPr lang="en-US" smtClean="0"/>
+              <a:rPr lang="en-US"/>
               <a:t>Fourth level</a:t>
             </a:r>
           </a:p>
           <a:p>
             <a:pPr lvl="4"/>
             <a:r>
-              <a:rPr lang="en-US" smtClean="0"/>
+              <a:rPr lang="en-US"/>
               <a:t>Fifth level</a:t>
             </a:r>
-            <a:endParaRPr lang="en-US"/>
           </a:p>
         </p:txBody>
       </p:sp>
@@ -1361,7 +1353,7 @@
           <a:p>
             <a:fld id="{78C97017-6FC3-485B-9764-EAC9E56C1D49}" type="datetimeFigureOut">
               <a:rPr lang="en-US" smtClean="0"/>
-              <a:t>8/31/2017</a:t>
+              <a:t>9/11/2017</a:t>
             </a:fld>
             <a:endParaRPr lang="en-US"/>
           </a:p>
@@ -1459,10 +1451,9 @@
           </a:lstStyle>
           <a:p>
             <a:r>
-              <a:rPr lang="en-US" smtClean="0"/>
+              <a:rPr lang="en-US"/>
               <a:t>Click to edit Master title style</a:t>
             </a:r>
-            <a:endParaRPr lang="en-US"/>
           </a:p>
         </p:txBody>
       </p:sp>
@@ -1525,7 +1516,7 @@
           <a:p>
             <a:pPr lvl="0"/>
             <a:r>
-              <a:rPr lang="en-US" smtClean="0"/>
+              <a:rPr lang="en-US"/>
               <a:t>Click to edit Master text styles</a:t>
             </a:r>
           </a:p>
@@ -1581,38 +1572,37 @@
           <a:p>
             <a:pPr lvl="0"/>
             <a:r>
-              <a:rPr lang="en-US" smtClean="0"/>
+              <a:rPr lang="en-US"/>
               <a:t>Click to edit Master text styles</a:t>
             </a:r>
           </a:p>
           <a:p>
             <a:pPr lvl="1"/>
             <a:r>
-              <a:rPr lang="en-US" smtClean="0"/>
+              <a:rPr lang="en-US"/>
               <a:t>Second level</a:t>
             </a:r>
           </a:p>
           <a:p>
             <a:pPr lvl="2"/>
             <a:r>
-              <a:rPr lang="en-US" smtClean="0"/>
+              <a:rPr lang="en-US"/>
               <a:t>Third level</a:t>
             </a:r>
           </a:p>
           <a:p>
             <a:pPr lvl="3"/>
             <a:r>
-              <a:rPr lang="en-US" smtClean="0"/>
+              <a:rPr lang="en-US"/>
               <a:t>Fourth level</a:t>
             </a:r>
           </a:p>
           <a:p>
             <a:pPr lvl="4"/>
             <a:r>
-              <a:rPr lang="en-US" smtClean="0"/>
+              <a:rPr lang="en-US"/>
               <a:t>Fifth level</a:t>
             </a:r>
-            <a:endParaRPr lang="en-US"/>
           </a:p>
         </p:txBody>
       </p:sp>
@@ -1675,7 +1665,7 @@
           <a:p>
             <a:pPr lvl="0"/>
             <a:r>
-              <a:rPr lang="en-US" smtClean="0"/>
+              <a:rPr lang="en-US"/>
               <a:t>Click to edit Master text styles</a:t>
             </a:r>
           </a:p>
@@ -1731,38 +1721,37 @@
           <a:p>
             <a:pPr lvl="0"/>
             <a:r>
-              <a:rPr lang="en-US" smtClean="0"/>
+              <a:rPr lang="en-US"/>
               <a:t>Click to edit Master text styles</a:t>
             </a:r>
           </a:p>
           <a:p>
             <a:pPr lvl="1"/>
             <a:r>
-              <a:rPr lang="en-US" smtClean="0"/>
+              <a:rPr lang="en-US"/>
               <a:t>Second level</a:t>
             </a:r>
           </a:p>
           <a:p>
             <a:pPr lvl="2"/>
             <a:r>
-              <a:rPr lang="en-US" smtClean="0"/>
+              <a:rPr lang="en-US"/>
               <a:t>Third level</a:t>
             </a:r>
           </a:p>
           <a:p>
             <a:pPr lvl="3"/>
             <a:r>
-              <a:rPr lang="en-US" smtClean="0"/>
+              <a:rPr lang="en-US"/>
               <a:t>Fourth level</a:t>
             </a:r>
           </a:p>
           <a:p>
             <a:pPr lvl="4"/>
             <a:r>
-              <a:rPr lang="en-US" smtClean="0"/>
+              <a:rPr lang="en-US"/>
               <a:t>Fifth level</a:t>
             </a:r>
-            <a:endParaRPr lang="en-US"/>
           </a:p>
         </p:txBody>
       </p:sp>
@@ -1783,7 +1772,7 @@
           <a:p>
             <a:fld id="{78C97017-6FC3-485B-9764-EAC9E56C1D49}" type="datetimeFigureOut">
               <a:rPr lang="en-US" smtClean="0"/>
-              <a:t>8/31/2017</a:t>
+              <a:t>9/11/2017</a:t>
             </a:fld>
             <a:endParaRPr lang="en-US"/>
           </a:p>
@@ -1877,10 +1866,9 @@
           <a:lstStyle/>
           <a:p>
             <a:r>
-              <a:rPr lang="en-US" smtClean="0"/>
+              <a:rPr lang="en-US"/>
               <a:t>Click to edit Master title style</a:t>
             </a:r>
-            <a:endParaRPr lang="en-US"/>
           </a:p>
         </p:txBody>
       </p:sp>
@@ -1901,7 +1889,7 @@
           <a:p>
             <a:fld id="{78C97017-6FC3-485B-9764-EAC9E56C1D49}" type="datetimeFigureOut">
               <a:rPr lang="en-US" smtClean="0"/>
-              <a:t>8/31/2017</a:t>
+              <a:t>9/11/2017</a:t>
             </a:fld>
             <a:endParaRPr lang="en-US"/>
           </a:p>
@@ -1996,7 +1984,7 @@
           <a:p>
             <a:fld id="{78C97017-6FC3-485B-9764-EAC9E56C1D49}" type="datetimeFigureOut">
               <a:rPr lang="en-US" smtClean="0"/>
-              <a:t>8/31/2017</a:t>
+              <a:t>9/11/2017</a:t>
             </a:fld>
             <a:endParaRPr lang="en-US"/>
           </a:p>
@@ -2099,10 +2087,9 @@
           </a:lstStyle>
           <a:p>
             <a:r>
-              <a:rPr lang="en-US" smtClean="0"/>
+              <a:rPr lang="en-US"/>
               <a:t>Click to edit Master title style</a:t>
             </a:r>
-            <a:endParaRPr lang="en-US"/>
           </a:p>
         </p:txBody>
       </p:sp>
@@ -2156,38 +2143,37 @@
           <a:p>
             <a:pPr lvl="0"/>
             <a:r>
-              <a:rPr lang="en-US" smtClean="0"/>
+              <a:rPr lang="en-US"/>
               <a:t>Click to edit Master text styles</a:t>
             </a:r>
           </a:p>
           <a:p>
             <a:pPr lvl="1"/>
             <a:r>
-              <a:rPr lang="en-US" smtClean="0"/>
+              <a:rPr lang="en-US"/>
               <a:t>Second level</a:t>
             </a:r>
           </a:p>
           <a:p>
             <a:pPr lvl="2"/>
             <a:r>
-              <a:rPr lang="en-US" smtClean="0"/>
+              <a:rPr lang="en-US"/>
               <a:t>Third level</a:t>
             </a:r>
           </a:p>
           <a:p>
             <a:pPr lvl="3"/>
             <a:r>
-              <a:rPr lang="en-US" smtClean="0"/>
+              <a:rPr lang="en-US"/>
               <a:t>Fourth level</a:t>
             </a:r>
           </a:p>
           <a:p>
             <a:pPr lvl="4"/>
             <a:r>
-              <a:rPr lang="en-US" smtClean="0"/>
+              <a:rPr lang="en-US"/>
               <a:t>Fifth level</a:t>
             </a:r>
-            <a:endParaRPr lang="en-US"/>
           </a:p>
         </p:txBody>
       </p:sp>
@@ -2250,7 +2236,7 @@
           <a:p>
             <a:pPr lvl="0"/>
             <a:r>
-              <a:rPr lang="en-US" smtClean="0"/>
+              <a:rPr lang="en-US"/>
               <a:t>Click to edit Master text styles</a:t>
             </a:r>
           </a:p>
@@ -2273,7 +2259,7 @@
           <a:p>
             <a:fld id="{78C97017-6FC3-485B-9764-EAC9E56C1D49}" type="datetimeFigureOut">
               <a:rPr lang="en-US" smtClean="0"/>
-              <a:t>8/31/2017</a:t>
+              <a:t>9/11/2017</a:t>
             </a:fld>
             <a:endParaRPr lang="en-US"/>
           </a:p>
@@ -2376,10 +2362,9 @@
           </a:lstStyle>
           <a:p>
             <a:r>
-              <a:rPr lang="en-US" smtClean="0"/>
+              <a:rPr lang="en-US"/>
               <a:t>Click to edit Master title style</a:t>
             </a:r>
-            <a:endParaRPr lang="en-US"/>
           </a:p>
         </p:txBody>
       </p:sp>
@@ -2503,7 +2488,7 @@
           <a:p>
             <a:pPr lvl="0"/>
             <a:r>
-              <a:rPr lang="en-US" smtClean="0"/>
+              <a:rPr lang="en-US"/>
               <a:t>Click to edit Master text styles</a:t>
             </a:r>
           </a:p>
@@ -2526,7 +2511,7 @@
           <a:p>
             <a:fld id="{78C97017-6FC3-485B-9764-EAC9E56C1D49}" type="datetimeFigureOut">
               <a:rPr lang="en-US" smtClean="0"/>
-              <a:t>8/31/2017</a:t>
+              <a:t>9/11/2017</a:t>
             </a:fld>
             <a:endParaRPr lang="en-US"/>
           </a:p>
@@ -2635,10 +2620,9 @@
           <a:lstStyle/>
           <a:p>
             <a:r>
-              <a:rPr lang="en-US" smtClean="0"/>
+              <a:rPr lang="en-US"/>
               <a:t>Click to edit Master title style</a:t>
             </a:r>
-            <a:endParaRPr lang="en-US"/>
           </a:p>
         </p:txBody>
       </p:sp>
@@ -2669,38 +2653,37 @@
           <a:p>
             <a:pPr lvl="0"/>
             <a:r>
-              <a:rPr lang="en-US" smtClean="0"/>
+              <a:rPr lang="en-US"/>
               <a:t>Click to edit Master text styles</a:t>
             </a:r>
           </a:p>
           <a:p>
             <a:pPr lvl="1"/>
             <a:r>
-              <a:rPr lang="en-US" smtClean="0"/>
+              <a:rPr lang="en-US"/>
               <a:t>Second level</a:t>
             </a:r>
           </a:p>
           <a:p>
             <a:pPr lvl="2"/>
             <a:r>
-              <a:rPr lang="en-US" smtClean="0"/>
+              <a:rPr lang="en-US"/>
               <a:t>Third level</a:t>
             </a:r>
           </a:p>
           <a:p>
             <a:pPr lvl="3"/>
             <a:r>
-              <a:rPr lang="en-US" smtClean="0"/>
+              <a:rPr lang="en-US"/>
               <a:t>Fourth level</a:t>
             </a:r>
           </a:p>
           <a:p>
             <a:pPr lvl="4"/>
             <a:r>
-              <a:rPr lang="en-US" smtClean="0"/>
+              <a:rPr lang="en-US"/>
               <a:t>Fifth level</a:t>
             </a:r>
-            <a:endParaRPr lang="en-US"/>
           </a:p>
         </p:txBody>
       </p:sp>
@@ -2739,7 +2722,7 @@
           <a:p>
             <a:fld id="{78C97017-6FC3-485B-9764-EAC9E56C1D49}" type="datetimeFigureOut">
               <a:rPr lang="en-US" smtClean="0"/>
-              <a:t>8/31/2017</a:t>
+              <a:t>9/11/2017</a:t>
             </a:fld>
             <a:endParaRPr lang="en-US"/>
           </a:p>
@@ -3130,14 +3113,13 @@
           <a:lstStyle/>
           <a:p>
             <a:r>
-              <a:rPr lang="en-US" dirty="0" err="1" smtClean="0"/>
+              <a:rPr lang="en-US" dirty="0" err="1"/>
               <a:t>AddressBook</a:t>
             </a:r>
             <a:r>
-              <a:rPr lang="en-US" dirty="0" smtClean="0"/>
+              <a:rPr lang="en-US" dirty="0"/>
               <a:t> – Level 2</a:t>
             </a:r>
-            <a:endParaRPr lang="en-US" dirty="0"/>
           </a:p>
         </p:txBody>
       </p:sp>
@@ -3157,10 +3139,9 @@
           <a:lstStyle/>
           <a:p>
             <a:r>
-              <a:rPr lang="en-US" dirty="0" smtClean="0"/>
+              <a:rPr lang="en-US" dirty="0"/>
               <a:t>Diagrams</a:t>
             </a:r>
-            <a:endParaRPr lang="en-US" dirty="0"/>
           </a:p>
         </p:txBody>
       </p:sp>
@@ -3231,7 +3212,7 @@
           <a:p>
             <a:pPr algn="ctr"/>
             <a:r>
-              <a:rPr lang="en-US" sz="1050" dirty="0" err="1" smtClean="0"/>
+              <a:rPr lang="en-US" sz="1050" dirty="0" err="1"/>
               <a:t>TextUi</a:t>
             </a:r>
             <a:endParaRPr lang="en-SG" sz="1050" dirty="0"/>
@@ -3282,7 +3263,7 @@
           <a:p>
             <a:pPr algn="ctr"/>
             <a:r>
-              <a:rPr lang="en-US" sz="1050" dirty="0" smtClean="0">
+              <a:rPr lang="en-US" sz="1050" dirty="0">
                 <a:solidFill>
                   <a:schemeClr val="bg1"/>
                 </a:solidFill>
@@ -3378,7 +3359,7 @@
           <a:p>
             <a:pPr algn="ctr"/>
             <a:r>
-              <a:rPr lang="en-US" sz="1050" dirty="0" smtClean="0"/>
+              <a:rPr lang="en-US" sz="1050" dirty="0"/>
               <a:t>Parser</a:t>
             </a:r>
             <a:endParaRPr lang="en-SG" sz="1050" dirty="0"/>
@@ -3422,14 +3403,14 @@
           <a:p>
             <a:pPr algn="ctr"/>
             <a:r>
-              <a:rPr lang="en-US" sz="1050" dirty="0" smtClean="0"/>
+              <a:rPr lang="en-US" sz="1050" dirty="0"/>
               <a:t>Unique</a:t>
             </a:r>
             <a:br>
-              <a:rPr lang="en-US" sz="1050" dirty="0" smtClean="0"/>
+              <a:rPr lang="en-US" sz="1050" dirty="0"/>
             </a:br>
             <a:r>
-              <a:rPr lang="en-US" sz="1050" dirty="0" err="1" smtClean="0"/>
+              <a:rPr lang="en-US" sz="1050" dirty="0" err="1"/>
               <a:t>TagList</a:t>
             </a:r>
             <a:endParaRPr lang="en-SG" sz="1050" dirty="0"/>
@@ -3473,14 +3454,14 @@
           <a:p>
             <a:pPr algn="ctr"/>
             <a:r>
-              <a:rPr lang="en-US" sz="1050" dirty="0" smtClean="0"/>
+              <a:rPr lang="en-US" sz="1050" dirty="0"/>
               <a:t>Unique</a:t>
             </a:r>
             <a:br>
-              <a:rPr lang="en-US" sz="1050" dirty="0" smtClean="0"/>
+              <a:rPr lang="en-US" sz="1050" dirty="0"/>
             </a:br>
             <a:r>
-              <a:rPr lang="en-US" sz="1050" dirty="0" err="1" smtClean="0"/>
+              <a:rPr lang="en-US" sz="1050" dirty="0" err="1"/>
               <a:t>PersonList</a:t>
             </a:r>
             <a:endParaRPr lang="en-SG" sz="1050" dirty="0"/>
@@ -3524,7 +3505,7 @@
           <a:p>
             <a:pPr algn="ctr"/>
             <a:r>
-              <a:rPr lang="en-US" sz="1050" dirty="0" smtClean="0"/>
+              <a:rPr lang="en-US" sz="1050" dirty="0"/>
               <a:t>Person</a:t>
             </a:r>
             <a:endParaRPr lang="en-SG" sz="1050" dirty="0"/>
@@ -3568,7 +3549,7 @@
           <a:p>
             <a:pPr algn="ctr"/>
             <a:r>
-              <a:rPr lang="en-US" sz="1050" dirty="0" smtClean="0"/>
+              <a:rPr lang="en-US" sz="1050" dirty="0"/>
               <a:t>Phone</a:t>
             </a:r>
             <a:endParaRPr lang="en-SG" sz="1050" dirty="0"/>
@@ -3612,7 +3593,7 @@
           <a:p>
             <a:pPr algn="ctr"/>
             <a:r>
-              <a:rPr lang="en-US" sz="1050" dirty="0" smtClean="0"/>
+              <a:rPr lang="en-US" sz="1050" dirty="0"/>
               <a:t>Email</a:t>
             </a:r>
             <a:endParaRPr lang="en-SG" sz="1050" dirty="0"/>
@@ -3656,7 +3637,7 @@
           <a:p>
             <a:pPr algn="ctr"/>
             <a:r>
-              <a:rPr lang="en-US" sz="1050" dirty="0" smtClean="0"/>
+              <a:rPr lang="en-US" sz="1050" dirty="0"/>
               <a:t>Address</a:t>
             </a:r>
             <a:endParaRPr lang="en-SG" sz="1050" dirty="0"/>
@@ -3700,7 +3681,7 @@
           <a:p>
             <a:pPr algn="ctr"/>
             <a:r>
-              <a:rPr lang="en-US" sz="1050" dirty="0" err="1" smtClean="0"/>
+              <a:rPr lang="en-US" sz="1050" dirty="0" err="1"/>
               <a:t>StorageFile</a:t>
             </a:r>
             <a:endParaRPr lang="en-SG" sz="1050" dirty="0"/>
@@ -4435,14 +4416,14 @@
           <a:p>
             <a:pPr algn="ctr"/>
             <a:r>
-              <a:rPr lang="en-US" sz="1050" dirty="0" smtClean="0"/>
+              <a:rPr lang="en-US" sz="1050" dirty="0"/>
               <a:t>&lt;&lt;interface&gt;&gt;</a:t>
             </a:r>
           </a:p>
           <a:p>
             <a:pPr algn="ctr"/>
             <a:r>
-              <a:rPr lang="en-US" sz="1050" dirty="0" err="1" smtClean="0"/>
+              <a:rPr lang="en-US" sz="1050" dirty="0" err="1"/>
               <a:t>ReadOnlyPerson</a:t>
             </a:r>
             <a:endParaRPr lang="en-SG" sz="1050" dirty="0"/>
@@ -4609,7 +4590,7 @@
           <a:p>
             <a:pPr algn="ctr"/>
             <a:r>
-              <a:rPr lang="en-US" sz="1050" dirty="0" smtClean="0"/>
+              <a:rPr lang="en-US" sz="1050" dirty="0"/>
               <a:t>Command</a:t>
             </a:r>
             <a:endParaRPr lang="en-SG" sz="1050" dirty="0"/>
@@ -4698,7 +4679,7 @@
             <a:pPr algn="ctr"/>
             <a:r>
               <a:rPr lang="en-US" sz="1050" dirty="0" err="1"/>
-              <a:t>CrearCommand</a:t>
+              <a:t>ClearCommand</a:t>
             </a:r>
             <a:endParaRPr lang="en-SG" sz="1050" dirty="0"/>
           </a:p>
@@ -4830,6 +4811,7 @@
         <p:nvCxnSpPr>
           <p:cNvPr id="56" name="Elbow Connector 55"/>
           <p:cNvCxnSpPr>
+            <a:cxnSpLocks/>
             <a:stCxn id="54" idx="3"/>
             <a:endCxn id="50" idx="3"/>
           </p:cNvCxnSpPr>
@@ -4939,7 +4921,7 @@
           <a:p>
             <a:pPr algn="ctr"/>
             <a:r>
-              <a:rPr lang="en-US" sz="1050" dirty="0" smtClean="0"/>
+              <a:rPr lang="en-US" sz="1050" dirty="0"/>
               <a:t>…Command</a:t>
             </a:r>
             <a:endParaRPr lang="en-SG" sz="1050" dirty="0"/>
@@ -5353,7 +5335,7 @@
           <a:p>
             <a:pPr algn="ctr"/>
             <a:r>
-              <a:rPr lang="en-US" sz="1050" dirty="0" smtClean="0"/>
+              <a:rPr lang="en-US" sz="1050" dirty="0"/>
               <a:t>Messages</a:t>
             </a:r>
             <a:endParaRPr lang="en-SG" sz="1050" dirty="0"/>
@@ -5397,7 +5379,7 @@
           <a:p>
             <a:pPr algn="ctr"/>
             <a:r>
-              <a:rPr lang="en-US" sz="1050" dirty="0" err="1" smtClean="0"/>
+              <a:rPr lang="en-US" sz="1050" dirty="0" err="1"/>
               <a:t>Utils</a:t>
             </a:r>
             <a:endParaRPr lang="en-SG" sz="1050" dirty="0"/>
@@ -5485,7 +5467,7 @@
           <a:p>
             <a:pPr algn="ctr"/>
             <a:r>
-              <a:rPr lang="en-US" sz="1050" dirty="0" smtClean="0"/>
+              <a:rPr lang="en-US" sz="1050" dirty="0"/>
               <a:t>Adapted…</a:t>
             </a:r>
             <a:endParaRPr lang="en-SG" sz="1050" dirty="0"/>
@@ -5770,6 +5752,250 @@
           </a:fontRef>
         </p:style>
       </p:cxnSp>
+      <p:sp>
+        <p:nvSpPr>
+          <p:cNvPr id="69" name="Rectangle 68">
+            <a:extLst>
+              <a:ext uri="{FF2B5EF4-FFF2-40B4-BE49-F238E27FC236}">
+                <a16:creationId xmlns:a16="http://schemas.microsoft.com/office/drawing/2014/main" id="{D03AEDFF-A079-4BD0-AFB1-EEC817713B40}"/>
+              </a:ext>
+            </a:extLst>
+          </p:cNvPr>
+          <p:cNvSpPr/>
+          <p:nvPr/>
+        </p:nvSpPr>
+        <p:spPr>
+          <a:xfrm flipH="1">
+            <a:off x="4724400" y="665068"/>
+            <a:ext cx="1404109" cy="346760"/>
+          </a:xfrm>
+          <a:prstGeom prst="rect">
+            <a:avLst/>
+          </a:prstGeom>
+          <a:ln w="19050"/>
+          <a:effectLst/>
+        </p:spPr>
+        <p:style>
+          <a:lnRef idx="1">
+            <a:schemeClr val="accent5"/>
+          </a:lnRef>
+          <a:fillRef idx="2">
+            <a:schemeClr val="accent5"/>
+          </a:fillRef>
+          <a:effectRef idx="1">
+            <a:schemeClr val="accent5"/>
+          </a:effectRef>
+          <a:fontRef idx="minor">
+            <a:schemeClr val="dk1"/>
+          </a:fontRef>
+        </p:style>
+        <p:txBody>
+          <a:bodyPr rtlCol="0" anchor="ctr"/>
+          <a:lstStyle/>
+          <a:p>
+            <a:pPr algn="ctr"/>
+            <a:r>
+              <a:rPr lang="en-US" sz="1050" dirty="0"/>
+              <a:t>Edit Command</a:t>
+            </a:r>
+            <a:endParaRPr lang="en-SG" sz="1050" dirty="0"/>
+          </a:p>
+        </p:txBody>
+      </p:sp>
+      <p:cxnSp>
+        <p:nvCxnSpPr>
+          <p:cNvPr id="72" name="Elbow Connector 59">
+            <a:extLst>
+              <a:ext uri="{FF2B5EF4-FFF2-40B4-BE49-F238E27FC236}">
+                <a16:creationId xmlns:a16="http://schemas.microsoft.com/office/drawing/2014/main" id="{59A16FAC-CF45-4906-8595-2F4D3EB7F014}"/>
+              </a:ext>
+            </a:extLst>
+          </p:cNvPr>
+          <p:cNvCxnSpPr>
+            <a:cxnSpLocks/>
+            <a:stCxn id="54" idx="3"/>
+            <a:endCxn id="69" idx="3"/>
+          </p:cNvCxnSpPr>
+          <p:nvPr/>
+        </p:nvCxnSpPr>
+        <p:spPr>
+          <a:xfrm flipV="1">
+            <a:off x="4354217" y="838448"/>
+            <a:ext cx="370183" cy="820805"/>
+          </a:xfrm>
+          <a:prstGeom prst="bentConnector3">
+            <a:avLst>
+              <a:gd name="adj1" fmla="val 50000"/>
+            </a:avLst>
+          </a:prstGeom>
+          <a:noFill/>
+          <a:ln w="19050"/>
+          <a:effectLst/>
+        </p:spPr>
+        <p:style>
+          <a:lnRef idx="1">
+            <a:schemeClr val="accent5"/>
+          </a:lnRef>
+          <a:fillRef idx="2">
+            <a:schemeClr val="accent5"/>
+          </a:fillRef>
+          <a:effectRef idx="1">
+            <a:schemeClr val="accent5"/>
+          </a:effectRef>
+          <a:fontRef idx="minor">
+            <a:schemeClr val="dk1"/>
+          </a:fontRef>
+        </p:style>
+      </p:cxnSp>
+      <p:cxnSp>
+        <p:nvCxnSpPr>
+          <p:cNvPr id="74" name="Elbow Connector 135">
+            <a:extLst>
+              <a:ext uri="{FF2B5EF4-FFF2-40B4-BE49-F238E27FC236}">
+                <a16:creationId xmlns:a16="http://schemas.microsoft.com/office/drawing/2014/main" id="{9E50E2CF-189A-468A-862A-03632DCE0D0E}"/>
+              </a:ext>
+            </a:extLst>
+          </p:cNvPr>
+          <p:cNvCxnSpPr>
+            <a:cxnSpLocks/>
+            <a:stCxn id="19" idx="2"/>
+            <a:endCxn id="76" idx="3"/>
+          </p:cNvCxnSpPr>
+          <p:nvPr/>
+        </p:nvCxnSpPr>
+        <p:spPr>
+          <a:xfrm rot="5400000">
+            <a:off x="4259010" y="4340767"/>
+            <a:ext cx="1066419" cy="1783775"/>
+          </a:xfrm>
+          <a:prstGeom prst="bentConnector2">
+            <a:avLst/>
+          </a:prstGeom>
+          <a:ln w="19050">
+            <a:prstDash val="dash"/>
+            <a:headEnd type="none" w="med" len="med"/>
+            <a:tailEnd type="none" w="med" len="med"/>
+          </a:ln>
+          <a:effectLst/>
+        </p:spPr>
+        <p:style>
+          <a:lnRef idx="1">
+            <a:schemeClr val="accent6"/>
+          </a:lnRef>
+          <a:fillRef idx="2">
+            <a:schemeClr val="accent6"/>
+          </a:fillRef>
+          <a:effectRef idx="1">
+            <a:schemeClr val="accent6"/>
+          </a:effectRef>
+          <a:fontRef idx="minor">
+            <a:schemeClr val="dk1"/>
+          </a:fontRef>
+        </p:style>
+      </p:cxnSp>
+      <p:sp>
+        <p:nvSpPr>
+          <p:cNvPr id="75" name="Rectangle 74">
+            <a:extLst>
+              <a:ext uri="{FF2B5EF4-FFF2-40B4-BE49-F238E27FC236}">
+                <a16:creationId xmlns:a16="http://schemas.microsoft.com/office/drawing/2014/main" id="{FECC1189-B8B0-4295-B53C-7427637D7837}"/>
+              </a:ext>
+            </a:extLst>
+          </p:cNvPr>
+          <p:cNvSpPr/>
+          <p:nvPr/>
+        </p:nvSpPr>
+        <p:spPr>
+          <a:xfrm>
+            <a:off x="2289845" y="5596368"/>
+            <a:ext cx="1408598" cy="346760"/>
+          </a:xfrm>
+          <a:prstGeom prst="rect">
+            <a:avLst/>
+          </a:prstGeom>
+          <a:ln w="19050"/>
+          <a:effectLst/>
+        </p:spPr>
+        <p:style>
+          <a:lnRef idx="1">
+            <a:schemeClr val="accent6"/>
+          </a:lnRef>
+          <a:fillRef idx="2">
+            <a:schemeClr val="accent6"/>
+          </a:fillRef>
+          <a:effectRef idx="1">
+            <a:schemeClr val="accent6"/>
+          </a:effectRef>
+          <a:fontRef idx="minor">
+            <a:schemeClr val="dk1"/>
+          </a:fontRef>
+        </p:style>
+        <p:txBody>
+          <a:bodyPr rtlCol="0" anchor="ctr"/>
+          <a:lstStyle/>
+          <a:p>
+            <a:pPr algn="ctr"/>
+            <a:r>
+              <a:rPr lang="en-US" sz="1050" dirty="0"/>
+              <a:t>&lt;&lt;interface&gt;&gt;</a:t>
+            </a:r>
+          </a:p>
+          <a:p>
+            <a:pPr algn="ctr"/>
+            <a:r>
+              <a:rPr lang="en-US" sz="1050" dirty="0" err="1"/>
+              <a:t>WriteOnlyPerson</a:t>
+            </a:r>
+            <a:endParaRPr lang="en-SG" sz="1050" dirty="0"/>
+          </a:p>
+        </p:txBody>
+      </p:sp>
+      <p:sp>
+        <p:nvSpPr>
+          <p:cNvPr id="76" name="Isosceles Triangle 75">
+            <a:extLst>
+              <a:ext uri="{FF2B5EF4-FFF2-40B4-BE49-F238E27FC236}">
+                <a16:creationId xmlns:a16="http://schemas.microsoft.com/office/drawing/2014/main" id="{DADDFA84-5418-457C-983F-37C3F9BF38E3}"/>
+              </a:ext>
+            </a:extLst>
+          </p:cNvPr>
+          <p:cNvSpPr/>
+          <p:nvPr/>
+        </p:nvSpPr>
+        <p:spPr>
+          <a:xfrm rot="16200000">
+            <a:off x="3677317" y="5678102"/>
+            <a:ext cx="270504" cy="175523"/>
+          </a:xfrm>
+          <a:prstGeom prst="triangle">
+            <a:avLst/>
+          </a:prstGeom>
+          <a:ln w="19050"/>
+          <a:effectLst/>
+        </p:spPr>
+        <p:style>
+          <a:lnRef idx="1">
+            <a:schemeClr val="accent6"/>
+          </a:lnRef>
+          <a:fillRef idx="2">
+            <a:schemeClr val="accent6"/>
+          </a:fillRef>
+          <a:effectRef idx="1">
+            <a:schemeClr val="accent6"/>
+          </a:effectRef>
+          <a:fontRef idx="minor">
+            <a:schemeClr val="dk1"/>
+          </a:fontRef>
+        </p:style>
+        <p:txBody>
+          <a:bodyPr rtlCol="0" anchor="ctr"/>
+          <a:lstStyle/>
+          <a:p>
+            <a:pPr algn="ctr"/>
+            <a:endParaRPr lang="en-SG" sz="1050"/>
+          </a:p>
+        </p:txBody>
+      </p:sp>
     </p:spTree>
     <p:extLst>
       <p:ext uri="{BB962C8B-B14F-4D97-AF65-F5344CB8AC3E}">
@@ -5837,7 +6063,7 @@
           <a:p>
             <a:pPr algn="ctr"/>
             <a:r>
-              <a:rPr lang="en-US" sz="1050" dirty="0" smtClean="0"/>
+              <a:rPr lang="en-US" sz="1050" dirty="0"/>
               <a:t>Address</a:t>
             </a:r>
             <a:endParaRPr lang="en-SG" sz="1050" dirty="0"/>
@@ -5881,7 +6107,7 @@
           <a:p>
             <a:pPr algn="ctr"/>
             <a:r>
-              <a:rPr lang="en-US" sz="1050" dirty="0" smtClean="0"/>
+              <a:rPr lang="en-US" sz="1050" dirty="0"/>
               <a:t>Unit</a:t>
             </a:r>
             <a:endParaRPr lang="en-SG" sz="1050" dirty="0"/>
@@ -6008,7 +6234,7 @@
           <a:p>
             <a:pPr algn="ctr"/>
             <a:r>
-              <a:rPr lang="en-US" sz="1050" dirty="0" smtClean="0"/>
+              <a:rPr lang="en-US" sz="1050" dirty="0"/>
               <a:t>Postal code</a:t>
             </a:r>
             <a:endParaRPr lang="en-SG" sz="1050" dirty="0"/>
@@ -6052,7 +6278,7 @@
           <a:p>
             <a:pPr algn="ctr"/>
             <a:r>
-              <a:rPr lang="en-US" sz="1050" dirty="0" smtClean="0"/>
+              <a:rPr lang="en-US" sz="1050" dirty="0"/>
               <a:t>Street</a:t>
             </a:r>
             <a:endParaRPr lang="en-SG" sz="1050" dirty="0"/>
@@ -6096,7 +6322,7 @@
           <a:p>
             <a:pPr algn="ctr"/>
             <a:r>
-              <a:rPr lang="en-US" sz="1050" dirty="0" smtClean="0"/>
+              <a:rPr lang="en-US" sz="1050" dirty="0"/>
               <a:t>Block</a:t>
             </a:r>
             <a:endParaRPr lang="en-SG" sz="1050" dirty="0"/>
@@ -6260,10 +6486,9 @@
           <a:p>
             <a:pPr algn="ctr"/>
             <a:r>
-              <a:rPr lang="en-SG" sz="1050" dirty="0" smtClean="0"/>
+              <a:rPr lang="en-SG" sz="1050" dirty="0"/>
               <a:t>Contact</a:t>
             </a:r>
-            <a:endParaRPr lang="en-SG" sz="1050" dirty="0"/>
           </a:p>
         </p:txBody>
       </p:sp>
@@ -6304,7 +6529,7 @@
           <a:p>
             <a:pPr algn="ctr"/>
             <a:r>
-              <a:rPr lang="en-US" sz="1050" dirty="0" smtClean="0"/>
+              <a:rPr lang="en-US" sz="1050" dirty="0"/>
               <a:t>Phone</a:t>
             </a:r>
             <a:endParaRPr lang="en-SG" sz="1050" dirty="0"/>
@@ -6348,7 +6573,7 @@
           <a:p>
             <a:pPr algn="ctr"/>
             <a:r>
-              <a:rPr lang="en-US" sz="1050" dirty="0" smtClean="0"/>
+              <a:rPr lang="en-US" sz="1050" dirty="0"/>
               <a:t>Email</a:t>
             </a:r>
             <a:endParaRPr lang="en-SG" sz="1050" dirty="0"/>
@@ -6392,7 +6617,7 @@
           <a:p>
             <a:pPr algn="ctr"/>
             <a:r>
-              <a:rPr lang="en-US" sz="1050" dirty="0" smtClean="0"/>
+              <a:rPr lang="en-US" sz="1050" dirty="0"/>
               <a:t>Address</a:t>
             </a:r>
             <a:endParaRPr lang="en-SG" sz="1050" dirty="0"/>
@@ -6581,10 +6806,9 @@
           <a:p>
             <a:pPr algn="ctr"/>
             <a:r>
-              <a:rPr lang="en-SG" sz="1050" dirty="0" smtClean="0"/>
+              <a:rPr lang="en-SG" sz="1050" dirty="0"/>
               <a:t>&lt;&lt;interface&gt;&gt; Printable</a:t>
             </a:r>
-            <a:endParaRPr lang="en-SG" sz="1050" dirty="0"/>
           </a:p>
         </p:txBody>
       </p:sp>
@@ -6625,7 +6849,7 @@
           <a:p>
             <a:pPr algn="ctr"/>
             <a:r>
-              <a:rPr lang="en-US" sz="1050" dirty="0" smtClean="0"/>
+              <a:rPr lang="en-US" sz="1050" dirty="0"/>
               <a:t>Phone</a:t>
             </a:r>
             <a:endParaRPr lang="en-SG" sz="1050" dirty="0"/>
@@ -6669,7 +6893,7 @@
           <a:p>
             <a:pPr algn="ctr"/>
             <a:r>
-              <a:rPr lang="en-US" sz="1050" dirty="0" smtClean="0"/>
+              <a:rPr lang="en-US" sz="1050" dirty="0"/>
               <a:t>Email</a:t>
             </a:r>
             <a:endParaRPr lang="en-SG" sz="1050" dirty="0"/>
@@ -6713,7 +6937,7 @@
           <a:p>
             <a:pPr algn="ctr"/>
             <a:r>
-              <a:rPr lang="en-US" sz="1050" dirty="0" smtClean="0"/>
+              <a:rPr lang="en-US" sz="1050" dirty="0"/>
               <a:t>Address</a:t>
             </a:r>
             <a:endParaRPr lang="en-SG" sz="1050" dirty="0"/>
@@ -6914,7 +7138,7 @@
           <a:p>
             <a:pPr algn="ctr"/>
             <a:r>
-              <a:rPr lang="en-US" sz="1050" dirty="0" smtClean="0"/>
+              <a:rPr lang="en-US" sz="1050" dirty="0"/>
               <a:t>Name</a:t>
             </a:r>
             <a:endParaRPr lang="en-SG" sz="1050" dirty="0"/>
@@ -7037,15 +7261,15 @@
           <a:p>
             <a:pPr algn="ctr"/>
             <a:r>
-              <a:rPr lang="en-US" sz="1050" dirty="0" smtClean="0"/>
+              <a:rPr lang="en-US" sz="1050" dirty="0"/>
               <a:t>+ </a:t>
             </a:r>
             <a:r>
-              <a:rPr lang="en-US" sz="1050" dirty="0" err="1" smtClean="0"/>
+              <a:rPr lang="en-US" sz="1050" dirty="0" err="1"/>
               <a:t>getPrintableString</a:t>
             </a:r>
             <a:r>
-              <a:rPr lang="en-US" sz="1050" dirty="0" smtClean="0"/>
+              <a:rPr lang="en-US" sz="1050" dirty="0"/>
               <a:t>(): String</a:t>
             </a:r>
             <a:endParaRPr lang="en-SG" sz="1050" dirty="0"/>
@@ -7133,14 +7357,14 @@
           <a:p>
             <a:pPr algn="ctr"/>
             <a:r>
-              <a:rPr lang="en-US" sz="1050" dirty="0" smtClean="0"/>
+              <a:rPr lang="en-US" sz="1050" dirty="0"/>
               <a:t>Unique</a:t>
             </a:r>
             <a:br>
-              <a:rPr lang="en-US" sz="1050" dirty="0" smtClean="0"/>
+              <a:rPr lang="en-US" sz="1050" dirty="0"/>
             </a:br>
             <a:r>
-              <a:rPr lang="en-US" sz="1050" dirty="0" err="1" smtClean="0"/>
+              <a:rPr lang="en-US" sz="1050" dirty="0" err="1"/>
               <a:t>TagList</a:t>
             </a:r>
             <a:endParaRPr lang="en-SG" sz="1050" dirty="0"/>
@@ -7184,14 +7408,14 @@
           <a:p>
             <a:pPr algn="ctr"/>
             <a:r>
-              <a:rPr lang="en-US" sz="1050" dirty="0" smtClean="0"/>
+              <a:rPr lang="en-US" sz="1050" dirty="0"/>
               <a:t>Unique</a:t>
             </a:r>
             <a:br>
-              <a:rPr lang="en-US" sz="1050" dirty="0" smtClean="0"/>
+              <a:rPr lang="en-US" sz="1050" dirty="0"/>
             </a:br>
             <a:r>
-              <a:rPr lang="en-US" sz="1050" dirty="0" err="1" smtClean="0"/>
+              <a:rPr lang="en-US" sz="1050" dirty="0" err="1"/>
               <a:t>PersonList</a:t>
             </a:r>
             <a:endParaRPr lang="en-SG" sz="1050" dirty="0"/>
@@ -7235,7 +7459,7 @@
           <a:p>
             <a:pPr algn="ctr"/>
             <a:r>
-              <a:rPr lang="en-US" sz="1050" dirty="0" smtClean="0"/>
+              <a:rPr lang="en-US" sz="1050" dirty="0"/>
               <a:t>Person</a:t>
             </a:r>
             <a:endParaRPr lang="en-SG" sz="1050" dirty="0"/>
@@ -7602,7 +7826,7 @@
           <a:p>
             <a:pPr algn="ctr"/>
             <a:r>
-              <a:rPr lang="en-US" sz="1050" dirty="0" smtClean="0"/>
+              <a:rPr lang="en-US" sz="1050" dirty="0"/>
               <a:t>Tagging</a:t>
             </a:r>
             <a:endParaRPr lang="en-SG" sz="1050" dirty="0"/>
@@ -7746,7 +7970,7 @@
           <a:lstStyle/>
           <a:p>
             <a:r>
-              <a:rPr lang="en-US" dirty="0" smtClean="0">
+              <a:rPr lang="en-US" dirty="0">
                 <a:solidFill>
                   <a:schemeClr val="accent6">
                     <a:lumMod val="75000"/>
@@ -7755,13 +7979,6 @@
               </a:rPr>
               <a:t>*</a:t>
             </a:r>
-            <a:endParaRPr lang="en-US" dirty="0">
-              <a:solidFill>
-                <a:schemeClr val="accent6">
-                  <a:lumMod val="75000"/>
-                </a:schemeClr>
-              </a:solidFill>
-            </a:endParaRPr>
           </a:p>
         </p:txBody>
       </p:sp>
@@ -7788,7 +8005,7 @@
           <a:lstStyle/>
           <a:p>
             <a:r>
-              <a:rPr lang="en-US" sz="1100" dirty="0" err="1" smtClean="0">
+              <a:rPr lang="en-US" sz="1100" dirty="0" err="1">
                 <a:solidFill>
                   <a:schemeClr val="accent6">
                     <a:lumMod val="75000"/>
@@ -7918,14 +8135,14 @@
           <a:p>
             <a:pPr algn="ctr"/>
             <a:r>
-              <a:rPr lang="en-US" sz="1050" dirty="0" smtClean="0"/>
+              <a:rPr lang="en-US" sz="1050" dirty="0"/>
               <a:t>Unique</a:t>
             </a:r>
             <a:br>
-              <a:rPr lang="en-US" sz="1050" dirty="0" smtClean="0"/>
+              <a:rPr lang="en-US" sz="1050" dirty="0"/>
             </a:br>
             <a:r>
-              <a:rPr lang="en-US" sz="1050" dirty="0" err="1" smtClean="0"/>
+              <a:rPr lang="en-US" sz="1050" dirty="0" err="1"/>
               <a:t>TagList</a:t>
             </a:r>
             <a:endParaRPr lang="en-SG" sz="1050" dirty="0"/>
@@ -7969,14 +8186,14 @@
           <a:p>
             <a:pPr algn="ctr"/>
             <a:r>
-              <a:rPr lang="en-US" sz="1050" dirty="0" smtClean="0"/>
+              <a:rPr lang="en-US" sz="1050" dirty="0"/>
               <a:t>Unique</a:t>
             </a:r>
             <a:br>
-              <a:rPr lang="en-US" sz="1050" dirty="0" smtClean="0"/>
+              <a:rPr lang="en-US" sz="1050" dirty="0"/>
             </a:br>
             <a:r>
-              <a:rPr lang="en-US" sz="1050" dirty="0" err="1" smtClean="0"/>
+              <a:rPr lang="en-US" sz="1050" dirty="0" err="1"/>
               <a:t>PersonList</a:t>
             </a:r>
             <a:endParaRPr lang="en-SG" sz="1050" dirty="0"/>
@@ -8020,7 +8237,7 @@
           <a:p>
             <a:pPr algn="ctr"/>
             <a:r>
-              <a:rPr lang="en-US" sz="1050" dirty="0" smtClean="0"/>
+              <a:rPr lang="en-US" sz="1050" dirty="0"/>
               <a:t>Person</a:t>
             </a:r>
             <a:endParaRPr lang="en-SG" sz="1050" dirty="0"/>
@@ -8387,7 +8604,7 @@
           <a:p>
             <a:pPr algn="ctr"/>
             <a:r>
-              <a:rPr lang="en-US" sz="1050" dirty="0" smtClean="0"/>
+              <a:rPr lang="en-US" sz="1050" dirty="0"/>
               <a:t>Tagging</a:t>
             </a:r>
             <a:endParaRPr lang="en-SG" sz="1050" dirty="0"/>
@@ -8493,7 +8710,7 @@
           <a:lstStyle/>
           <a:p>
             <a:r>
-              <a:rPr lang="en-US" dirty="0" smtClean="0">
+              <a:rPr lang="en-US" dirty="0">
                 <a:solidFill>
                   <a:schemeClr val="accent6">
                     <a:lumMod val="75000"/>
@@ -8502,13 +8719,6 @@
               </a:rPr>
               <a:t>*</a:t>
             </a:r>
-            <a:endParaRPr lang="en-US" dirty="0">
-              <a:solidFill>
-                <a:schemeClr val="accent6">
-                  <a:lumMod val="75000"/>
-                </a:schemeClr>
-              </a:solidFill>
-            </a:endParaRPr>
           </a:p>
         </p:txBody>
       </p:sp>
@@ -8617,7 +8827,7 @@
           <a:lstStyle/>
           <a:p>
             <a:r>
-              <a:rPr lang="en-US" sz="1100" dirty="0" err="1" smtClean="0">
+              <a:rPr lang="en-US" sz="1100" dirty="0" err="1">
                 <a:solidFill>
                   <a:schemeClr val="accent6">
                     <a:lumMod val="75000"/>

</xml_diff>

<commit_message>
Revert "Command class: make non-abstract"
This reverts commit de7ef4a1968301b9fc53dccc6c07bcbd0d4af6bb.
</commit_message>
<xml_diff>
--- a/doc/Diagrams.pptx
+++ b/doc/Diagrams.pptx
@@ -107,22 +107,6 @@
       </a:defRPr>
     </a:lvl9pPr>
   </p:defaultTextStyle>
-  <p:extLst>
-    <p:ext uri="{EFAFB233-063F-42B5-8137-9DF3F51BA10A}">
-      <p15:sldGuideLst xmlns:p15="http://schemas.microsoft.com/office/powerpoint/2012/main">
-        <p15:guide id="1" orient="horz" pos="2160">
-          <p15:clr>
-            <a:srgbClr val="A4A3A4"/>
-          </p15:clr>
-        </p15:guide>
-        <p15:guide id="2" pos="2880">
-          <p15:clr>
-            <a:srgbClr val="A4A3A4"/>
-          </p15:clr>
-        </p15:guide>
-      </p15:sldGuideLst>
-    </p:ext>
-  </p:extLst>
 </p:presentation>
 </file>
 
@@ -307,7 +291,7 @@
           <a:p>
             <a:fld id="{78C97017-6FC3-485B-9764-EAC9E56C1D49}" type="datetimeFigureOut">
               <a:rPr lang="en-US" smtClean="0"/>
-              <a:t>8/31/2017</a:t>
+              <a:t>9/6/2016</a:t>
             </a:fld>
             <a:endParaRPr lang="en-US"/>
           </a:p>
@@ -477,7 +461,7 @@
           <a:p>
             <a:fld id="{78C97017-6FC3-485B-9764-EAC9E56C1D49}" type="datetimeFigureOut">
               <a:rPr lang="en-US" smtClean="0"/>
-              <a:t>8/31/2017</a:t>
+              <a:t>9/6/2016</a:t>
             </a:fld>
             <a:endParaRPr lang="en-US"/>
           </a:p>
@@ -657,7 +641,7 @@
           <a:p>
             <a:fld id="{78C97017-6FC3-485B-9764-EAC9E56C1D49}" type="datetimeFigureOut">
               <a:rPr lang="en-US" smtClean="0"/>
-              <a:t>8/31/2017</a:t>
+              <a:t>9/6/2016</a:t>
             </a:fld>
             <a:endParaRPr lang="en-US"/>
           </a:p>
@@ -827,7 +811,7 @@
           <a:p>
             <a:fld id="{78C97017-6FC3-485B-9764-EAC9E56C1D49}" type="datetimeFigureOut">
               <a:rPr lang="en-US" smtClean="0"/>
-              <a:t>8/31/2017</a:t>
+              <a:t>9/6/2016</a:t>
             </a:fld>
             <a:endParaRPr lang="en-US"/>
           </a:p>
@@ -1073,7 +1057,7 @@
           <a:p>
             <a:fld id="{78C97017-6FC3-485B-9764-EAC9E56C1D49}" type="datetimeFigureOut">
               <a:rPr lang="en-US" smtClean="0"/>
-              <a:t>8/31/2017</a:t>
+              <a:t>9/6/2016</a:t>
             </a:fld>
             <a:endParaRPr lang="en-US"/>
           </a:p>
@@ -1361,7 +1345,7 @@
           <a:p>
             <a:fld id="{78C97017-6FC3-485B-9764-EAC9E56C1D49}" type="datetimeFigureOut">
               <a:rPr lang="en-US" smtClean="0"/>
-              <a:t>8/31/2017</a:t>
+              <a:t>9/6/2016</a:t>
             </a:fld>
             <a:endParaRPr lang="en-US"/>
           </a:p>
@@ -1783,7 +1767,7 @@
           <a:p>
             <a:fld id="{78C97017-6FC3-485B-9764-EAC9E56C1D49}" type="datetimeFigureOut">
               <a:rPr lang="en-US" smtClean="0"/>
-              <a:t>8/31/2017</a:t>
+              <a:t>9/6/2016</a:t>
             </a:fld>
             <a:endParaRPr lang="en-US"/>
           </a:p>
@@ -1901,7 +1885,7 @@
           <a:p>
             <a:fld id="{78C97017-6FC3-485B-9764-EAC9E56C1D49}" type="datetimeFigureOut">
               <a:rPr lang="en-US" smtClean="0"/>
-              <a:t>8/31/2017</a:t>
+              <a:t>9/6/2016</a:t>
             </a:fld>
             <a:endParaRPr lang="en-US"/>
           </a:p>
@@ -1996,7 +1980,7 @@
           <a:p>
             <a:fld id="{78C97017-6FC3-485B-9764-EAC9E56C1D49}" type="datetimeFigureOut">
               <a:rPr lang="en-US" smtClean="0"/>
-              <a:t>8/31/2017</a:t>
+              <a:t>9/6/2016</a:t>
             </a:fld>
             <a:endParaRPr lang="en-US"/>
           </a:p>
@@ -2273,7 +2257,7 @@
           <a:p>
             <a:fld id="{78C97017-6FC3-485B-9764-EAC9E56C1D49}" type="datetimeFigureOut">
               <a:rPr lang="en-US" smtClean="0"/>
-              <a:t>8/31/2017</a:t>
+              <a:t>9/6/2016</a:t>
             </a:fld>
             <a:endParaRPr lang="en-US"/>
           </a:p>
@@ -2526,7 +2510,7 @@
           <a:p>
             <a:fld id="{78C97017-6FC3-485B-9764-EAC9E56C1D49}" type="datetimeFigureOut">
               <a:rPr lang="en-US" smtClean="0"/>
-              <a:t>8/31/2017</a:t>
+              <a:t>9/6/2016</a:t>
             </a:fld>
             <a:endParaRPr lang="en-US"/>
           </a:p>
@@ -2739,7 +2723,7 @@
           <a:p>
             <a:fld id="{78C97017-6FC3-485B-9764-EAC9E56C1D49}" type="datetimeFigureOut">
               <a:rPr lang="en-US" smtClean="0"/>
-              <a:t>8/31/2017</a:t>
+              <a:t>9/6/2016</a:t>
             </a:fld>
             <a:endParaRPr lang="en-US"/>
           </a:p>
@@ -4609,7 +4593,14 @@
           <a:p>
             <a:pPr algn="ctr"/>
             <a:r>
-              <a:rPr lang="en-US" sz="1050" dirty="0" smtClean="0"/>
+              <a:rPr lang="en-US" sz="1050" dirty="0"/>
+              <a:t>{abstract}</a:t>
+            </a:r>
+            <a:br>
+              <a:rPr lang="en-US" sz="1050" dirty="0"/>
+            </a:br>
+            <a:r>
+              <a:rPr lang="en-US" sz="1050" dirty="0"/>
               <a:t>Command</a:t>
             </a:r>
             <a:endParaRPr lang="en-SG" sz="1050" dirty="0"/>

</xml_diff>

<commit_message>
Revert "Revert "Command class: make non-abstract""
This reverts commit d49203037ca06360b2b08efc972fe28a5ef7d46e.
</commit_message>
<xml_diff>
--- a/doc/Diagrams.pptx
+++ b/doc/Diagrams.pptx
@@ -107,6 +107,22 @@
       </a:defRPr>
     </a:lvl9pPr>
   </p:defaultTextStyle>
+  <p:extLst>
+    <p:ext uri="{EFAFB233-063F-42B5-8137-9DF3F51BA10A}">
+      <p15:sldGuideLst xmlns:p15="http://schemas.microsoft.com/office/powerpoint/2012/main">
+        <p15:guide id="1" orient="horz" pos="2160">
+          <p15:clr>
+            <a:srgbClr val="A4A3A4"/>
+          </p15:clr>
+        </p15:guide>
+        <p15:guide id="2" pos="2880">
+          <p15:clr>
+            <a:srgbClr val="A4A3A4"/>
+          </p15:clr>
+        </p15:guide>
+      </p15:sldGuideLst>
+    </p:ext>
+  </p:extLst>
 </p:presentation>
 </file>
 
@@ -291,7 +307,7 @@
           <a:p>
             <a:fld id="{78C97017-6FC3-485B-9764-EAC9E56C1D49}" type="datetimeFigureOut">
               <a:rPr lang="en-US" smtClean="0"/>
-              <a:t>9/6/2016</a:t>
+              <a:t>8/31/2017</a:t>
             </a:fld>
             <a:endParaRPr lang="en-US"/>
           </a:p>
@@ -461,7 +477,7 @@
           <a:p>
             <a:fld id="{78C97017-6FC3-485B-9764-EAC9E56C1D49}" type="datetimeFigureOut">
               <a:rPr lang="en-US" smtClean="0"/>
-              <a:t>9/6/2016</a:t>
+              <a:t>8/31/2017</a:t>
             </a:fld>
             <a:endParaRPr lang="en-US"/>
           </a:p>
@@ -641,7 +657,7 @@
           <a:p>
             <a:fld id="{78C97017-6FC3-485B-9764-EAC9E56C1D49}" type="datetimeFigureOut">
               <a:rPr lang="en-US" smtClean="0"/>
-              <a:t>9/6/2016</a:t>
+              <a:t>8/31/2017</a:t>
             </a:fld>
             <a:endParaRPr lang="en-US"/>
           </a:p>
@@ -811,7 +827,7 @@
           <a:p>
             <a:fld id="{78C97017-6FC3-485B-9764-EAC9E56C1D49}" type="datetimeFigureOut">
               <a:rPr lang="en-US" smtClean="0"/>
-              <a:t>9/6/2016</a:t>
+              <a:t>8/31/2017</a:t>
             </a:fld>
             <a:endParaRPr lang="en-US"/>
           </a:p>
@@ -1057,7 +1073,7 @@
           <a:p>
             <a:fld id="{78C97017-6FC3-485B-9764-EAC9E56C1D49}" type="datetimeFigureOut">
               <a:rPr lang="en-US" smtClean="0"/>
-              <a:t>9/6/2016</a:t>
+              <a:t>8/31/2017</a:t>
             </a:fld>
             <a:endParaRPr lang="en-US"/>
           </a:p>
@@ -1345,7 +1361,7 @@
           <a:p>
             <a:fld id="{78C97017-6FC3-485B-9764-EAC9E56C1D49}" type="datetimeFigureOut">
               <a:rPr lang="en-US" smtClean="0"/>
-              <a:t>9/6/2016</a:t>
+              <a:t>8/31/2017</a:t>
             </a:fld>
             <a:endParaRPr lang="en-US"/>
           </a:p>
@@ -1767,7 +1783,7 @@
           <a:p>
             <a:fld id="{78C97017-6FC3-485B-9764-EAC9E56C1D49}" type="datetimeFigureOut">
               <a:rPr lang="en-US" smtClean="0"/>
-              <a:t>9/6/2016</a:t>
+              <a:t>8/31/2017</a:t>
             </a:fld>
             <a:endParaRPr lang="en-US"/>
           </a:p>
@@ -1885,7 +1901,7 @@
           <a:p>
             <a:fld id="{78C97017-6FC3-485B-9764-EAC9E56C1D49}" type="datetimeFigureOut">
               <a:rPr lang="en-US" smtClean="0"/>
-              <a:t>9/6/2016</a:t>
+              <a:t>8/31/2017</a:t>
             </a:fld>
             <a:endParaRPr lang="en-US"/>
           </a:p>
@@ -1980,7 +1996,7 @@
           <a:p>
             <a:fld id="{78C97017-6FC3-485B-9764-EAC9E56C1D49}" type="datetimeFigureOut">
               <a:rPr lang="en-US" smtClean="0"/>
-              <a:t>9/6/2016</a:t>
+              <a:t>8/31/2017</a:t>
             </a:fld>
             <a:endParaRPr lang="en-US"/>
           </a:p>
@@ -2257,7 +2273,7 @@
           <a:p>
             <a:fld id="{78C97017-6FC3-485B-9764-EAC9E56C1D49}" type="datetimeFigureOut">
               <a:rPr lang="en-US" smtClean="0"/>
-              <a:t>9/6/2016</a:t>
+              <a:t>8/31/2017</a:t>
             </a:fld>
             <a:endParaRPr lang="en-US"/>
           </a:p>
@@ -2510,7 +2526,7 @@
           <a:p>
             <a:fld id="{78C97017-6FC3-485B-9764-EAC9E56C1D49}" type="datetimeFigureOut">
               <a:rPr lang="en-US" smtClean="0"/>
-              <a:t>9/6/2016</a:t>
+              <a:t>8/31/2017</a:t>
             </a:fld>
             <a:endParaRPr lang="en-US"/>
           </a:p>
@@ -2723,7 +2739,7 @@
           <a:p>
             <a:fld id="{78C97017-6FC3-485B-9764-EAC9E56C1D49}" type="datetimeFigureOut">
               <a:rPr lang="en-US" smtClean="0"/>
-              <a:t>9/6/2016</a:t>
+              <a:t>8/31/2017</a:t>
             </a:fld>
             <a:endParaRPr lang="en-US"/>
           </a:p>
@@ -4593,14 +4609,7 @@
           <a:p>
             <a:pPr algn="ctr"/>
             <a:r>
-              <a:rPr lang="en-US" sz="1050" dirty="0"/>
-              <a:t>{abstract}</a:t>
-            </a:r>
-            <a:br>
-              <a:rPr lang="en-US" sz="1050" dirty="0"/>
-            </a:br>
-            <a:r>
-              <a:rPr lang="en-US" sz="1050" dirty="0"/>
+              <a:rPr lang="en-US" sz="1050" dirty="0" smtClean="0"/>
               <a:t>Command</a:t>
             </a:r>
             <a:endParaRPr lang="en-SG" sz="1050" dirty="0"/>

</xml_diff>

<commit_message>
Revert "Revert "Revert "Command class: make non-abstract"""
This reverts commit 22c3a40b0909790b16bce5b99414647aed488e14.
</commit_message>
<xml_diff>
--- a/doc/Diagrams.pptx
+++ b/doc/Diagrams.pptx
@@ -107,22 +107,6 @@
       </a:defRPr>
     </a:lvl9pPr>
   </p:defaultTextStyle>
-  <p:extLst>
-    <p:ext uri="{EFAFB233-063F-42B5-8137-9DF3F51BA10A}">
-      <p15:sldGuideLst xmlns:p15="http://schemas.microsoft.com/office/powerpoint/2012/main">
-        <p15:guide id="1" orient="horz" pos="2160">
-          <p15:clr>
-            <a:srgbClr val="A4A3A4"/>
-          </p15:clr>
-        </p15:guide>
-        <p15:guide id="2" pos="2880">
-          <p15:clr>
-            <a:srgbClr val="A4A3A4"/>
-          </p15:clr>
-        </p15:guide>
-      </p15:sldGuideLst>
-    </p:ext>
-  </p:extLst>
 </p:presentation>
 </file>
 
@@ -307,7 +291,7 @@
           <a:p>
             <a:fld id="{78C97017-6FC3-485B-9764-EAC9E56C1D49}" type="datetimeFigureOut">
               <a:rPr lang="en-US" smtClean="0"/>
-              <a:t>8/31/2017</a:t>
+              <a:t>9/6/2016</a:t>
             </a:fld>
             <a:endParaRPr lang="en-US"/>
           </a:p>
@@ -477,7 +461,7 @@
           <a:p>
             <a:fld id="{78C97017-6FC3-485B-9764-EAC9E56C1D49}" type="datetimeFigureOut">
               <a:rPr lang="en-US" smtClean="0"/>
-              <a:t>8/31/2017</a:t>
+              <a:t>9/6/2016</a:t>
             </a:fld>
             <a:endParaRPr lang="en-US"/>
           </a:p>
@@ -657,7 +641,7 @@
           <a:p>
             <a:fld id="{78C97017-6FC3-485B-9764-EAC9E56C1D49}" type="datetimeFigureOut">
               <a:rPr lang="en-US" smtClean="0"/>
-              <a:t>8/31/2017</a:t>
+              <a:t>9/6/2016</a:t>
             </a:fld>
             <a:endParaRPr lang="en-US"/>
           </a:p>
@@ -827,7 +811,7 @@
           <a:p>
             <a:fld id="{78C97017-6FC3-485B-9764-EAC9E56C1D49}" type="datetimeFigureOut">
               <a:rPr lang="en-US" smtClean="0"/>
-              <a:t>8/31/2017</a:t>
+              <a:t>9/6/2016</a:t>
             </a:fld>
             <a:endParaRPr lang="en-US"/>
           </a:p>
@@ -1073,7 +1057,7 @@
           <a:p>
             <a:fld id="{78C97017-6FC3-485B-9764-EAC9E56C1D49}" type="datetimeFigureOut">
               <a:rPr lang="en-US" smtClean="0"/>
-              <a:t>8/31/2017</a:t>
+              <a:t>9/6/2016</a:t>
             </a:fld>
             <a:endParaRPr lang="en-US"/>
           </a:p>
@@ -1361,7 +1345,7 @@
           <a:p>
             <a:fld id="{78C97017-6FC3-485B-9764-EAC9E56C1D49}" type="datetimeFigureOut">
               <a:rPr lang="en-US" smtClean="0"/>
-              <a:t>8/31/2017</a:t>
+              <a:t>9/6/2016</a:t>
             </a:fld>
             <a:endParaRPr lang="en-US"/>
           </a:p>
@@ -1783,7 +1767,7 @@
           <a:p>
             <a:fld id="{78C97017-6FC3-485B-9764-EAC9E56C1D49}" type="datetimeFigureOut">
               <a:rPr lang="en-US" smtClean="0"/>
-              <a:t>8/31/2017</a:t>
+              <a:t>9/6/2016</a:t>
             </a:fld>
             <a:endParaRPr lang="en-US"/>
           </a:p>
@@ -1901,7 +1885,7 @@
           <a:p>
             <a:fld id="{78C97017-6FC3-485B-9764-EAC9E56C1D49}" type="datetimeFigureOut">
               <a:rPr lang="en-US" smtClean="0"/>
-              <a:t>8/31/2017</a:t>
+              <a:t>9/6/2016</a:t>
             </a:fld>
             <a:endParaRPr lang="en-US"/>
           </a:p>
@@ -1996,7 +1980,7 @@
           <a:p>
             <a:fld id="{78C97017-6FC3-485B-9764-EAC9E56C1D49}" type="datetimeFigureOut">
               <a:rPr lang="en-US" smtClean="0"/>
-              <a:t>8/31/2017</a:t>
+              <a:t>9/6/2016</a:t>
             </a:fld>
             <a:endParaRPr lang="en-US"/>
           </a:p>
@@ -2273,7 +2257,7 @@
           <a:p>
             <a:fld id="{78C97017-6FC3-485B-9764-EAC9E56C1D49}" type="datetimeFigureOut">
               <a:rPr lang="en-US" smtClean="0"/>
-              <a:t>8/31/2017</a:t>
+              <a:t>9/6/2016</a:t>
             </a:fld>
             <a:endParaRPr lang="en-US"/>
           </a:p>
@@ -2526,7 +2510,7 @@
           <a:p>
             <a:fld id="{78C97017-6FC3-485B-9764-EAC9E56C1D49}" type="datetimeFigureOut">
               <a:rPr lang="en-US" smtClean="0"/>
-              <a:t>8/31/2017</a:t>
+              <a:t>9/6/2016</a:t>
             </a:fld>
             <a:endParaRPr lang="en-US"/>
           </a:p>
@@ -2739,7 +2723,7 @@
           <a:p>
             <a:fld id="{78C97017-6FC3-485B-9764-EAC9E56C1D49}" type="datetimeFigureOut">
               <a:rPr lang="en-US" smtClean="0"/>
-              <a:t>8/31/2017</a:t>
+              <a:t>9/6/2016</a:t>
             </a:fld>
             <a:endParaRPr lang="en-US"/>
           </a:p>
@@ -4609,7 +4593,14 @@
           <a:p>
             <a:pPr algn="ctr"/>
             <a:r>
-              <a:rPr lang="en-US" sz="1050" dirty="0" smtClean="0"/>
+              <a:rPr lang="en-US" sz="1050" dirty="0"/>
+              <a:t>{abstract}</a:t>
+            </a:r>
+            <a:br>
+              <a:rPr lang="en-US" sz="1050" dirty="0"/>
+            </a:br>
+            <a:r>
+              <a:rPr lang="en-US" sz="1050" dirty="0"/>
               <a:t>Command</a:t>
             </a:r>
             <a:endParaRPr lang="en-SG" sz="1050" dirty="0"/>

</xml_diff>

<commit_message>
Revert "Revert "Revert "Revert "Command class: make non-abstract""""
This reverts commit a7d60fd69471537c62819f1c1b6be382be0ed5c6.
</commit_message>
<xml_diff>
--- a/doc/Diagrams.pptx
+++ b/doc/Diagrams.pptx
@@ -107,6 +107,22 @@
       </a:defRPr>
     </a:lvl9pPr>
   </p:defaultTextStyle>
+  <p:extLst>
+    <p:ext uri="{EFAFB233-063F-42B5-8137-9DF3F51BA10A}">
+      <p15:sldGuideLst xmlns:p15="http://schemas.microsoft.com/office/powerpoint/2012/main">
+        <p15:guide id="1" orient="horz" pos="2160">
+          <p15:clr>
+            <a:srgbClr val="A4A3A4"/>
+          </p15:clr>
+        </p15:guide>
+        <p15:guide id="2" pos="2880">
+          <p15:clr>
+            <a:srgbClr val="A4A3A4"/>
+          </p15:clr>
+        </p15:guide>
+      </p15:sldGuideLst>
+    </p:ext>
+  </p:extLst>
 </p:presentation>
 </file>
 
@@ -291,7 +307,7 @@
           <a:p>
             <a:fld id="{78C97017-6FC3-485B-9764-EAC9E56C1D49}" type="datetimeFigureOut">
               <a:rPr lang="en-US" smtClean="0"/>
-              <a:t>9/6/2016</a:t>
+              <a:t>8/31/2017</a:t>
             </a:fld>
             <a:endParaRPr lang="en-US"/>
           </a:p>
@@ -461,7 +477,7 @@
           <a:p>
             <a:fld id="{78C97017-6FC3-485B-9764-EAC9E56C1D49}" type="datetimeFigureOut">
               <a:rPr lang="en-US" smtClean="0"/>
-              <a:t>9/6/2016</a:t>
+              <a:t>8/31/2017</a:t>
             </a:fld>
             <a:endParaRPr lang="en-US"/>
           </a:p>
@@ -641,7 +657,7 @@
           <a:p>
             <a:fld id="{78C97017-6FC3-485B-9764-EAC9E56C1D49}" type="datetimeFigureOut">
               <a:rPr lang="en-US" smtClean="0"/>
-              <a:t>9/6/2016</a:t>
+              <a:t>8/31/2017</a:t>
             </a:fld>
             <a:endParaRPr lang="en-US"/>
           </a:p>
@@ -811,7 +827,7 @@
           <a:p>
             <a:fld id="{78C97017-6FC3-485B-9764-EAC9E56C1D49}" type="datetimeFigureOut">
               <a:rPr lang="en-US" smtClean="0"/>
-              <a:t>9/6/2016</a:t>
+              <a:t>8/31/2017</a:t>
             </a:fld>
             <a:endParaRPr lang="en-US"/>
           </a:p>
@@ -1057,7 +1073,7 @@
           <a:p>
             <a:fld id="{78C97017-6FC3-485B-9764-EAC9E56C1D49}" type="datetimeFigureOut">
               <a:rPr lang="en-US" smtClean="0"/>
-              <a:t>9/6/2016</a:t>
+              <a:t>8/31/2017</a:t>
             </a:fld>
             <a:endParaRPr lang="en-US"/>
           </a:p>
@@ -1345,7 +1361,7 @@
           <a:p>
             <a:fld id="{78C97017-6FC3-485B-9764-EAC9E56C1D49}" type="datetimeFigureOut">
               <a:rPr lang="en-US" smtClean="0"/>
-              <a:t>9/6/2016</a:t>
+              <a:t>8/31/2017</a:t>
             </a:fld>
             <a:endParaRPr lang="en-US"/>
           </a:p>
@@ -1767,7 +1783,7 @@
           <a:p>
             <a:fld id="{78C97017-6FC3-485B-9764-EAC9E56C1D49}" type="datetimeFigureOut">
               <a:rPr lang="en-US" smtClean="0"/>
-              <a:t>9/6/2016</a:t>
+              <a:t>8/31/2017</a:t>
             </a:fld>
             <a:endParaRPr lang="en-US"/>
           </a:p>
@@ -1885,7 +1901,7 @@
           <a:p>
             <a:fld id="{78C97017-6FC3-485B-9764-EAC9E56C1D49}" type="datetimeFigureOut">
               <a:rPr lang="en-US" smtClean="0"/>
-              <a:t>9/6/2016</a:t>
+              <a:t>8/31/2017</a:t>
             </a:fld>
             <a:endParaRPr lang="en-US"/>
           </a:p>
@@ -1980,7 +1996,7 @@
           <a:p>
             <a:fld id="{78C97017-6FC3-485B-9764-EAC9E56C1D49}" type="datetimeFigureOut">
               <a:rPr lang="en-US" smtClean="0"/>
-              <a:t>9/6/2016</a:t>
+              <a:t>8/31/2017</a:t>
             </a:fld>
             <a:endParaRPr lang="en-US"/>
           </a:p>
@@ -2257,7 +2273,7 @@
           <a:p>
             <a:fld id="{78C97017-6FC3-485B-9764-EAC9E56C1D49}" type="datetimeFigureOut">
               <a:rPr lang="en-US" smtClean="0"/>
-              <a:t>9/6/2016</a:t>
+              <a:t>8/31/2017</a:t>
             </a:fld>
             <a:endParaRPr lang="en-US"/>
           </a:p>
@@ -2510,7 +2526,7 @@
           <a:p>
             <a:fld id="{78C97017-6FC3-485B-9764-EAC9E56C1D49}" type="datetimeFigureOut">
               <a:rPr lang="en-US" smtClean="0"/>
-              <a:t>9/6/2016</a:t>
+              <a:t>8/31/2017</a:t>
             </a:fld>
             <a:endParaRPr lang="en-US"/>
           </a:p>
@@ -2723,7 +2739,7 @@
           <a:p>
             <a:fld id="{78C97017-6FC3-485B-9764-EAC9E56C1D49}" type="datetimeFigureOut">
               <a:rPr lang="en-US" smtClean="0"/>
-              <a:t>9/6/2016</a:t>
+              <a:t>8/31/2017</a:t>
             </a:fld>
             <a:endParaRPr lang="en-US"/>
           </a:p>
@@ -4593,14 +4609,7 @@
           <a:p>
             <a:pPr algn="ctr"/>
             <a:r>
-              <a:rPr lang="en-US" sz="1050" dirty="0"/>
-              <a:t>{abstract}</a:t>
-            </a:r>
-            <a:br>
-              <a:rPr lang="en-US" sz="1050" dirty="0"/>
-            </a:br>
-            <a:r>
-              <a:rPr lang="en-US" sz="1050" dirty="0"/>
+              <a:rPr lang="en-US" sz="1050" dirty="0" smtClean="0"/>
               <a:t>Command</a:t>
             </a:r>
             <a:endParaRPr lang="en-SG" sz="1050" dirty="0"/>

</xml_diff>